<commit_message>
content of first slides
</commit_message>
<xml_diff>
--- a/beacon.pptx
+++ b/beacon.pptx
@@ -5,17 +5,23 @@
     <p:sldMasterId id="2147483648" r:id="rId1"/>
   </p:sldMasterIdLst>
   <p:notesMasterIdLst>
-    <p:notesMasterId r:id="rId10"/>
+    <p:notesMasterId r:id="rId16"/>
   </p:notesMasterIdLst>
   <p:sldIdLst>
-    <p:sldId id="258" r:id="rId2"/>
-    <p:sldId id="256" r:id="rId3"/>
-    <p:sldId id="261" r:id="rId4"/>
-    <p:sldId id="262" r:id="rId5"/>
-    <p:sldId id="264" r:id="rId6"/>
-    <p:sldId id="263" r:id="rId7"/>
-    <p:sldId id="259" r:id="rId8"/>
-    <p:sldId id="260" r:id="rId9"/>
+    <p:sldId id="265" r:id="rId2"/>
+    <p:sldId id="266" r:id="rId3"/>
+    <p:sldId id="267" r:id="rId4"/>
+    <p:sldId id="268" r:id="rId5"/>
+    <p:sldId id="269" r:id="rId6"/>
+    <p:sldId id="270" r:id="rId7"/>
+    <p:sldId id="258" r:id="rId8"/>
+    <p:sldId id="256" r:id="rId9"/>
+    <p:sldId id="261" r:id="rId10"/>
+    <p:sldId id="262" r:id="rId11"/>
+    <p:sldId id="264" r:id="rId12"/>
+    <p:sldId id="263" r:id="rId13"/>
+    <p:sldId id="259" r:id="rId14"/>
+    <p:sldId id="260" r:id="rId15"/>
   </p:sldIdLst>
   <p:sldSz cx="12192000" cy="6858000"/>
   <p:notesSz cx="6858000" cy="9144000"/>
@@ -122,6 +128,10 @@
 </p:presentation>
 </file>
 
+<file path=ppt/revisionInfo.xml><?xml version="1.0" encoding="utf-8"?>
+<p1510:revInfo xmlns:a="http://schemas.openxmlformats.org/drawingml/2006/main" xmlns:r="http://schemas.openxmlformats.org/officeDocument/2006/relationships" xmlns:p1510="http://schemas.microsoft.com/office/powerpoint/2015/10/main"/>
+</file>
+
 <file path=ppt/notesMasters/notesMaster1.xml><?xml version="1.0" encoding="utf-8"?>
 <p:notesMaster xmlns:a="http://schemas.openxmlformats.org/drawingml/2006/main" xmlns:r="http://schemas.openxmlformats.org/officeDocument/2006/relationships" xmlns:p="http://schemas.openxmlformats.org/presentationml/2006/main">
   <p:cSld>
@@ -204,7 +214,7 @@
           <a:p>
             <a:fld id="{7FB21C59-0C57-A34E-9D89-8F35864411FC}" type="datetimeFigureOut">
               <a:rPr lang="en-US" smtClean="0"/>
-              <a:t>10/28/17</a:t>
+              <a:t>2017-10-28</a:t>
             </a:fld>
             <a:endParaRPr lang="en-US"/>
           </a:p>
@@ -268,35 +278,35 @@
           <a:p>
             <a:pPr lvl="0"/>
             <a:r>
-              <a:rPr lang="de-DE" smtClean="0"/>
+              <a:rPr lang="de-DE"/>
               <a:t>Mastertextformat bearbeiten</a:t>
             </a:r>
           </a:p>
           <a:p>
             <a:pPr lvl="1"/>
             <a:r>
-              <a:rPr lang="de-DE" smtClean="0"/>
+              <a:rPr lang="de-DE"/>
               <a:t>Zweite Ebene</a:t>
             </a:r>
           </a:p>
           <a:p>
             <a:pPr lvl="2"/>
             <a:r>
-              <a:rPr lang="de-DE" smtClean="0"/>
+              <a:rPr lang="de-DE"/>
               <a:t>Dritte Ebene</a:t>
             </a:r>
           </a:p>
           <a:p>
             <a:pPr lvl="3"/>
             <a:r>
-              <a:rPr lang="de-DE" smtClean="0"/>
+              <a:rPr lang="de-DE"/>
               <a:t>Vierte Ebene</a:t>
             </a:r>
           </a:p>
           <a:p>
             <a:pPr lvl="4"/>
             <a:r>
-              <a:rPr lang="de-DE" smtClean="0"/>
+              <a:rPr lang="de-DE"/>
               <a:t>Fünfte Ebene</a:t>
             </a:r>
             <a:endParaRPr lang="en-US"/>
@@ -514,7 +524,7 @@
           </a:lstStyle>
           <a:p>
             <a:r>
-              <a:rPr lang="de-DE" smtClean="0"/>
+              <a:rPr lang="de-DE"/>
               <a:t>Mastertitelformat bearbeiten</a:t>
             </a:r>
             <a:endParaRPr lang="en-US"/>
@@ -579,7 +589,7 @@
           </a:lstStyle>
           <a:p>
             <a:r>
-              <a:rPr lang="de-DE" smtClean="0"/>
+              <a:rPr lang="de-DE"/>
               <a:t>Master-Untertitelformat bearbeiten</a:t>
             </a:r>
             <a:endParaRPr lang="en-US"/>
@@ -603,7 +613,7 @@
           <a:p>
             <a:fld id="{15680C8E-BD82-6C46-BE23-AB0FD4D62C03}" type="datetimeFigureOut">
               <a:rPr lang="en-US" smtClean="0"/>
-              <a:t>10/28/17</a:t>
+              <a:t>2017-10-28</a:t>
             </a:fld>
             <a:endParaRPr lang="en-US"/>
           </a:p>
@@ -697,7 +707,7 @@
           <a:lstStyle/>
           <a:p>
             <a:r>
-              <a:rPr lang="de-DE" smtClean="0"/>
+              <a:rPr lang="de-DE"/>
               <a:t>Mastertitelformat bearbeiten</a:t>
             </a:r>
             <a:endParaRPr lang="en-US"/>
@@ -721,35 +731,35 @@
           <a:p>
             <a:pPr lvl="0"/>
             <a:r>
-              <a:rPr lang="de-DE" smtClean="0"/>
+              <a:rPr lang="de-DE"/>
               <a:t>Mastertextformat bearbeiten</a:t>
             </a:r>
           </a:p>
           <a:p>
             <a:pPr lvl="1"/>
             <a:r>
-              <a:rPr lang="de-DE" smtClean="0"/>
+              <a:rPr lang="de-DE"/>
               <a:t>Zweite Ebene</a:t>
             </a:r>
           </a:p>
           <a:p>
             <a:pPr lvl="2"/>
             <a:r>
-              <a:rPr lang="de-DE" smtClean="0"/>
+              <a:rPr lang="de-DE"/>
               <a:t>Dritte Ebene</a:t>
             </a:r>
           </a:p>
           <a:p>
             <a:pPr lvl="3"/>
             <a:r>
-              <a:rPr lang="de-DE" smtClean="0"/>
+              <a:rPr lang="de-DE"/>
               <a:t>Vierte Ebene</a:t>
             </a:r>
           </a:p>
           <a:p>
             <a:pPr lvl="4"/>
             <a:r>
-              <a:rPr lang="de-DE" smtClean="0"/>
+              <a:rPr lang="de-DE"/>
               <a:t>Fünfte Ebene</a:t>
             </a:r>
             <a:endParaRPr lang="en-US"/>
@@ -773,7 +783,7 @@
           <a:p>
             <a:fld id="{15680C8E-BD82-6C46-BE23-AB0FD4D62C03}" type="datetimeFigureOut">
               <a:rPr lang="en-US" smtClean="0"/>
-              <a:t>10/28/17</a:t>
+              <a:t>2017-10-28</a:t>
             </a:fld>
             <a:endParaRPr lang="en-US"/>
           </a:p>
@@ -872,7 +882,7 @@
           <a:lstStyle/>
           <a:p>
             <a:r>
-              <a:rPr lang="de-DE" smtClean="0"/>
+              <a:rPr lang="de-DE"/>
               <a:t>Mastertitelformat bearbeiten</a:t>
             </a:r>
             <a:endParaRPr lang="en-US"/>
@@ -901,35 +911,35 @@
           <a:p>
             <a:pPr lvl="0"/>
             <a:r>
-              <a:rPr lang="de-DE" smtClean="0"/>
+              <a:rPr lang="de-DE"/>
               <a:t>Mastertextformat bearbeiten</a:t>
             </a:r>
           </a:p>
           <a:p>
             <a:pPr lvl="1"/>
             <a:r>
-              <a:rPr lang="de-DE" smtClean="0"/>
+              <a:rPr lang="de-DE"/>
               <a:t>Zweite Ebene</a:t>
             </a:r>
           </a:p>
           <a:p>
             <a:pPr lvl="2"/>
             <a:r>
-              <a:rPr lang="de-DE" smtClean="0"/>
+              <a:rPr lang="de-DE"/>
               <a:t>Dritte Ebene</a:t>
             </a:r>
           </a:p>
           <a:p>
             <a:pPr lvl="3"/>
             <a:r>
-              <a:rPr lang="de-DE" smtClean="0"/>
+              <a:rPr lang="de-DE"/>
               <a:t>Vierte Ebene</a:t>
             </a:r>
           </a:p>
           <a:p>
             <a:pPr lvl="4"/>
             <a:r>
-              <a:rPr lang="de-DE" smtClean="0"/>
+              <a:rPr lang="de-DE"/>
               <a:t>Fünfte Ebene</a:t>
             </a:r>
             <a:endParaRPr lang="en-US"/>
@@ -953,7 +963,7 @@
           <a:p>
             <a:fld id="{15680C8E-BD82-6C46-BE23-AB0FD4D62C03}" type="datetimeFigureOut">
               <a:rPr lang="en-US" smtClean="0"/>
-              <a:t>10/28/17</a:t>
+              <a:t>2017-10-28</a:t>
             </a:fld>
             <a:endParaRPr lang="en-US"/>
           </a:p>
@@ -1047,7 +1057,7 @@
           <a:lstStyle/>
           <a:p>
             <a:r>
-              <a:rPr lang="de-DE" smtClean="0"/>
+              <a:rPr lang="de-DE"/>
               <a:t>Mastertitelformat bearbeiten</a:t>
             </a:r>
             <a:endParaRPr lang="en-US"/>
@@ -1071,35 +1081,35 @@
           <a:p>
             <a:pPr lvl="0"/>
             <a:r>
-              <a:rPr lang="de-DE" smtClean="0"/>
+              <a:rPr lang="de-DE"/>
               <a:t>Mastertextformat bearbeiten</a:t>
             </a:r>
           </a:p>
           <a:p>
             <a:pPr lvl="1"/>
             <a:r>
-              <a:rPr lang="de-DE" smtClean="0"/>
+              <a:rPr lang="de-DE"/>
               <a:t>Zweite Ebene</a:t>
             </a:r>
           </a:p>
           <a:p>
             <a:pPr lvl="2"/>
             <a:r>
-              <a:rPr lang="de-DE" smtClean="0"/>
+              <a:rPr lang="de-DE"/>
               <a:t>Dritte Ebene</a:t>
             </a:r>
           </a:p>
           <a:p>
             <a:pPr lvl="3"/>
             <a:r>
-              <a:rPr lang="de-DE" smtClean="0"/>
+              <a:rPr lang="de-DE"/>
               <a:t>Vierte Ebene</a:t>
             </a:r>
           </a:p>
           <a:p>
             <a:pPr lvl="4"/>
             <a:r>
-              <a:rPr lang="de-DE" smtClean="0"/>
+              <a:rPr lang="de-DE"/>
               <a:t>Fünfte Ebene</a:t>
             </a:r>
             <a:endParaRPr lang="en-US"/>
@@ -1123,7 +1133,7 @@
           <a:p>
             <a:fld id="{15680C8E-BD82-6C46-BE23-AB0FD4D62C03}" type="datetimeFigureOut">
               <a:rPr lang="en-US" smtClean="0"/>
-              <a:t>10/28/17</a:t>
+              <a:t>2017-10-28</a:t>
             </a:fld>
             <a:endParaRPr lang="en-US"/>
           </a:p>
@@ -1226,7 +1236,7 @@
           </a:lstStyle>
           <a:p>
             <a:r>
-              <a:rPr lang="de-DE" smtClean="0"/>
+              <a:rPr lang="de-DE"/>
               <a:t>Mastertitelformat bearbeiten</a:t>
             </a:r>
             <a:endParaRPr lang="en-US"/>
@@ -1346,7 +1356,7 @@
           <a:p>
             <a:pPr lvl="0"/>
             <a:r>
-              <a:rPr lang="de-DE" smtClean="0"/>
+              <a:rPr lang="de-DE"/>
               <a:t>Mastertextformat bearbeiten</a:t>
             </a:r>
           </a:p>
@@ -1369,7 +1379,7 @@
           <a:p>
             <a:fld id="{15680C8E-BD82-6C46-BE23-AB0FD4D62C03}" type="datetimeFigureOut">
               <a:rPr lang="en-US" smtClean="0"/>
-              <a:t>10/28/17</a:t>
+              <a:t>2017-10-28</a:t>
             </a:fld>
             <a:endParaRPr lang="en-US"/>
           </a:p>
@@ -1463,7 +1473,7 @@
           <a:lstStyle/>
           <a:p>
             <a:r>
-              <a:rPr lang="de-DE" smtClean="0"/>
+              <a:rPr lang="de-DE"/>
               <a:t>Mastertitelformat bearbeiten</a:t>
             </a:r>
             <a:endParaRPr lang="en-US"/>
@@ -1492,35 +1502,35 @@
           <a:p>
             <a:pPr lvl="0"/>
             <a:r>
-              <a:rPr lang="de-DE" smtClean="0"/>
+              <a:rPr lang="de-DE"/>
               <a:t>Mastertextformat bearbeiten</a:t>
             </a:r>
           </a:p>
           <a:p>
             <a:pPr lvl="1"/>
             <a:r>
-              <a:rPr lang="de-DE" smtClean="0"/>
+              <a:rPr lang="de-DE"/>
               <a:t>Zweite Ebene</a:t>
             </a:r>
           </a:p>
           <a:p>
             <a:pPr lvl="2"/>
             <a:r>
-              <a:rPr lang="de-DE" smtClean="0"/>
+              <a:rPr lang="de-DE"/>
               <a:t>Dritte Ebene</a:t>
             </a:r>
           </a:p>
           <a:p>
             <a:pPr lvl="3"/>
             <a:r>
-              <a:rPr lang="de-DE" smtClean="0"/>
+              <a:rPr lang="de-DE"/>
               <a:t>Vierte Ebene</a:t>
             </a:r>
           </a:p>
           <a:p>
             <a:pPr lvl="4"/>
             <a:r>
-              <a:rPr lang="de-DE" smtClean="0"/>
+              <a:rPr lang="de-DE"/>
               <a:t>Fünfte Ebene</a:t>
             </a:r>
             <a:endParaRPr lang="en-US"/>
@@ -1549,35 +1559,35 @@
           <a:p>
             <a:pPr lvl="0"/>
             <a:r>
-              <a:rPr lang="de-DE" smtClean="0"/>
+              <a:rPr lang="de-DE"/>
               <a:t>Mastertextformat bearbeiten</a:t>
             </a:r>
           </a:p>
           <a:p>
             <a:pPr lvl="1"/>
             <a:r>
-              <a:rPr lang="de-DE" smtClean="0"/>
+              <a:rPr lang="de-DE"/>
               <a:t>Zweite Ebene</a:t>
             </a:r>
           </a:p>
           <a:p>
             <a:pPr lvl="2"/>
             <a:r>
-              <a:rPr lang="de-DE" smtClean="0"/>
+              <a:rPr lang="de-DE"/>
               <a:t>Dritte Ebene</a:t>
             </a:r>
           </a:p>
           <a:p>
             <a:pPr lvl="3"/>
             <a:r>
-              <a:rPr lang="de-DE" smtClean="0"/>
+              <a:rPr lang="de-DE"/>
               <a:t>Vierte Ebene</a:t>
             </a:r>
           </a:p>
           <a:p>
             <a:pPr lvl="4"/>
             <a:r>
-              <a:rPr lang="de-DE" smtClean="0"/>
+              <a:rPr lang="de-DE"/>
               <a:t>Fünfte Ebene</a:t>
             </a:r>
             <a:endParaRPr lang="en-US"/>
@@ -1601,7 +1611,7 @@
           <a:p>
             <a:fld id="{15680C8E-BD82-6C46-BE23-AB0FD4D62C03}" type="datetimeFigureOut">
               <a:rPr lang="en-US" smtClean="0"/>
-              <a:t>10/28/17</a:t>
+              <a:t>2017-10-28</a:t>
             </a:fld>
             <a:endParaRPr lang="en-US"/>
           </a:p>
@@ -1700,7 +1710,7 @@
           <a:lstStyle/>
           <a:p>
             <a:r>
-              <a:rPr lang="de-DE" smtClean="0"/>
+              <a:rPr lang="de-DE"/>
               <a:t>Mastertitelformat bearbeiten</a:t>
             </a:r>
             <a:endParaRPr lang="en-US"/>
@@ -1766,7 +1776,7 @@
           <a:p>
             <a:pPr lvl="0"/>
             <a:r>
-              <a:rPr lang="de-DE" smtClean="0"/>
+              <a:rPr lang="de-DE"/>
               <a:t>Mastertextformat bearbeiten</a:t>
             </a:r>
           </a:p>
@@ -1794,35 +1804,35 @@
           <a:p>
             <a:pPr lvl="0"/>
             <a:r>
-              <a:rPr lang="de-DE" smtClean="0"/>
+              <a:rPr lang="de-DE"/>
               <a:t>Mastertextformat bearbeiten</a:t>
             </a:r>
           </a:p>
           <a:p>
             <a:pPr lvl="1"/>
             <a:r>
-              <a:rPr lang="de-DE" smtClean="0"/>
+              <a:rPr lang="de-DE"/>
               <a:t>Zweite Ebene</a:t>
             </a:r>
           </a:p>
           <a:p>
             <a:pPr lvl="2"/>
             <a:r>
-              <a:rPr lang="de-DE" smtClean="0"/>
+              <a:rPr lang="de-DE"/>
               <a:t>Dritte Ebene</a:t>
             </a:r>
           </a:p>
           <a:p>
             <a:pPr lvl="3"/>
             <a:r>
-              <a:rPr lang="de-DE" smtClean="0"/>
+              <a:rPr lang="de-DE"/>
               <a:t>Vierte Ebene</a:t>
             </a:r>
           </a:p>
           <a:p>
             <a:pPr lvl="4"/>
             <a:r>
-              <a:rPr lang="de-DE" smtClean="0"/>
+              <a:rPr lang="de-DE"/>
               <a:t>Fünfte Ebene</a:t>
             </a:r>
             <a:endParaRPr lang="en-US"/>
@@ -1888,7 +1898,7 @@
           <a:p>
             <a:pPr lvl="0"/>
             <a:r>
-              <a:rPr lang="de-DE" smtClean="0"/>
+              <a:rPr lang="de-DE"/>
               <a:t>Mastertextformat bearbeiten</a:t>
             </a:r>
           </a:p>
@@ -1916,35 +1926,35 @@
           <a:p>
             <a:pPr lvl="0"/>
             <a:r>
-              <a:rPr lang="de-DE" smtClean="0"/>
+              <a:rPr lang="de-DE"/>
               <a:t>Mastertextformat bearbeiten</a:t>
             </a:r>
           </a:p>
           <a:p>
             <a:pPr lvl="1"/>
             <a:r>
-              <a:rPr lang="de-DE" smtClean="0"/>
+              <a:rPr lang="de-DE"/>
               <a:t>Zweite Ebene</a:t>
             </a:r>
           </a:p>
           <a:p>
             <a:pPr lvl="2"/>
             <a:r>
-              <a:rPr lang="de-DE" smtClean="0"/>
+              <a:rPr lang="de-DE"/>
               <a:t>Dritte Ebene</a:t>
             </a:r>
           </a:p>
           <a:p>
             <a:pPr lvl="3"/>
             <a:r>
-              <a:rPr lang="de-DE" smtClean="0"/>
+              <a:rPr lang="de-DE"/>
               <a:t>Vierte Ebene</a:t>
             </a:r>
           </a:p>
           <a:p>
             <a:pPr lvl="4"/>
             <a:r>
-              <a:rPr lang="de-DE" smtClean="0"/>
+              <a:rPr lang="de-DE"/>
               <a:t>Fünfte Ebene</a:t>
             </a:r>
             <a:endParaRPr lang="en-US"/>
@@ -1968,7 +1978,7 @@
           <a:p>
             <a:fld id="{15680C8E-BD82-6C46-BE23-AB0FD4D62C03}" type="datetimeFigureOut">
               <a:rPr lang="en-US" smtClean="0"/>
-              <a:t>10/28/17</a:t>
+              <a:t>2017-10-28</a:t>
             </a:fld>
             <a:endParaRPr lang="en-US"/>
           </a:p>
@@ -2062,7 +2072,7 @@
           <a:lstStyle/>
           <a:p>
             <a:r>
-              <a:rPr lang="de-DE" smtClean="0"/>
+              <a:rPr lang="de-DE"/>
               <a:t>Mastertitelformat bearbeiten</a:t>
             </a:r>
             <a:endParaRPr lang="en-US"/>
@@ -2086,7 +2096,7 @@
           <a:p>
             <a:fld id="{15680C8E-BD82-6C46-BE23-AB0FD4D62C03}" type="datetimeFigureOut">
               <a:rPr lang="en-US" smtClean="0"/>
-              <a:t>10/28/17</a:t>
+              <a:t>2017-10-28</a:t>
             </a:fld>
             <a:endParaRPr lang="en-US"/>
           </a:p>
@@ -2181,7 +2191,7 @@
           <a:p>
             <a:fld id="{15680C8E-BD82-6C46-BE23-AB0FD4D62C03}" type="datetimeFigureOut">
               <a:rPr lang="en-US" smtClean="0"/>
-              <a:t>10/28/17</a:t>
+              <a:t>2017-10-28</a:t>
             </a:fld>
             <a:endParaRPr lang="en-US"/>
           </a:p>
@@ -2284,7 +2294,7 @@
           </a:lstStyle>
           <a:p>
             <a:r>
-              <a:rPr lang="de-DE" smtClean="0"/>
+              <a:rPr lang="de-DE"/>
               <a:t>Mastertitelformat bearbeiten</a:t>
             </a:r>
             <a:endParaRPr lang="en-US"/>
@@ -2341,35 +2351,35 @@
           <a:p>
             <a:pPr lvl="0"/>
             <a:r>
-              <a:rPr lang="de-DE" smtClean="0"/>
+              <a:rPr lang="de-DE"/>
               <a:t>Mastertextformat bearbeiten</a:t>
             </a:r>
           </a:p>
           <a:p>
             <a:pPr lvl="1"/>
             <a:r>
-              <a:rPr lang="de-DE" smtClean="0"/>
+              <a:rPr lang="de-DE"/>
               <a:t>Zweite Ebene</a:t>
             </a:r>
           </a:p>
           <a:p>
             <a:pPr lvl="2"/>
             <a:r>
-              <a:rPr lang="de-DE" smtClean="0"/>
+              <a:rPr lang="de-DE"/>
               <a:t>Dritte Ebene</a:t>
             </a:r>
           </a:p>
           <a:p>
             <a:pPr lvl="3"/>
             <a:r>
-              <a:rPr lang="de-DE" smtClean="0"/>
+              <a:rPr lang="de-DE"/>
               <a:t>Vierte Ebene</a:t>
             </a:r>
           </a:p>
           <a:p>
             <a:pPr lvl="4"/>
             <a:r>
-              <a:rPr lang="de-DE" smtClean="0"/>
+              <a:rPr lang="de-DE"/>
               <a:t>Fünfte Ebene</a:t>
             </a:r>
             <a:endParaRPr lang="en-US"/>
@@ -2435,7 +2445,7 @@
           <a:p>
             <a:pPr lvl="0"/>
             <a:r>
-              <a:rPr lang="de-DE" smtClean="0"/>
+              <a:rPr lang="de-DE"/>
               <a:t>Mastertextformat bearbeiten</a:t>
             </a:r>
           </a:p>
@@ -2458,7 +2468,7 @@
           <a:p>
             <a:fld id="{15680C8E-BD82-6C46-BE23-AB0FD4D62C03}" type="datetimeFigureOut">
               <a:rPr lang="en-US" smtClean="0"/>
-              <a:t>10/28/17</a:t>
+              <a:t>2017-10-28</a:t>
             </a:fld>
             <a:endParaRPr lang="en-US"/>
           </a:p>
@@ -2561,7 +2571,7 @@
           </a:lstStyle>
           <a:p>
             <a:r>
-              <a:rPr lang="de-DE" smtClean="0"/>
+              <a:rPr lang="de-DE"/>
               <a:t>Mastertitelformat bearbeiten</a:t>
             </a:r>
             <a:endParaRPr lang="en-US"/>
@@ -2688,7 +2698,7 @@
           <a:p>
             <a:pPr lvl="0"/>
             <a:r>
-              <a:rPr lang="de-DE" smtClean="0"/>
+              <a:rPr lang="de-DE"/>
               <a:t>Mastertextformat bearbeiten</a:t>
             </a:r>
           </a:p>
@@ -2711,7 +2721,7 @@
           <a:p>
             <a:fld id="{15680C8E-BD82-6C46-BE23-AB0FD4D62C03}" type="datetimeFigureOut">
               <a:rPr lang="en-US" smtClean="0"/>
-              <a:t>10/28/17</a:t>
+              <a:t>2017-10-28</a:t>
             </a:fld>
             <a:endParaRPr lang="en-US"/>
           </a:p>
@@ -2820,7 +2830,7 @@
           <a:lstStyle/>
           <a:p>
             <a:r>
-              <a:rPr lang="de-DE" smtClean="0"/>
+              <a:rPr lang="de-DE"/>
               <a:t>Mastertitelformat bearbeiten</a:t>
             </a:r>
             <a:endParaRPr lang="en-US"/>
@@ -2854,35 +2864,35 @@
           <a:p>
             <a:pPr lvl="0"/>
             <a:r>
-              <a:rPr lang="de-DE" smtClean="0"/>
+              <a:rPr lang="de-DE"/>
               <a:t>Mastertextformat bearbeiten</a:t>
             </a:r>
           </a:p>
           <a:p>
             <a:pPr lvl="1"/>
             <a:r>
-              <a:rPr lang="de-DE" smtClean="0"/>
+              <a:rPr lang="de-DE"/>
               <a:t>Zweite Ebene</a:t>
             </a:r>
           </a:p>
           <a:p>
             <a:pPr lvl="2"/>
             <a:r>
-              <a:rPr lang="de-DE" smtClean="0"/>
+              <a:rPr lang="de-DE"/>
               <a:t>Dritte Ebene</a:t>
             </a:r>
           </a:p>
           <a:p>
             <a:pPr lvl="3"/>
             <a:r>
-              <a:rPr lang="de-DE" smtClean="0"/>
+              <a:rPr lang="de-DE"/>
               <a:t>Vierte Ebene</a:t>
             </a:r>
           </a:p>
           <a:p>
             <a:pPr lvl="4"/>
             <a:r>
-              <a:rPr lang="de-DE" smtClean="0"/>
+              <a:rPr lang="de-DE"/>
               <a:t>Fünfte Ebene</a:t>
             </a:r>
             <a:endParaRPr lang="en-US"/>
@@ -2924,7 +2934,7 @@
           <a:p>
             <a:fld id="{15680C8E-BD82-6C46-BE23-AB0FD4D62C03}" type="datetimeFigureOut">
               <a:rPr lang="en-US" smtClean="0"/>
-              <a:t>10/28/17</a:t>
+              <a:t>2017-10-28</a:t>
             </a:fld>
             <a:endParaRPr lang="en-US"/>
           </a:p>
@@ -3329,33 +3339,68 @@
           <a:chExt cx="0" cy="0"/>
         </a:xfrm>
       </p:grpSpPr>
-      <p:pic>
-        <p:nvPicPr>
-          <p:cNvPr id="4" name="Bild 3"/>
-          <p:cNvPicPr>
-            <a:picLocks noChangeAspect="1"/>
-          </p:cNvPicPr>
-          <p:nvPr/>
-        </p:nvPicPr>
-        <p:blipFill rotWithShape="1">
-          <a:blip r:embed="rId2"/>
-          <a:srcRect t="5179"/>
-          <a:stretch/>
-        </p:blipFill>
-        <p:spPr>
-          <a:xfrm>
-            <a:off x="1924050" y="444500"/>
-            <a:ext cx="8343900" cy="5969000"/>
-          </a:xfrm>
-          <a:prstGeom prst="rect">
-            <a:avLst/>
-          </a:prstGeom>
-        </p:spPr>
-      </p:pic>
+      <p:sp>
+        <p:nvSpPr>
+          <p:cNvPr id="2" name="Title 1">
+            <a:extLst>
+              <a:ext uri="{FF2B5EF4-FFF2-40B4-BE49-F238E27FC236}">
+                <a16:creationId xmlns:a16="http://schemas.microsoft.com/office/drawing/2014/main" id="{0CE92C80-E364-4323-AC83-43E2A8783F58}"/>
+              </a:ext>
+            </a:extLst>
+          </p:cNvPr>
+          <p:cNvSpPr>
+            <a:spLocks noGrp="1"/>
+          </p:cNvSpPr>
+          <p:nvPr>
+            <p:ph type="ctrTitle"/>
+          </p:nvPr>
+        </p:nvSpPr>
+        <p:spPr/>
+        <p:txBody>
+          <a:bodyPr/>
+          <a:lstStyle/>
+          <a:p>
+            <a:r>
+              <a:rPr lang="de-CH" b="1" dirty="0"/>
+              <a:t>Smart Arosa</a:t>
+            </a:r>
+            <a:endParaRPr lang="de-CH" dirty="0"/>
+          </a:p>
+        </p:txBody>
+      </p:sp>
+      <p:sp>
+        <p:nvSpPr>
+          <p:cNvPr id="3" name="Content Placeholder 2">
+            <a:extLst>
+              <a:ext uri="{FF2B5EF4-FFF2-40B4-BE49-F238E27FC236}">
+                <a16:creationId xmlns:a16="http://schemas.microsoft.com/office/drawing/2014/main" id="{CE75E0A5-A215-4AAE-8711-CA279A9E2942}"/>
+              </a:ext>
+            </a:extLst>
+          </p:cNvPr>
+          <p:cNvSpPr>
+            <a:spLocks noGrp="1"/>
+          </p:cNvSpPr>
+          <p:nvPr>
+            <p:ph type="subTitle" idx="1"/>
+          </p:nvPr>
+        </p:nvSpPr>
+        <p:spPr/>
+        <p:txBody>
+          <a:bodyPr/>
+          <a:lstStyle/>
+          <a:p>
+            <a:r>
+              <a:rPr lang="en-US" dirty="0"/>
+              <a:t>Connecting the physical space with the information space</a:t>
+            </a:r>
+            <a:endParaRPr lang="de-CH" dirty="0"/>
+          </a:p>
+        </p:txBody>
+      </p:sp>
     </p:spTree>
     <p:extLst>
       <p:ext uri="{BB962C8B-B14F-4D97-AF65-F5344CB8AC3E}">
-        <p14:creationId xmlns:p14="http://schemas.microsoft.com/office/powerpoint/2010/main" val="1906082872"/>
+        <p14:creationId xmlns:p14="http://schemas.microsoft.com/office/powerpoint/2010/main" val="3418579470"/>
       </p:ext>
     </p:extLst>
   </p:cSld>
@@ -3365,689 +3410,7 @@
 </p:sld>
 </file>
 
-<file path=ppt/slides/slide2.xml><?xml version="1.0" encoding="utf-8"?>
-<p:sld xmlns:a="http://schemas.openxmlformats.org/drawingml/2006/main" xmlns:r="http://schemas.openxmlformats.org/officeDocument/2006/relationships" xmlns:p="http://schemas.openxmlformats.org/presentationml/2006/main">
-  <p:cSld>
-    <p:spTree>
-      <p:nvGrpSpPr>
-        <p:cNvPr id="1" name=""/>
-        <p:cNvGrpSpPr/>
-        <p:nvPr/>
-      </p:nvGrpSpPr>
-      <p:grpSpPr>
-        <a:xfrm>
-          <a:off x="0" y="0"/>
-          <a:ext cx="0" cy="0"/>
-          <a:chOff x="0" y="0"/>
-          <a:chExt cx="0" cy="0"/>
-        </a:xfrm>
-      </p:grpSpPr>
-      <p:sp>
-        <p:nvSpPr>
-          <p:cNvPr id="2" name="Titel 1"/>
-          <p:cNvSpPr>
-            <a:spLocks noGrp="1"/>
-          </p:cNvSpPr>
-          <p:nvPr>
-            <p:ph type="ctrTitle"/>
-          </p:nvPr>
-        </p:nvSpPr>
-        <p:spPr/>
-        <p:txBody>
-          <a:bodyPr/>
-          <a:lstStyle/>
-          <a:p>
-            <a:endParaRPr lang="en-US"/>
-          </a:p>
-        </p:txBody>
-      </p:sp>
-      <p:sp>
-        <p:nvSpPr>
-          <p:cNvPr id="3" name="Untertitel 2"/>
-          <p:cNvSpPr>
-            <a:spLocks noGrp="1"/>
-          </p:cNvSpPr>
-          <p:nvPr>
-            <p:ph type="subTitle" idx="1"/>
-          </p:nvPr>
-        </p:nvSpPr>
-        <p:spPr/>
-        <p:txBody>
-          <a:bodyPr/>
-          <a:lstStyle/>
-          <a:p>
-            <a:endParaRPr lang="en-US"/>
-          </a:p>
-        </p:txBody>
-      </p:sp>
-      <p:pic>
-        <p:nvPicPr>
-          <p:cNvPr id="4" name="Bild 3"/>
-          <p:cNvPicPr>
-            <a:picLocks noChangeAspect="1"/>
-          </p:cNvPicPr>
-          <p:nvPr/>
-        </p:nvPicPr>
-        <p:blipFill rotWithShape="1">
-          <a:blip r:embed="rId2"/>
-          <a:srcRect t="5723"/>
-          <a:stretch/>
-        </p:blipFill>
-        <p:spPr>
-          <a:xfrm>
-            <a:off x="1285460" y="389466"/>
-            <a:ext cx="9512577" cy="6415573"/>
-          </a:xfrm>
-          <a:prstGeom prst="rect">
-            <a:avLst/>
-          </a:prstGeom>
-        </p:spPr>
-      </p:pic>
-      <p:sp>
-        <p:nvSpPr>
-          <p:cNvPr id="5" name="Oval 4"/>
-          <p:cNvSpPr/>
-          <p:nvPr/>
-        </p:nvSpPr>
-        <p:spPr>
-          <a:xfrm>
-            <a:off x="5408226" y="2801620"/>
-            <a:ext cx="1296035" cy="1254760"/>
-          </a:xfrm>
-          <a:prstGeom prst="ellipse">
-            <a:avLst/>
-          </a:prstGeom>
-          <a:solidFill>
-            <a:schemeClr val="accent1">
-              <a:alpha val="20000"/>
-            </a:schemeClr>
-          </a:solidFill>
-        </p:spPr>
-        <p:style>
-          <a:lnRef idx="2">
-            <a:schemeClr val="accent1">
-              <a:shade val="50000"/>
-            </a:schemeClr>
-          </a:lnRef>
-          <a:fillRef idx="1">
-            <a:schemeClr val="accent1"/>
-          </a:fillRef>
-          <a:effectRef idx="0">
-            <a:schemeClr val="accent1"/>
-          </a:effectRef>
-          <a:fontRef idx="minor">
-            <a:schemeClr val="lt1"/>
-          </a:fontRef>
-        </p:style>
-        <p:txBody>
-          <a:bodyPr rot="0" spcFirstLastPara="0" vert="horz" wrap="square" lIns="91440" tIns="45720" rIns="91440" bIns="45720" numCol="1" spcCol="0" rtlCol="0" fromWordArt="0" anchor="ctr" anchorCtr="0" forceAA="0" compatLnSpc="1">
-            <a:prstTxWarp prst="textNoShape">
-              <a:avLst/>
-            </a:prstTxWarp>
-            <a:noAutofit/>
-          </a:bodyPr>
-          <a:lstStyle/>
-          <a:p>
-            <a:endParaRPr lang="de-DE"/>
-          </a:p>
-        </p:txBody>
-      </p:sp>
-      <p:sp>
-        <p:nvSpPr>
-          <p:cNvPr id="6" name="Oval 5"/>
-          <p:cNvSpPr/>
-          <p:nvPr/>
-        </p:nvSpPr>
-        <p:spPr>
-          <a:xfrm>
-            <a:off x="4009469" y="3028823"/>
-            <a:ext cx="1296035" cy="1254760"/>
-          </a:xfrm>
-          <a:prstGeom prst="ellipse">
-            <a:avLst/>
-          </a:prstGeom>
-          <a:solidFill>
-            <a:schemeClr val="accent1">
-              <a:alpha val="20000"/>
-            </a:schemeClr>
-          </a:solidFill>
-        </p:spPr>
-        <p:style>
-          <a:lnRef idx="2">
-            <a:schemeClr val="accent1">
-              <a:shade val="50000"/>
-            </a:schemeClr>
-          </a:lnRef>
-          <a:fillRef idx="1">
-            <a:schemeClr val="accent1"/>
-          </a:fillRef>
-          <a:effectRef idx="0">
-            <a:schemeClr val="accent1"/>
-          </a:effectRef>
-          <a:fontRef idx="minor">
-            <a:schemeClr val="lt1"/>
-          </a:fontRef>
-        </p:style>
-        <p:txBody>
-          <a:bodyPr rot="0" spcFirstLastPara="0" vert="horz" wrap="square" lIns="91440" tIns="45720" rIns="91440" bIns="45720" numCol="1" spcCol="0" rtlCol="0" fromWordArt="0" anchor="ctr" anchorCtr="0" forceAA="0" compatLnSpc="1">
-            <a:prstTxWarp prst="textNoShape">
-              <a:avLst/>
-            </a:prstTxWarp>
-            <a:noAutofit/>
-          </a:bodyPr>
-          <a:lstStyle/>
-          <a:p>
-            <a:endParaRPr lang="de-DE"/>
-          </a:p>
-        </p:txBody>
-      </p:sp>
-      <p:sp>
-        <p:nvSpPr>
-          <p:cNvPr id="7" name="Oval 6"/>
-          <p:cNvSpPr/>
-          <p:nvPr/>
-        </p:nvSpPr>
-        <p:spPr>
-          <a:xfrm>
-            <a:off x="2320469" y="2546647"/>
-            <a:ext cx="1296035" cy="1254760"/>
-          </a:xfrm>
-          <a:prstGeom prst="ellipse">
-            <a:avLst/>
-          </a:prstGeom>
-          <a:solidFill>
-            <a:schemeClr val="accent1">
-              <a:alpha val="20000"/>
-            </a:schemeClr>
-          </a:solidFill>
-        </p:spPr>
-        <p:style>
-          <a:lnRef idx="2">
-            <a:schemeClr val="accent1">
-              <a:shade val="50000"/>
-            </a:schemeClr>
-          </a:lnRef>
-          <a:fillRef idx="1">
-            <a:schemeClr val="accent1"/>
-          </a:fillRef>
-          <a:effectRef idx="0">
-            <a:schemeClr val="accent1"/>
-          </a:effectRef>
-          <a:fontRef idx="minor">
-            <a:schemeClr val="lt1"/>
-          </a:fontRef>
-        </p:style>
-        <p:txBody>
-          <a:bodyPr rot="0" spcFirstLastPara="0" vert="horz" wrap="square" lIns="91440" tIns="45720" rIns="91440" bIns="45720" numCol="1" spcCol="0" rtlCol="0" fromWordArt="0" anchor="ctr" anchorCtr="0" forceAA="0" compatLnSpc="1">
-            <a:prstTxWarp prst="textNoShape">
-              <a:avLst/>
-            </a:prstTxWarp>
-            <a:noAutofit/>
-          </a:bodyPr>
-          <a:lstStyle/>
-          <a:p>
-            <a:endParaRPr lang="de-DE"/>
-          </a:p>
-        </p:txBody>
-      </p:sp>
-      <p:sp>
-        <p:nvSpPr>
-          <p:cNvPr id="8" name="Oval 7"/>
-          <p:cNvSpPr/>
-          <p:nvPr/>
-        </p:nvSpPr>
-        <p:spPr>
-          <a:xfrm>
-            <a:off x="7790972" y="1832831"/>
-            <a:ext cx="1296035" cy="1254760"/>
-          </a:xfrm>
-          <a:prstGeom prst="ellipse">
-            <a:avLst/>
-          </a:prstGeom>
-          <a:solidFill>
-            <a:schemeClr val="accent1">
-              <a:alpha val="20000"/>
-            </a:schemeClr>
-          </a:solidFill>
-        </p:spPr>
-        <p:style>
-          <a:lnRef idx="2">
-            <a:schemeClr val="accent1">
-              <a:shade val="50000"/>
-            </a:schemeClr>
-          </a:lnRef>
-          <a:fillRef idx="1">
-            <a:schemeClr val="accent1"/>
-          </a:fillRef>
-          <a:effectRef idx="0">
-            <a:schemeClr val="accent1"/>
-          </a:effectRef>
-          <a:fontRef idx="minor">
-            <a:schemeClr val="lt1"/>
-          </a:fontRef>
-        </p:style>
-        <p:txBody>
-          <a:bodyPr rot="0" spcFirstLastPara="0" vert="horz" wrap="square" lIns="91440" tIns="45720" rIns="91440" bIns="45720" numCol="1" spcCol="0" rtlCol="0" fromWordArt="0" anchor="ctr" anchorCtr="0" forceAA="0" compatLnSpc="1">
-            <a:prstTxWarp prst="textNoShape">
-              <a:avLst/>
-            </a:prstTxWarp>
-            <a:noAutofit/>
-          </a:bodyPr>
-          <a:lstStyle/>
-          <a:p>
-            <a:endParaRPr lang="de-DE"/>
-          </a:p>
-        </p:txBody>
-      </p:sp>
-      <p:sp>
-        <p:nvSpPr>
-          <p:cNvPr id="9" name="Oval 8"/>
-          <p:cNvSpPr/>
-          <p:nvPr/>
-        </p:nvSpPr>
-        <p:spPr>
-          <a:xfrm>
-            <a:off x="2761774" y="4000776"/>
-            <a:ext cx="1296035" cy="1254760"/>
-          </a:xfrm>
-          <a:prstGeom prst="ellipse">
-            <a:avLst/>
-          </a:prstGeom>
-          <a:solidFill>
-            <a:schemeClr val="accent1">
-              <a:alpha val="20000"/>
-            </a:schemeClr>
-          </a:solidFill>
-        </p:spPr>
-        <p:style>
-          <a:lnRef idx="2">
-            <a:schemeClr val="accent1">
-              <a:shade val="50000"/>
-            </a:schemeClr>
-          </a:lnRef>
-          <a:fillRef idx="1">
-            <a:schemeClr val="accent1"/>
-          </a:fillRef>
-          <a:effectRef idx="0">
-            <a:schemeClr val="accent1"/>
-          </a:effectRef>
-          <a:fontRef idx="minor">
-            <a:schemeClr val="lt1"/>
-          </a:fontRef>
-        </p:style>
-        <p:txBody>
-          <a:bodyPr rot="0" spcFirstLastPara="0" vert="horz" wrap="square" lIns="91440" tIns="45720" rIns="91440" bIns="45720" numCol="1" spcCol="0" rtlCol="0" fromWordArt="0" anchor="ctr" anchorCtr="0" forceAA="0" compatLnSpc="1">
-            <a:prstTxWarp prst="textNoShape">
-              <a:avLst/>
-            </a:prstTxWarp>
-            <a:noAutofit/>
-          </a:bodyPr>
-          <a:lstStyle/>
-          <a:p>
-            <a:endParaRPr lang="de-DE"/>
-          </a:p>
-        </p:txBody>
-      </p:sp>
-      <p:sp>
-        <p:nvSpPr>
-          <p:cNvPr id="10" name="Oval 9"/>
-          <p:cNvSpPr/>
-          <p:nvPr/>
-        </p:nvSpPr>
-        <p:spPr>
-          <a:xfrm>
-            <a:off x="7018365" y="4429919"/>
-            <a:ext cx="1296035" cy="1254760"/>
-          </a:xfrm>
-          <a:prstGeom prst="ellipse">
-            <a:avLst/>
-          </a:prstGeom>
-          <a:solidFill>
-            <a:schemeClr val="accent1">
-              <a:alpha val="20000"/>
-            </a:schemeClr>
-          </a:solidFill>
-        </p:spPr>
-        <p:style>
-          <a:lnRef idx="2">
-            <a:schemeClr val="accent1">
-              <a:shade val="50000"/>
-            </a:schemeClr>
-          </a:lnRef>
-          <a:fillRef idx="1">
-            <a:schemeClr val="accent1"/>
-          </a:fillRef>
-          <a:effectRef idx="0">
-            <a:schemeClr val="accent1"/>
-          </a:effectRef>
-          <a:fontRef idx="minor">
-            <a:schemeClr val="lt1"/>
-          </a:fontRef>
-        </p:style>
-        <p:txBody>
-          <a:bodyPr rot="0" spcFirstLastPara="0" vert="horz" wrap="square" lIns="91440" tIns="45720" rIns="91440" bIns="45720" numCol="1" spcCol="0" rtlCol="0" fromWordArt="0" anchor="ctr" anchorCtr="0" forceAA="0" compatLnSpc="1">
-            <a:prstTxWarp prst="textNoShape">
-              <a:avLst/>
-            </a:prstTxWarp>
-            <a:noAutofit/>
-          </a:bodyPr>
-          <a:lstStyle/>
-          <a:p>
-            <a:endParaRPr lang="de-DE"/>
-          </a:p>
-        </p:txBody>
-      </p:sp>
-      <p:sp>
-        <p:nvSpPr>
-          <p:cNvPr id="11" name="Oval 10"/>
-          <p:cNvSpPr/>
-          <p:nvPr/>
-        </p:nvSpPr>
-        <p:spPr>
-          <a:xfrm>
-            <a:off x="6744017" y="2649220"/>
-            <a:ext cx="1296035" cy="1254760"/>
-          </a:xfrm>
-          <a:prstGeom prst="ellipse">
-            <a:avLst/>
-          </a:prstGeom>
-          <a:solidFill>
-            <a:schemeClr val="accent1">
-              <a:alpha val="20000"/>
-            </a:schemeClr>
-          </a:solidFill>
-        </p:spPr>
-        <p:style>
-          <a:lnRef idx="2">
-            <a:schemeClr val="accent1">
-              <a:shade val="50000"/>
-            </a:schemeClr>
-          </a:lnRef>
-          <a:fillRef idx="1">
-            <a:schemeClr val="accent1"/>
-          </a:fillRef>
-          <a:effectRef idx="0">
-            <a:schemeClr val="accent1"/>
-          </a:effectRef>
-          <a:fontRef idx="minor">
-            <a:schemeClr val="lt1"/>
-          </a:fontRef>
-        </p:style>
-        <p:txBody>
-          <a:bodyPr rot="0" spcFirstLastPara="0" vert="horz" wrap="square" lIns="91440" tIns="45720" rIns="91440" bIns="45720" numCol="1" spcCol="0" rtlCol="0" fromWordArt="0" anchor="ctr" anchorCtr="0" forceAA="0" compatLnSpc="1">
-            <a:prstTxWarp prst="textNoShape">
-              <a:avLst/>
-            </a:prstTxWarp>
-            <a:noAutofit/>
-          </a:bodyPr>
-          <a:lstStyle/>
-          <a:p>
-            <a:endParaRPr lang="de-DE"/>
-          </a:p>
-        </p:txBody>
-      </p:sp>
-      <p:sp>
-        <p:nvSpPr>
-          <p:cNvPr id="12" name="Oval 11"/>
-          <p:cNvSpPr/>
-          <p:nvPr/>
-        </p:nvSpPr>
-        <p:spPr>
-          <a:xfrm>
-            <a:off x="2191930" y="5349875"/>
-            <a:ext cx="1296035" cy="1254760"/>
-          </a:xfrm>
-          <a:prstGeom prst="ellipse">
-            <a:avLst/>
-          </a:prstGeom>
-          <a:solidFill>
-            <a:schemeClr val="accent1">
-              <a:alpha val="20000"/>
-            </a:schemeClr>
-          </a:solidFill>
-        </p:spPr>
-        <p:style>
-          <a:lnRef idx="2">
-            <a:schemeClr val="accent1">
-              <a:shade val="50000"/>
-            </a:schemeClr>
-          </a:lnRef>
-          <a:fillRef idx="1">
-            <a:schemeClr val="accent1"/>
-          </a:fillRef>
-          <a:effectRef idx="0">
-            <a:schemeClr val="accent1"/>
-          </a:effectRef>
-          <a:fontRef idx="minor">
-            <a:schemeClr val="lt1"/>
-          </a:fontRef>
-        </p:style>
-        <p:txBody>
-          <a:bodyPr rot="0" spcFirstLastPara="0" vert="horz" wrap="square" lIns="91440" tIns="45720" rIns="91440" bIns="45720" numCol="1" spcCol="0" rtlCol="0" fromWordArt="0" anchor="ctr" anchorCtr="0" forceAA="0" compatLnSpc="1">
-            <a:prstTxWarp prst="textNoShape">
-              <a:avLst/>
-            </a:prstTxWarp>
-            <a:noAutofit/>
-          </a:bodyPr>
-          <a:lstStyle/>
-          <a:p>
-            <a:endParaRPr lang="de-DE"/>
-          </a:p>
-        </p:txBody>
-      </p:sp>
-      <p:sp>
-        <p:nvSpPr>
-          <p:cNvPr id="13" name="Oval 12"/>
-          <p:cNvSpPr/>
-          <p:nvPr/>
-        </p:nvSpPr>
-        <p:spPr>
-          <a:xfrm>
-            <a:off x="4664765" y="4619342"/>
-            <a:ext cx="1296035" cy="1254760"/>
-          </a:xfrm>
-          <a:prstGeom prst="ellipse">
-            <a:avLst/>
-          </a:prstGeom>
-          <a:solidFill>
-            <a:schemeClr val="accent1">
-              <a:alpha val="20000"/>
-            </a:schemeClr>
-          </a:solidFill>
-        </p:spPr>
-        <p:style>
-          <a:lnRef idx="2">
-            <a:schemeClr val="accent1">
-              <a:shade val="50000"/>
-            </a:schemeClr>
-          </a:lnRef>
-          <a:fillRef idx="1">
-            <a:schemeClr val="accent1"/>
-          </a:fillRef>
-          <a:effectRef idx="0">
-            <a:schemeClr val="accent1"/>
-          </a:effectRef>
-          <a:fontRef idx="minor">
-            <a:schemeClr val="lt1"/>
-          </a:fontRef>
-        </p:style>
-        <p:txBody>
-          <a:bodyPr rot="0" spcFirstLastPara="0" vert="horz" wrap="square" lIns="91440" tIns="45720" rIns="91440" bIns="45720" numCol="1" spcCol="0" rtlCol="0" fromWordArt="0" anchor="ctr" anchorCtr="0" forceAA="0" compatLnSpc="1">
-            <a:prstTxWarp prst="textNoShape">
-              <a:avLst/>
-            </a:prstTxWarp>
-            <a:noAutofit/>
-          </a:bodyPr>
-          <a:lstStyle/>
-          <a:p>
-            <a:endParaRPr lang="de-DE"/>
-          </a:p>
-        </p:txBody>
-      </p:sp>
-      <p:sp>
-        <p:nvSpPr>
-          <p:cNvPr id="14" name="Oval 13"/>
-          <p:cNvSpPr/>
-          <p:nvPr/>
-        </p:nvSpPr>
-        <p:spPr>
-          <a:xfrm>
-            <a:off x="2320468" y="1207125"/>
-            <a:ext cx="1296035" cy="1254760"/>
-          </a:xfrm>
-          <a:prstGeom prst="ellipse">
-            <a:avLst/>
-          </a:prstGeom>
-          <a:solidFill>
-            <a:schemeClr val="accent1">
-              <a:alpha val="20000"/>
-            </a:schemeClr>
-          </a:solidFill>
-        </p:spPr>
-        <p:style>
-          <a:lnRef idx="2">
-            <a:schemeClr val="accent1">
-              <a:shade val="50000"/>
-            </a:schemeClr>
-          </a:lnRef>
-          <a:fillRef idx="1">
-            <a:schemeClr val="accent1"/>
-          </a:fillRef>
-          <a:effectRef idx="0">
-            <a:schemeClr val="accent1"/>
-          </a:effectRef>
-          <a:fontRef idx="minor">
-            <a:schemeClr val="lt1"/>
-          </a:fontRef>
-        </p:style>
-        <p:txBody>
-          <a:bodyPr rot="0" spcFirstLastPara="0" vert="horz" wrap="square" lIns="91440" tIns="45720" rIns="91440" bIns="45720" numCol="1" spcCol="0" rtlCol="0" fromWordArt="0" anchor="ctr" anchorCtr="0" forceAA="0" compatLnSpc="1">
-            <a:prstTxWarp prst="textNoShape">
-              <a:avLst/>
-            </a:prstTxWarp>
-            <a:noAutofit/>
-          </a:bodyPr>
-          <a:lstStyle/>
-          <a:p>
-            <a:endParaRPr lang="de-DE"/>
-          </a:p>
-        </p:txBody>
-      </p:sp>
-    </p:spTree>
-    <p:extLst>
-      <p:ext uri="{BB962C8B-B14F-4D97-AF65-F5344CB8AC3E}">
-        <p14:creationId xmlns:p14="http://schemas.microsoft.com/office/powerpoint/2010/main" val="686632633"/>
-      </p:ext>
-    </p:extLst>
-  </p:cSld>
-  <p:clrMapOvr>
-    <a:masterClrMapping/>
-  </p:clrMapOvr>
-</p:sld>
-</file>
-
-<file path=ppt/slides/slide3.xml><?xml version="1.0" encoding="utf-8"?>
-<p:sld xmlns:a="http://schemas.openxmlformats.org/drawingml/2006/main" xmlns:r="http://schemas.openxmlformats.org/officeDocument/2006/relationships" xmlns:p="http://schemas.openxmlformats.org/presentationml/2006/main">
-  <p:cSld>
-    <p:spTree>
-      <p:nvGrpSpPr>
-        <p:cNvPr id="1" name=""/>
-        <p:cNvGrpSpPr/>
-        <p:nvPr/>
-      </p:nvGrpSpPr>
-      <p:grpSpPr>
-        <a:xfrm>
-          <a:off x="0" y="0"/>
-          <a:ext cx="0" cy="0"/>
-          <a:chOff x="0" y="0"/>
-          <a:chExt cx="0" cy="0"/>
-        </a:xfrm>
-      </p:grpSpPr>
-      <p:sp>
-        <p:nvSpPr>
-          <p:cNvPr id="2" name="Titel 1"/>
-          <p:cNvSpPr>
-            <a:spLocks noGrp="1"/>
-          </p:cNvSpPr>
-          <p:nvPr>
-            <p:ph type="title"/>
-          </p:nvPr>
-        </p:nvSpPr>
-        <p:spPr/>
-        <p:txBody>
-          <a:bodyPr/>
-          <a:lstStyle/>
-          <a:p>
-            <a:r>
-              <a:rPr lang="en-US" dirty="0" smtClean="0"/>
-              <a:t>Notification Preferences</a:t>
-            </a:r>
-            <a:endParaRPr lang="en-US" dirty="0"/>
-          </a:p>
-        </p:txBody>
-      </p:sp>
-      <p:pic>
-        <p:nvPicPr>
-          <p:cNvPr id="4" name="Bild 3"/>
-          <p:cNvPicPr>
-            <a:picLocks noChangeAspect="1"/>
-          </p:cNvPicPr>
-          <p:nvPr/>
-        </p:nvPicPr>
-        <p:blipFill>
-          <a:blip r:embed="rId2"/>
-          <a:stretch>
-            <a:fillRect/>
-          </a:stretch>
-        </p:blipFill>
-        <p:spPr>
-          <a:xfrm>
-            <a:off x="838199" y="1825625"/>
-            <a:ext cx="4575483" cy="3753540"/>
-          </a:xfrm>
-          <a:prstGeom prst="rect">
-            <a:avLst/>
-          </a:prstGeom>
-        </p:spPr>
-      </p:pic>
-      <p:pic>
-        <p:nvPicPr>
-          <p:cNvPr id="5" name="Bild 4"/>
-          <p:cNvPicPr>
-            <a:picLocks noChangeAspect="1"/>
-          </p:cNvPicPr>
-          <p:nvPr/>
-        </p:nvPicPr>
-        <p:blipFill>
-          <a:blip r:embed="rId3"/>
-          <a:stretch>
-            <a:fillRect/>
-          </a:stretch>
-        </p:blipFill>
-        <p:spPr>
-          <a:xfrm>
-            <a:off x="6641326" y="1825625"/>
-            <a:ext cx="4712474" cy="3753540"/>
-          </a:xfrm>
-          <a:prstGeom prst="rect">
-            <a:avLst/>
-          </a:prstGeom>
-        </p:spPr>
-      </p:pic>
-    </p:spTree>
-    <p:extLst>
-      <p:ext uri="{BB962C8B-B14F-4D97-AF65-F5344CB8AC3E}">
-        <p14:creationId xmlns:p14="http://schemas.microsoft.com/office/powerpoint/2010/main" val="504889330"/>
-      </p:ext>
-    </p:extLst>
-  </p:cSld>
-  <p:clrMapOvr>
-    <a:masterClrMapping/>
-  </p:clrMapOvr>
-</p:sld>
-</file>
-
-<file path=ppt/slides/slide4.xml><?xml version="1.0" encoding="utf-8"?>
+<file path=ppt/slides/slide10.xml><?xml version="1.0" encoding="utf-8"?>
 <p:sld xmlns:a="http://schemas.openxmlformats.org/drawingml/2006/main" xmlns:r="http://schemas.openxmlformats.org/officeDocument/2006/relationships" xmlns:p="http://schemas.openxmlformats.org/presentationml/2006/main">
   <p:cSld>
     <p:spTree>
@@ -4551,6 +3914,818 @@
 </p:sld>
 </file>
 
+<file path=ppt/slides/slide11.xml><?xml version="1.0" encoding="utf-8"?>
+<p:sld xmlns:a="http://schemas.openxmlformats.org/drawingml/2006/main" xmlns:r="http://schemas.openxmlformats.org/officeDocument/2006/relationships" xmlns:p="http://schemas.openxmlformats.org/presentationml/2006/main">
+  <p:cSld>
+    <p:spTree>
+      <p:nvGrpSpPr>
+        <p:cNvPr id="1" name=""/>
+        <p:cNvGrpSpPr/>
+        <p:nvPr/>
+      </p:nvGrpSpPr>
+      <p:grpSpPr>
+        <a:xfrm>
+          <a:off x="0" y="0"/>
+          <a:ext cx="0" cy="0"/>
+          <a:chOff x="0" y="0"/>
+          <a:chExt cx="0" cy="0"/>
+        </a:xfrm>
+      </p:grpSpPr>
+      <p:sp>
+        <p:nvSpPr>
+          <p:cNvPr id="2" name="Titel 1"/>
+          <p:cNvSpPr>
+            <a:spLocks noGrp="1"/>
+          </p:cNvSpPr>
+          <p:nvPr>
+            <p:ph type="ctrTitle"/>
+          </p:nvPr>
+        </p:nvSpPr>
+        <p:spPr/>
+        <p:txBody>
+          <a:bodyPr/>
+          <a:lstStyle/>
+          <a:p>
+            <a:endParaRPr lang="en-US"/>
+          </a:p>
+        </p:txBody>
+      </p:sp>
+      <p:sp>
+        <p:nvSpPr>
+          <p:cNvPr id="3" name="Untertitel 2"/>
+          <p:cNvSpPr>
+            <a:spLocks noGrp="1"/>
+          </p:cNvSpPr>
+          <p:nvPr>
+            <p:ph type="subTitle" idx="1"/>
+          </p:nvPr>
+        </p:nvSpPr>
+        <p:spPr/>
+        <p:txBody>
+          <a:bodyPr/>
+          <a:lstStyle/>
+          <a:p>
+            <a:endParaRPr lang="en-US"/>
+          </a:p>
+        </p:txBody>
+      </p:sp>
+      <p:pic>
+        <p:nvPicPr>
+          <p:cNvPr id="4" name="Bild 3"/>
+          <p:cNvPicPr>
+            <a:picLocks noChangeAspect="1"/>
+          </p:cNvPicPr>
+          <p:nvPr/>
+        </p:nvPicPr>
+        <p:blipFill rotWithShape="1">
+          <a:blip r:embed="rId2"/>
+          <a:srcRect t="5226"/>
+          <a:stretch/>
+        </p:blipFill>
+        <p:spPr>
+          <a:xfrm>
+            <a:off x="1285460" y="355600"/>
+            <a:ext cx="9512577" cy="6449440"/>
+          </a:xfrm>
+          <a:prstGeom prst="rect">
+            <a:avLst/>
+          </a:prstGeom>
+        </p:spPr>
+      </p:pic>
+      <p:pic>
+        <p:nvPicPr>
+          <p:cNvPr id="30" name="Bild 29"/>
+          <p:cNvPicPr>
+            <a:picLocks noChangeAspect="1"/>
+          </p:cNvPicPr>
+          <p:nvPr/>
+        </p:nvPicPr>
+        <p:blipFill>
+          <a:blip r:embed="rId3"/>
+          <a:stretch>
+            <a:fillRect/>
+          </a:stretch>
+        </p:blipFill>
+        <p:spPr>
+          <a:xfrm>
+            <a:off x="2459401" y="5755287"/>
+            <a:ext cx="734372" cy="730527"/>
+          </a:xfrm>
+          <a:prstGeom prst="rect">
+            <a:avLst/>
+          </a:prstGeom>
+          <a:ln w="127000">
+            <a:solidFill>
+              <a:schemeClr val="accent5">
+                <a:lumMod val="75000"/>
+              </a:schemeClr>
+            </a:solidFill>
+          </a:ln>
+        </p:spPr>
+      </p:pic>
+      <p:sp>
+        <p:nvSpPr>
+          <p:cNvPr id="21" name="Oval 20"/>
+          <p:cNvSpPr/>
+          <p:nvPr/>
+        </p:nvSpPr>
+        <p:spPr>
+          <a:xfrm>
+            <a:off x="2320469" y="2546647"/>
+            <a:ext cx="1296035" cy="1254760"/>
+          </a:xfrm>
+          <a:prstGeom prst="ellipse">
+            <a:avLst/>
+          </a:prstGeom>
+          <a:solidFill>
+            <a:schemeClr val="accent1">
+              <a:alpha val="20000"/>
+            </a:schemeClr>
+          </a:solidFill>
+        </p:spPr>
+        <p:style>
+          <a:lnRef idx="2">
+            <a:schemeClr val="accent1">
+              <a:shade val="50000"/>
+            </a:schemeClr>
+          </a:lnRef>
+          <a:fillRef idx="1">
+            <a:schemeClr val="accent1"/>
+          </a:fillRef>
+          <a:effectRef idx="0">
+            <a:schemeClr val="accent1"/>
+          </a:effectRef>
+          <a:fontRef idx="minor">
+            <a:schemeClr val="lt1"/>
+          </a:fontRef>
+        </p:style>
+        <p:txBody>
+          <a:bodyPr rot="0" spcFirstLastPara="0" vert="horz" wrap="square" lIns="91440" tIns="45720" rIns="91440" bIns="45720" numCol="1" spcCol="0" rtlCol="0" fromWordArt="0" anchor="ctr" anchorCtr="0" forceAA="0" compatLnSpc="1">
+            <a:prstTxWarp prst="textNoShape">
+              <a:avLst/>
+            </a:prstTxWarp>
+            <a:noAutofit/>
+          </a:bodyPr>
+          <a:lstStyle/>
+          <a:p>
+            <a:endParaRPr lang="de-DE"/>
+          </a:p>
+        </p:txBody>
+      </p:sp>
+      <p:pic>
+        <p:nvPicPr>
+          <p:cNvPr id="22" name="Bild 21"/>
+          <p:cNvPicPr>
+            <a:picLocks noChangeAspect="1"/>
+          </p:cNvPicPr>
+          <p:nvPr/>
+        </p:nvPicPr>
+        <p:blipFill>
+          <a:blip r:embed="rId3"/>
+          <a:stretch>
+            <a:fillRect/>
+          </a:stretch>
+        </p:blipFill>
+        <p:spPr>
+          <a:xfrm>
+            <a:off x="7911935" y="757099"/>
+            <a:ext cx="734372" cy="730527"/>
+          </a:xfrm>
+          <a:prstGeom prst="rect">
+            <a:avLst/>
+          </a:prstGeom>
+          <a:solidFill>
+            <a:schemeClr val="bg1"/>
+          </a:solidFill>
+          <a:ln w="127000">
+            <a:solidFill>
+              <a:srgbClr val="00B050"/>
+            </a:solidFill>
+          </a:ln>
+        </p:spPr>
+      </p:pic>
+      <p:sp>
+        <p:nvSpPr>
+          <p:cNvPr id="6" name="Rechteck 5"/>
+          <p:cNvSpPr/>
+          <p:nvPr/>
+        </p:nvSpPr>
+        <p:spPr>
+          <a:xfrm>
+            <a:off x="4284137" y="3875227"/>
+            <a:ext cx="6412302" cy="2830375"/>
+          </a:xfrm>
+          <a:prstGeom prst="rect">
+            <a:avLst/>
+          </a:prstGeom>
+          <a:solidFill>
+            <a:schemeClr val="tx1"/>
+          </a:solidFill>
+        </p:spPr>
+        <p:style>
+          <a:lnRef idx="2">
+            <a:schemeClr val="accent1">
+              <a:shade val="50000"/>
+            </a:schemeClr>
+          </a:lnRef>
+          <a:fillRef idx="1">
+            <a:schemeClr val="accent1"/>
+          </a:fillRef>
+          <a:effectRef idx="0">
+            <a:schemeClr val="accent1"/>
+          </a:effectRef>
+          <a:fontRef idx="minor">
+            <a:schemeClr val="lt1"/>
+          </a:fontRef>
+        </p:style>
+        <p:txBody>
+          <a:bodyPr rtlCol="0" anchor="ctr"/>
+          <a:lstStyle/>
+          <a:p>
+            <a:pPr algn="ctr"/>
+            <a:endParaRPr lang="en-US"/>
+          </a:p>
+        </p:txBody>
+      </p:sp>
+      <p:pic>
+        <p:nvPicPr>
+          <p:cNvPr id="5" name="Bild 4"/>
+          <p:cNvPicPr>
+            <a:picLocks noChangeAspect="1"/>
+          </p:cNvPicPr>
+          <p:nvPr/>
+        </p:nvPicPr>
+        <p:blipFill>
+          <a:blip r:embed="rId4"/>
+          <a:stretch>
+            <a:fillRect/>
+          </a:stretch>
+        </p:blipFill>
+        <p:spPr>
+          <a:xfrm>
+            <a:off x="4402668" y="4061840"/>
+            <a:ext cx="6197600" cy="2743200"/>
+          </a:xfrm>
+          <a:prstGeom prst="rect">
+            <a:avLst/>
+          </a:prstGeom>
+        </p:spPr>
+      </p:pic>
+    </p:spTree>
+    <p:extLst>
+      <p:ext uri="{BB962C8B-B14F-4D97-AF65-F5344CB8AC3E}">
+        <p14:creationId xmlns:p14="http://schemas.microsoft.com/office/powerpoint/2010/main" val="933599951"/>
+      </p:ext>
+    </p:extLst>
+  </p:cSld>
+  <p:clrMapOvr>
+    <a:masterClrMapping/>
+  </p:clrMapOvr>
+</p:sld>
+</file>
+
+<file path=ppt/slides/slide12.xml><?xml version="1.0" encoding="utf-8"?>
+<p:sld xmlns:a="http://schemas.openxmlformats.org/drawingml/2006/main" xmlns:r="http://schemas.openxmlformats.org/officeDocument/2006/relationships" xmlns:p="http://schemas.openxmlformats.org/presentationml/2006/main">
+  <p:cSld>
+    <p:spTree>
+      <p:nvGrpSpPr>
+        <p:cNvPr id="1" name=""/>
+        <p:cNvGrpSpPr/>
+        <p:nvPr/>
+      </p:nvGrpSpPr>
+      <p:grpSpPr>
+        <a:xfrm>
+          <a:off x="0" y="0"/>
+          <a:ext cx="0" cy="0"/>
+          <a:chOff x="0" y="0"/>
+          <a:chExt cx="0" cy="0"/>
+        </a:xfrm>
+      </p:grpSpPr>
+      <p:sp>
+        <p:nvSpPr>
+          <p:cNvPr id="2" name="Titel 1"/>
+          <p:cNvSpPr>
+            <a:spLocks noGrp="1"/>
+          </p:cNvSpPr>
+          <p:nvPr>
+            <p:ph type="title"/>
+          </p:nvPr>
+        </p:nvSpPr>
+        <p:spPr/>
+        <p:txBody>
+          <a:bodyPr/>
+          <a:lstStyle/>
+          <a:p>
+            <a:endParaRPr lang="en-US"/>
+          </a:p>
+        </p:txBody>
+      </p:sp>
+      <p:sp>
+        <p:nvSpPr>
+          <p:cNvPr id="3" name="Inhaltsplatzhalter 2"/>
+          <p:cNvSpPr>
+            <a:spLocks noGrp="1"/>
+          </p:cNvSpPr>
+          <p:nvPr>
+            <p:ph idx="1"/>
+          </p:nvPr>
+        </p:nvSpPr>
+        <p:spPr/>
+        <p:txBody>
+          <a:bodyPr/>
+          <a:lstStyle/>
+          <a:p>
+            <a:endParaRPr lang="en-US" dirty="0"/>
+          </a:p>
+        </p:txBody>
+      </p:sp>
+    </p:spTree>
+    <p:extLst>
+      <p:ext uri="{BB962C8B-B14F-4D97-AF65-F5344CB8AC3E}">
+        <p14:creationId xmlns:p14="http://schemas.microsoft.com/office/powerpoint/2010/main" val="1472641318"/>
+      </p:ext>
+    </p:extLst>
+  </p:cSld>
+  <p:clrMapOvr>
+    <a:masterClrMapping/>
+  </p:clrMapOvr>
+</p:sld>
+</file>
+
+<file path=ppt/slides/slide13.xml><?xml version="1.0" encoding="utf-8"?>
+<p:sld xmlns:a="http://schemas.openxmlformats.org/drawingml/2006/main" xmlns:r="http://schemas.openxmlformats.org/officeDocument/2006/relationships" xmlns:p="http://schemas.openxmlformats.org/presentationml/2006/main">
+  <p:cSld>
+    <p:spTree>
+      <p:nvGrpSpPr>
+        <p:cNvPr id="1" name=""/>
+        <p:cNvGrpSpPr/>
+        <p:nvPr/>
+      </p:nvGrpSpPr>
+      <p:grpSpPr>
+        <a:xfrm>
+          <a:off x="0" y="0"/>
+          <a:ext cx="0" cy="0"/>
+          <a:chOff x="0" y="0"/>
+          <a:chExt cx="0" cy="0"/>
+        </a:xfrm>
+      </p:grpSpPr>
+      <p:pic>
+        <p:nvPicPr>
+          <p:cNvPr id="4" name="Bild 3"/>
+          <p:cNvPicPr>
+            <a:picLocks noChangeAspect="1"/>
+          </p:cNvPicPr>
+          <p:nvPr/>
+        </p:nvPicPr>
+        <p:blipFill>
+          <a:blip r:embed="rId2"/>
+          <a:stretch>
+            <a:fillRect/>
+          </a:stretch>
+        </p:blipFill>
+        <p:spPr>
+          <a:xfrm>
+            <a:off x="1924050" y="444500"/>
+            <a:ext cx="8343900" cy="5969000"/>
+          </a:xfrm>
+          <a:prstGeom prst="rect">
+            <a:avLst/>
+          </a:prstGeom>
+        </p:spPr>
+      </p:pic>
+    </p:spTree>
+    <p:extLst>
+      <p:ext uri="{BB962C8B-B14F-4D97-AF65-F5344CB8AC3E}">
+        <p14:creationId xmlns:p14="http://schemas.microsoft.com/office/powerpoint/2010/main" val="1521267405"/>
+      </p:ext>
+    </p:extLst>
+  </p:cSld>
+  <p:clrMapOvr>
+    <a:masterClrMapping/>
+  </p:clrMapOvr>
+</p:sld>
+</file>
+
+<file path=ppt/slides/slide14.xml><?xml version="1.0" encoding="utf-8"?>
+<p:sld xmlns:a="http://schemas.openxmlformats.org/drawingml/2006/main" xmlns:r="http://schemas.openxmlformats.org/officeDocument/2006/relationships" xmlns:p="http://schemas.openxmlformats.org/presentationml/2006/main">
+  <p:cSld>
+    <p:spTree>
+      <p:nvGrpSpPr>
+        <p:cNvPr id="1" name=""/>
+        <p:cNvGrpSpPr/>
+        <p:nvPr/>
+      </p:nvGrpSpPr>
+      <p:grpSpPr>
+        <a:xfrm>
+          <a:off x="0" y="0"/>
+          <a:ext cx="0" cy="0"/>
+          <a:chOff x="0" y="0"/>
+          <a:chExt cx="0" cy="0"/>
+        </a:xfrm>
+      </p:grpSpPr>
+      <p:pic>
+        <p:nvPicPr>
+          <p:cNvPr id="4" name="Bild 3"/>
+          <p:cNvPicPr>
+            <a:picLocks noChangeAspect="1"/>
+          </p:cNvPicPr>
+          <p:nvPr/>
+        </p:nvPicPr>
+        <p:blipFill>
+          <a:blip r:embed="rId2"/>
+          <a:stretch>
+            <a:fillRect/>
+          </a:stretch>
+        </p:blipFill>
+        <p:spPr>
+          <a:xfrm>
+            <a:off x="1924050" y="444500"/>
+            <a:ext cx="8343900" cy="5969000"/>
+          </a:xfrm>
+          <a:prstGeom prst="rect">
+            <a:avLst/>
+          </a:prstGeom>
+        </p:spPr>
+      </p:pic>
+    </p:spTree>
+    <p:extLst>
+      <p:ext uri="{BB962C8B-B14F-4D97-AF65-F5344CB8AC3E}">
+        <p14:creationId xmlns:p14="http://schemas.microsoft.com/office/powerpoint/2010/main" val="974653"/>
+      </p:ext>
+    </p:extLst>
+  </p:cSld>
+  <p:clrMapOvr>
+    <a:masterClrMapping/>
+  </p:clrMapOvr>
+</p:sld>
+</file>
+
+<file path=ppt/slides/slide2.xml><?xml version="1.0" encoding="utf-8"?>
+<p:sld xmlns:a="http://schemas.openxmlformats.org/drawingml/2006/main" xmlns:r="http://schemas.openxmlformats.org/officeDocument/2006/relationships" xmlns:p="http://schemas.openxmlformats.org/presentationml/2006/main">
+  <p:cSld>
+    <p:spTree>
+      <p:nvGrpSpPr>
+        <p:cNvPr id="1" name=""/>
+        <p:cNvGrpSpPr/>
+        <p:nvPr/>
+      </p:nvGrpSpPr>
+      <p:grpSpPr>
+        <a:xfrm>
+          <a:off x="0" y="0"/>
+          <a:ext cx="0" cy="0"/>
+          <a:chOff x="0" y="0"/>
+          <a:chExt cx="0" cy="0"/>
+        </a:xfrm>
+      </p:grpSpPr>
+      <p:sp>
+        <p:nvSpPr>
+          <p:cNvPr id="2" name="Title 1">
+            <a:extLst>
+              <a:ext uri="{FF2B5EF4-FFF2-40B4-BE49-F238E27FC236}">
+                <a16:creationId xmlns:a16="http://schemas.microsoft.com/office/drawing/2014/main" id="{3867B750-685E-4270-AB0D-F1252741CFFC}"/>
+              </a:ext>
+            </a:extLst>
+          </p:cNvPr>
+          <p:cNvSpPr>
+            <a:spLocks noGrp="1"/>
+          </p:cNvSpPr>
+          <p:nvPr>
+            <p:ph type="title"/>
+          </p:nvPr>
+        </p:nvSpPr>
+        <p:spPr/>
+        <p:txBody>
+          <a:bodyPr/>
+          <a:lstStyle/>
+          <a:p>
+            <a:r>
+              <a:rPr lang="en-US" dirty="0"/>
+              <a:t>There are no tourists</a:t>
+            </a:r>
+            <a:endParaRPr lang="de-CH" dirty="0"/>
+          </a:p>
+        </p:txBody>
+      </p:sp>
+      <p:sp>
+        <p:nvSpPr>
+          <p:cNvPr id="3" name="Content Placeholder 2">
+            <a:extLst>
+              <a:ext uri="{FF2B5EF4-FFF2-40B4-BE49-F238E27FC236}">
+                <a16:creationId xmlns:a16="http://schemas.microsoft.com/office/drawing/2014/main" id="{9CA32EE8-EE27-4349-9595-65C7E5F46908}"/>
+              </a:ext>
+            </a:extLst>
+          </p:cNvPr>
+          <p:cNvSpPr>
+            <a:spLocks noGrp="1"/>
+          </p:cNvSpPr>
+          <p:nvPr>
+            <p:ph idx="1"/>
+          </p:nvPr>
+        </p:nvSpPr>
+        <p:spPr/>
+        <p:txBody>
+          <a:bodyPr/>
+          <a:lstStyle/>
+          <a:p>
+            <a:pPr marL="0" indent="0">
+              <a:buNone/>
+            </a:pPr>
+            <a:r>
+              <a:rPr lang="en-US" dirty="0"/>
+              <a:t>Today's tourists </a:t>
+            </a:r>
+            <a:r>
+              <a:rPr lang="en-US" dirty="0" err="1"/>
+              <a:t>arent</a:t>
+            </a:r>
+            <a:r>
+              <a:rPr lang="en-US" dirty="0"/>
+              <a:t> tourists they a </a:t>
+            </a:r>
+            <a:r>
+              <a:rPr lang="en-US" dirty="0" err="1"/>
+              <a:t>webizens</a:t>
+            </a:r>
+            <a:r>
+              <a:rPr lang="en-US" dirty="0"/>
+              <a:t> pilgrimaging and exploring the physical world.</a:t>
+            </a:r>
+          </a:p>
+        </p:txBody>
+      </p:sp>
+    </p:spTree>
+    <p:extLst>
+      <p:ext uri="{BB962C8B-B14F-4D97-AF65-F5344CB8AC3E}">
+        <p14:creationId xmlns:p14="http://schemas.microsoft.com/office/powerpoint/2010/main" val="2854553462"/>
+      </p:ext>
+    </p:extLst>
+  </p:cSld>
+  <p:clrMapOvr>
+    <a:masterClrMapping/>
+  </p:clrMapOvr>
+</p:sld>
+</file>
+
+<file path=ppt/slides/slide3.xml><?xml version="1.0" encoding="utf-8"?>
+<p:sld xmlns:a="http://schemas.openxmlformats.org/drawingml/2006/main" xmlns:r="http://schemas.openxmlformats.org/officeDocument/2006/relationships" xmlns:p="http://schemas.openxmlformats.org/presentationml/2006/main">
+  <p:cSld>
+    <p:spTree>
+      <p:nvGrpSpPr>
+        <p:cNvPr id="1" name=""/>
+        <p:cNvGrpSpPr/>
+        <p:nvPr/>
+      </p:nvGrpSpPr>
+      <p:grpSpPr>
+        <a:xfrm>
+          <a:off x="0" y="0"/>
+          <a:ext cx="0" cy="0"/>
+          <a:chOff x="0" y="0"/>
+          <a:chExt cx="0" cy="0"/>
+        </a:xfrm>
+      </p:grpSpPr>
+      <p:sp>
+        <p:nvSpPr>
+          <p:cNvPr id="2" name="Title 1">
+            <a:extLst>
+              <a:ext uri="{FF2B5EF4-FFF2-40B4-BE49-F238E27FC236}">
+                <a16:creationId xmlns:a16="http://schemas.microsoft.com/office/drawing/2014/main" id="{294855B8-231E-4436-9C8D-B818E47FEC09}"/>
+              </a:ext>
+            </a:extLst>
+          </p:cNvPr>
+          <p:cNvSpPr>
+            <a:spLocks noGrp="1"/>
+          </p:cNvSpPr>
+          <p:nvPr>
+            <p:ph type="title"/>
+          </p:nvPr>
+        </p:nvSpPr>
+        <p:spPr/>
+        <p:txBody>
+          <a:bodyPr/>
+          <a:lstStyle/>
+          <a:p>
+            <a:r>
+              <a:rPr lang="de-CH" b="1" dirty="0"/>
+              <a:t>Technological </a:t>
+            </a:r>
+            <a:r>
+              <a:rPr lang="de-CH" b="1" dirty="0" err="1"/>
+              <a:t>landscape</a:t>
+            </a:r>
+            <a:endParaRPr lang="de-CH" dirty="0"/>
+          </a:p>
+        </p:txBody>
+      </p:sp>
+      <p:sp>
+        <p:nvSpPr>
+          <p:cNvPr id="3" name="Content Placeholder 2">
+            <a:extLst>
+              <a:ext uri="{FF2B5EF4-FFF2-40B4-BE49-F238E27FC236}">
+                <a16:creationId xmlns:a16="http://schemas.microsoft.com/office/drawing/2014/main" id="{2EEEF804-2A07-4576-8666-6A2A22AA3FF2}"/>
+              </a:ext>
+            </a:extLst>
+          </p:cNvPr>
+          <p:cNvSpPr>
+            <a:spLocks noGrp="1"/>
+          </p:cNvSpPr>
+          <p:nvPr>
+            <p:ph idx="1"/>
+          </p:nvPr>
+        </p:nvSpPr>
+        <p:spPr/>
+        <p:txBody>
+          <a:bodyPr/>
+          <a:lstStyle/>
+          <a:p>
+            <a:r>
+              <a:rPr lang="en-US" dirty="0"/>
+              <a:t>From the web of documents to web of data</a:t>
+            </a:r>
+          </a:p>
+          <a:p>
+            <a:r>
+              <a:rPr lang="en-US" dirty="0"/>
+              <a:t>Linked data connecting persons, places, documents, ideas…</a:t>
+            </a:r>
+          </a:p>
+          <a:p>
+            <a:r>
+              <a:rPr lang="en-US" dirty="0"/>
+              <a:t>Virtually infinite amount of connected data</a:t>
+            </a:r>
+          </a:p>
+          <a:p>
+            <a:r>
+              <a:rPr lang="en-US" dirty="0"/>
+              <a:t>Individual interests, preferences and background</a:t>
+            </a:r>
+          </a:p>
+          <a:p>
+            <a:r>
+              <a:rPr lang="en-US" dirty="0"/>
+              <a:t>Geo-Location -&gt; Limitations in buildings</a:t>
+            </a:r>
+          </a:p>
+          <a:p>
+            <a:r>
+              <a:rPr lang="en-US" dirty="0"/>
+              <a:t>Mobile broadband -&gt; Limitations in the wilderness and when roaming</a:t>
+            </a:r>
+          </a:p>
+          <a:p>
+            <a:pPr marL="0" indent="0">
+              <a:buNone/>
+            </a:pPr>
+            <a:r>
+              <a:rPr lang="en-US" dirty="0"/>
+              <a:t>-&gt; Bluetooth Beacons to </a:t>
+            </a:r>
+            <a:r>
+              <a:rPr lang="en-US" i="1" dirty="0"/>
+              <a:t>annotate</a:t>
+            </a:r>
+            <a:r>
+              <a:rPr lang="en-US" dirty="0"/>
+              <a:t> the physical space</a:t>
+            </a:r>
+            <a:endParaRPr lang="de-CH" dirty="0"/>
+          </a:p>
+        </p:txBody>
+      </p:sp>
+    </p:spTree>
+    <p:extLst>
+      <p:ext uri="{BB962C8B-B14F-4D97-AF65-F5344CB8AC3E}">
+        <p14:creationId xmlns:p14="http://schemas.microsoft.com/office/powerpoint/2010/main" val="2410705375"/>
+      </p:ext>
+    </p:extLst>
+  </p:cSld>
+  <p:clrMapOvr>
+    <a:masterClrMapping/>
+  </p:clrMapOvr>
+</p:sld>
+</file>
+
+<file path=ppt/slides/slide4.xml><?xml version="1.0" encoding="utf-8"?>
+<p:sld xmlns:a="http://schemas.openxmlformats.org/drawingml/2006/main" xmlns:r="http://schemas.openxmlformats.org/officeDocument/2006/relationships" xmlns:p="http://schemas.openxmlformats.org/presentationml/2006/main">
+  <p:cSld>
+    <p:spTree>
+      <p:nvGrpSpPr>
+        <p:cNvPr id="1" name=""/>
+        <p:cNvGrpSpPr/>
+        <p:nvPr/>
+      </p:nvGrpSpPr>
+      <p:grpSpPr>
+        <a:xfrm>
+          <a:off x="0" y="0"/>
+          <a:ext cx="0" cy="0"/>
+          <a:chOff x="0" y="0"/>
+          <a:chExt cx="0" cy="0"/>
+        </a:xfrm>
+      </p:grpSpPr>
+      <p:sp>
+        <p:nvSpPr>
+          <p:cNvPr id="2" name="Title 1">
+            <a:extLst>
+              <a:ext uri="{FF2B5EF4-FFF2-40B4-BE49-F238E27FC236}">
+                <a16:creationId xmlns:a16="http://schemas.microsoft.com/office/drawing/2014/main" id="{5F3D2C60-8B13-47EC-8520-4DFEA1E35057}"/>
+              </a:ext>
+            </a:extLst>
+          </p:cNvPr>
+          <p:cNvSpPr>
+            <a:spLocks noGrp="1"/>
+          </p:cNvSpPr>
+          <p:nvPr>
+            <p:ph type="title"/>
+          </p:nvPr>
+        </p:nvSpPr>
+        <p:spPr/>
+        <p:txBody>
+          <a:bodyPr/>
+          <a:lstStyle/>
+          <a:p>
+            <a:r>
+              <a:rPr lang="de-CH" b="1" dirty="0"/>
+              <a:t>Advantages </a:t>
+            </a:r>
+            <a:r>
+              <a:rPr lang="de-CH" b="1" dirty="0" err="1"/>
+              <a:t>for</a:t>
+            </a:r>
+            <a:r>
+              <a:rPr lang="de-CH" b="1" dirty="0"/>
+              <a:t> Providers</a:t>
+            </a:r>
+            <a:endParaRPr lang="de-CH" dirty="0"/>
+          </a:p>
+        </p:txBody>
+      </p:sp>
+      <p:sp>
+        <p:nvSpPr>
+          <p:cNvPr id="3" name="Content Placeholder 2">
+            <a:extLst>
+              <a:ext uri="{FF2B5EF4-FFF2-40B4-BE49-F238E27FC236}">
+                <a16:creationId xmlns:a16="http://schemas.microsoft.com/office/drawing/2014/main" id="{7C82A1DD-4B53-430D-8291-39B733F9DAEC}"/>
+              </a:ext>
+            </a:extLst>
+          </p:cNvPr>
+          <p:cNvSpPr>
+            <a:spLocks noGrp="1"/>
+          </p:cNvSpPr>
+          <p:nvPr>
+            <p:ph idx="1"/>
+          </p:nvPr>
+        </p:nvSpPr>
+        <p:spPr/>
+        <p:txBody>
+          <a:bodyPr/>
+          <a:lstStyle/>
+          <a:p>
+            <a:r>
+              <a:rPr lang="en-US" dirty="0"/>
+              <a:t>Tourists stay longer</a:t>
+            </a:r>
+          </a:p>
+          <a:p>
+            <a:r>
+              <a:rPr lang="en-US" dirty="0"/>
+              <a:t>Tourists learn about and visit more places</a:t>
+            </a:r>
+          </a:p>
+          <a:p>
+            <a:r>
+              <a:rPr lang="en-US" dirty="0"/>
+              <a:t>More equally </a:t>
+            </a:r>
+            <a:r>
+              <a:rPr lang="en-US" dirty="0" err="1"/>
+              <a:t>ditributed</a:t>
+            </a:r>
+            <a:r>
+              <a:rPr lang="en-US" dirty="0"/>
+              <a:t> stream of visitors</a:t>
+            </a:r>
+          </a:p>
+          <a:p>
+            <a:pPr marL="0" indent="0">
+              <a:buNone/>
+            </a:pPr>
+            <a:endParaRPr lang="de-CH" dirty="0"/>
+          </a:p>
+        </p:txBody>
+      </p:sp>
+    </p:spTree>
+    <p:extLst>
+      <p:ext uri="{BB962C8B-B14F-4D97-AF65-F5344CB8AC3E}">
+        <p14:creationId xmlns:p14="http://schemas.microsoft.com/office/powerpoint/2010/main" val="3007267876"/>
+      </p:ext>
+    </p:extLst>
+  </p:cSld>
+  <p:clrMapOvr>
+    <a:masterClrMapping/>
+  </p:clrMapOvr>
+</p:sld>
+</file>
+
 <file path=ppt/slides/slide5.xml><?xml version="1.0" encoding="utf-8"?>
 <p:sld xmlns:a="http://schemas.openxmlformats.org/drawingml/2006/main" xmlns:r="http://schemas.openxmlformats.org/officeDocument/2006/relationships" xmlns:p="http://schemas.openxmlformats.org/presentationml/2006/main">
   <p:cSld>
@@ -4570,12 +4745,18 @@
       </p:grpSpPr>
       <p:sp>
         <p:nvSpPr>
-          <p:cNvPr id="2" name="Titel 1"/>
-          <p:cNvSpPr>
-            <a:spLocks noGrp="1"/>
-          </p:cNvSpPr>
-          <p:nvPr>
-            <p:ph type="ctrTitle"/>
+          <p:cNvPr id="2" name="Title 1">
+            <a:extLst>
+              <a:ext uri="{FF2B5EF4-FFF2-40B4-BE49-F238E27FC236}">
+                <a16:creationId xmlns:a16="http://schemas.microsoft.com/office/drawing/2014/main" id="{D956F271-0BCC-4362-85C0-9A9F5CE5EB0D}"/>
+              </a:ext>
+            </a:extLst>
+          </p:cNvPr>
+          <p:cNvSpPr>
+            <a:spLocks noGrp="1"/>
+          </p:cNvSpPr>
+          <p:nvPr>
+            <p:ph type="title"/>
           </p:nvPr>
         </p:nvSpPr>
         <p:spPr/>
@@ -4583,18 +4764,40 @@
           <a:bodyPr/>
           <a:lstStyle/>
           <a:p>
-            <a:endParaRPr lang="en-US"/>
-          </a:p>
-        </p:txBody>
-      </p:sp>
-      <p:sp>
-        <p:nvSpPr>
-          <p:cNvPr id="3" name="Untertitel 2"/>
-          <p:cNvSpPr>
-            <a:spLocks noGrp="1"/>
-          </p:cNvSpPr>
-          <p:nvPr>
-            <p:ph type="subTitle" idx="1"/>
+            <a:r>
+              <a:rPr lang="de-CH" b="1" dirty="0"/>
+              <a:t>Advantages </a:t>
+            </a:r>
+            <a:r>
+              <a:rPr lang="de-CH" b="1" dirty="0" err="1"/>
+              <a:t>for</a:t>
+            </a:r>
+            <a:r>
+              <a:rPr lang="de-CH" b="1" dirty="0"/>
+              <a:t> </a:t>
+            </a:r>
+            <a:r>
+              <a:rPr lang="de-CH" b="1" dirty="0" err="1"/>
+              <a:t>Tourists</a:t>
+            </a:r>
+            <a:endParaRPr lang="de-CH" dirty="0"/>
+          </a:p>
+        </p:txBody>
+      </p:sp>
+      <p:sp>
+        <p:nvSpPr>
+          <p:cNvPr id="3" name="Content Placeholder 2">
+            <a:extLst>
+              <a:ext uri="{FF2B5EF4-FFF2-40B4-BE49-F238E27FC236}">
+                <a16:creationId xmlns:a16="http://schemas.microsoft.com/office/drawing/2014/main" id="{028BD986-F847-4D4D-8BE2-19DA7F16BA0F}"/>
+              </a:ext>
+            </a:extLst>
+          </p:cNvPr>
+          <p:cNvSpPr>
+            <a:spLocks noGrp="1"/>
+          </p:cNvSpPr>
+          <p:nvPr>
+            <p:ph idx="1"/>
           </p:nvPr>
         </p:nvSpPr>
         <p:spPr/>
@@ -4602,216 +4805,32 @@
           <a:bodyPr/>
           <a:lstStyle/>
           <a:p>
-            <a:endParaRPr lang="en-US"/>
-          </a:p>
-        </p:txBody>
-      </p:sp>
-      <p:pic>
-        <p:nvPicPr>
-          <p:cNvPr id="4" name="Bild 3"/>
-          <p:cNvPicPr>
-            <a:picLocks noChangeAspect="1"/>
-          </p:cNvPicPr>
-          <p:nvPr/>
-        </p:nvPicPr>
-        <p:blipFill rotWithShape="1">
-          <a:blip r:embed="rId2"/>
-          <a:srcRect t="5226"/>
-          <a:stretch/>
-        </p:blipFill>
-        <p:spPr>
-          <a:xfrm>
-            <a:off x="1285460" y="355600"/>
-            <a:ext cx="9512577" cy="6449440"/>
-          </a:xfrm>
-          <a:prstGeom prst="rect">
-            <a:avLst/>
-          </a:prstGeom>
-        </p:spPr>
-      </p:pic>
-      <p:pic>
-        <p:nvPicPr>
-          <p:cNvPr id="30" name="Bild 29"/>
-          <p:cNvPicPr>
-            <a:picLocks noChangeAspect="1"/>
-          </p:cNvPicPr>
-          <p:nvPr/>
-        </p:nvPicPr>
-        <p:blipFill>
-          <a:blip r:embed="rId3"/>
-          <a:stretch>
-            <a:fillRect/>
-          </a:stretch>
-        </p:blipFill>
-        <p:spPr>
-          <a:xfrm>
-            <a:off x="2459401" y="5755287"/>
-            <a:ext cx="734372" cy="730527"/>
-          </a:xfrm>
-          <a:prstGeom prst="rect">
-            <a:avLst/>
-          </a:prstGeom>
-          <a:ln w="127000">
-            <a:solidFill>
-              <a:schemeClr val="accent5">
-                <a:lumMod val="75000"/>
-              </a:schemeClr>
-            </a:solidFill>
-          </a:ln>
-        </p:spPr>
-      </p:pic>
-      <p:sp>
-        <p:nvSpPr>
-          <p:cNvPr id="21" name="Oval 20"/>
-          <p:cNvSpPr/>
-          <p:nvPr/>
-        </p:nvSpPr>
-        <p:spPr>
-          <a:xfrm>
-            <a:off x="2320469" y="2546647"/>
-            <a:ext cx="1296035" cy="1254760"/>
-          </a:xfrm>
-          <a:prstGeom prst="ellipse">
-            <a:avLst/>
-          </a:prstGeom>
-          <a:solidFill>
-            <a:schemeClr val="accent1">
-              <a:alpha val="20000"/>
-            </a:schemeClr>
-          </a:solidFill>
-        </p:spPr>
-        <p:style>
-          <a:lnRef idx="2">
-            <a:schemeClr val="accent1">
-              <a:shade val="50000"/>
-            </a:schemeClr>
-          </a:lnRef>
-          <a:fillRef idx="1">
-            <a:schemeClr val="accent1"/>
-          </a:fillRef>
-          <a:effectRef idx="0">
-            <a:schemeClr val="accent1"/>
-          </a:effectRef>
-          <a:fontRef idx="minor">
-            <a:schemeClr val="lt1"/>
-          </a:fontRef>
-        </p:style>
-        <p:txBody>
-          <a:bodyPr rot="0" spcFirstLastPara="0" vert="horz" wrap="square" lIns="91440" tIns="45720" rIns="91440" bIns="45720" numCol="1" spcCol="0" rtlCol="0" fromWordArt="0" anchor="ctr" anchorCtr="0" forceAA="0" compatLnSpc="1">
-            <a:prstTxWarp prst="textNoShape">
-              <a:avLst/>
-            </a:prstTxWarp>
-            <a:noAutofit/>
-          </a:bodyPr>
-          <a:lstStyle/>
-          <a:p>
-            <a:endParaRPr lang="de-DE"/>
-          </a:p>
-        </p:txBody>
-      </p:sp>
-      <p:pic>
-        <p:nvPicPr>
-          <p:cNvPr id="22" name="Bild 21"/>
-          <p:cNvPicPr>
-            <a:picLocks noChangeAspect="1"/>
-          </p:cNvPicPr>
-          <p:nvPr/>
-        </p:nvPicPr>
-        <p:blipFill>
-          <a:blip r:embed="rId3"/>
-          <a:stretch>
-            <a:fillRect/>
-          </a:stretch>
-        </p:blipFill>
-        <p:spPr>
-          <a:xfrm>
-            <a:off x="7911935" y="757099"/>
-            <a:ext cx="734372" cy="730527"/>
-          </a:xfrm>
-          <a:prstGeom prst="rect">
-            <a:avLst/>
-          </a:prstGeom>
-          <a:solidFill>
-            <a:schemeClr val="bg1"/>
-          </a:solidFill>
-          <a:ln w="127000">
-            <a:solidFill>
-              <a:srgbClr val="00B050"/>
-            </a:solidFill>
-          </a:ln>
-        </p:spPr>
-      </p:pic>
-      <p:sp>
-        <p:nvSpPr>
-          <p:cNvPr id="6" name="Rechteck 5"/>
-          <p:cNvSpPr/>
-          <p:nvPr/>
-        </p:nvSpPr>
-        <p:spPr>
-          <a:xfrm>
-            <a:off x="4284137" y="3875227"/>
-            <a:ext cx="6412302" cy="2830375"/>
-          </a:xfrm>
-          <a:prstGeom prst="rect">
-            <a:avLst/>
-          </a:prstGeom>
-          <a:solidFill>
-            <a:schemeClr val="tx1"/>
-          </a:solidFill>
-        </p:spPr>
-        <p:style>
-          <a:lnRef idx="2">
-            <a:schemeClr val="accent1">
-              <a:shade val="50000"/>
-            </a:schemeClr>
-          </a:lnRef>
-          <a:fillRef idx="1">
-            <a:schemeClr val="accent1"/>
-          </a:fillRef>
-          <a:effectRef idx="0">
-            <a:schemeClr val="accent1"/>
-          </a:effectRef>
-          <a:fontRef idx="minor">
-            <a:schemeClr val="lt1"/>
-          </a:fontRef>
-        </p:style>
-        <p:txBody>
-          <a:bodyPr rtlCol="0" anchor="ctr"/>
-          <a:lstStyle/>
-          <a:p>
-            <a:pPr algn="ctr"/>
-            <a:endParaRPr lang="en-US"/>
-          </a:p>
-        </p:txBody>
-      </p:sp>
-      <p:pic>
-        <p:nvPicPr>
-          <p:cNvPr id="5" name="Bild 4"/>
-          <p:cNvPicPr>
-            <a:picLocks noChangeAspect="1"/>
-          </p:cNvPicPr>
-          <p:nvPr/>
-        </p:nvPicPr>
-        <p:blipFill>
-          <a:blip r:embed="rId4"/>
-          <a:stretch>
-            <a:fillRect/>
-          </a:stretch>
-        </p:blipFill>
-        <p:spPr>
-          <a:xfrm>
-            <a:off x="4402668" y="4061840"/>
-            <a:ext cx="6197600" cy="2743200"/>
-          </a:xfrm>
-          <a:prstGeom prst="rect">
-            <a:avLst/>
-          </a:prstGeom>
-        </p:spPr>
-      </p:pic>
+            <a:r>
+              <a:rPr lang="en-US" dirty="0"/>
+              <a:t>They aren't tourists: they discover on their own</a:t>
+            </a:r>
+          </a:p>
+          <a:p>
+            <a:r>
+              <a:rPr lang="en-US" dirty="0"/>
+              <a:t>They can see through walls: thy can take see what other places there are behind the wall of the museum they're visiting</a:t>
+            </a:r>
+          </a:p>
+          <a:p>
+            <a:r>
+              <a:rPr lang="en-US" dirty="0"/>
+              <a:t>They avoid they queue buy having real-time data and know on which ski lift there's not a lot of people</a:t>
+            </a:r>
+          </a:p>
+          <a:p>
+            <a:endParaRPr lang="de-CH" dirty="0"/>
+          </a:p>
+        </p:txBody>
+      </p:sp>
     </p:spTree>
     <p:extLst>
       <p:ext uri="{BB962C8B-B14F-4D97-AF65-F5344CB8AC3E}">
-        <p14:creationId xmlns:p14="http://schemas.microsoft.com/office/powerpoint/2010/main" val="933599951"/>
+        <p14:creationId xmlns:p14="http://schemas.microsoft.com/office/powerpoint/2010/main" val="4076089706"/>
       </p:ext>
     </p:extLst>
   </p:cSld>
@@ -4840,7 +4859,13 @@
       </p:grpSpPr>
       <p:sp>
         <p:nvSpPr>
-          <p:cNvPr id="2" name="Titel 1"/>
+          <p:cNvPr id="7" name="Title 6">
+            <a:extLst>
+              <a:ext uri="{FF2B5EF4-FFF2-40B4-BE49-F238E27FC236}">
+                <a16:creationId xmlns:a16="http://schemas.microsoft.com/office/drawing/2014/main" id="{3974C7F3-0BB9-4561-882E-5EEA323CF374}"/>
+              </a:ext>
+            </a:extLst>
+          </p:cNvPr>
           <p:cNvSpPr>
             <a:spLocks noGrp="1"/>
           </p:cNvSpPr>
@@ -4853,18 +4878,28 @@
           <a:bodyPr/>
           <a:lstStyle/>
           <a:p>
-            <a:endParaRPr lang="en-US"/>
-          </a:p>
-        </p:txBody>
-      </p:sp>
-      <p:sp>
-        <p:nvSpPr>
-          <p:cNvPr id="3" name="Inhaltsplatzhalter 2"/>
-          <p:cNvSpPr>
-            <a:spLocks noGrp="1"/>
-          </p:cNvSpPr>
-          <p:nvPr>
-            <p:ph idx="1"/>
+            <a:r>
+              <a:rPr lang="en-US" dirty="0"/>
+              <a:t>Data</a:t>
+            </a:r>
+            <a:endParaRPr lang="de-CH" dirty="0"/>
+          </a:p>
+        </p:txBody>
+      </p:sp>
+      <p:sp>
+        <p:nvSpPr>
+          <p:cNvPr id="8" name="Text Placeholder 7">
+            <a:extLst>
+              <a:ext uri="{FF2B5EF4-FFF2-40B4-BE49-F238E27FC236}">
+                <a16:creationId xmlns:a16="http://schemas.microsoft.com/office/drawing/2014/main" id="{3F292449-CC7A-4BE5-A6E6-C304D22DC786}"/>
+              </a:ext>
+            </a:extLst>
+          </p:cNvPr>
+          <p:cNvSpPr>
+            <a:spLocks noGrp="1"/>
+          </p:cNvSpPr>
+          <p:nvPr>
+            <p:ph type="body" idx="1"/>
           </p:nvPr>
         </p:nvSpPr>
         <p:spPr/>
@@ -4872,14 +4907,140 @@
           <a:bodyPr/>
           <a:lstStyle/>
           <a:p>
+            <a:r>
+              <a:rPr lang="en-US" dirty="0"/>
+              <a:t>Data used</a:t>
+            </a:r>
+            <a:endParaRPr lang="de-CH" dirty="0"/>
+          </a:p>
+        </p:txBody>
+      </p:sp>
+      <p:sp>
+        <p:nvSpPr>
+          <p:cNvPr id="9" name="Content Placeholder 8">
+            <a:extLst>
+              <a:ext uri="{FF2B5EF4-FFF2-40B4-BE49-F238E27FC236}">
+                <a16:creationId xmlns:a16="http://schemas.microsoft.com/office/drawing/2014/main" id="{EB7C74FB-0210-4EE8-AC35-7C80CF7C3B7E}"/>
+              </a:ext>
+            </a:extLst>
+          </p:cNvPr>
+          <p:cNvSpPr>
+            <a:spLocks noGrp="1"/>
+          </p:cNvSpPr>
+          <p:nvPr>
+            <p:ph sz="half" idx="2"/>
+          </p:nvPr>
+        </p:nvSpPr>
+        <p:spPr/>
+        <p:txBody>
+          <a:bodyPr/>
+          <a:lstStyle/>
+          <a:p>
+            <a:r>
+              <a:rPr lang="en-US" dirty="0"/>
+              <a:t>A small subset of </a:t>
+            </a:r>
+            <a:r>
+              <a:rPr lang="en-US" dirty="0" err="1"/>
+              <a:t>wikidata</a:t>
+            </a:r>
             <a:endParaRPr lang="en-US" dirty="0"/>
+          </a:p>
+          <a:p>
+            <a:r>
+              <a:rPr lang="en-US" dirty="0"/>
+              <a:t>Transport data ("Where do I go next?")</a:t>
+            </a:r>
+          </a:p>
+          <a:p>
+            <a:endParaRPr lang="de-CH" dirty="0"/>
+          </a:p>
+        </p:txBody>
+      </p:sp>
+      <p:sp>
+        <p:nvSpPr>
+          <p:cNvPr id="10" name="Text Placeholder 9">
+            <a:extLst>
+              <a:ext uri="{FF2B5EF4-FFF2-40B4-BE49-F238E27FC236}">
+                <a16:creationId xmlns:a16="http://schemas.microsoft.com/office/drawing/2014/main" id="{CCAA0838-4D77-47BE-A6E0-EAF14B4432F6}"/>
+              </a:ext>
+            </a:extLst>
+          </p:cNvPr>
+          <p:cNvSpPr>
+            <a:spLocks noGrp="1"/>
+          </p:cNvSpPr>
+          <p:nvPr>
+            <p:ph type="body" sz="quarter" idx="3"/>
+          </p:nvPr>
+        </p:nvSpPr>
+        <p:spPr/>
+        <p:txBody>
+          <a:bodyPr/>
+          <a:lstStyle/>
+          <a:p>
+            <a:r>
+              <a:rPr lang="en-US" dirty="0"/>
+              <a:t>Data we missed</a:t>
+            </a:r>
+            <a:endParaRPr lang="de-CH" dirty="0"/>
+          </a:p>
+        </p:txBody>
+      </p:sp>
+      <p:sp>
+        <p:nvSpPr>
+          <p:cNvPr id="11" name="Content Placeholder 10">
+            <a:extLst>
+              <a:ext uri="{FF2B5EF4-FFF2-40B4-BE49-F238E27FC236}">
+                <a16:creationId xmlns:a16="http://schemas.microsoft.com/office/drawing/2014/main" id="{95FE4E3D-F791-4903-8CE8-A283809918B3}"/>
+              </a:ext>
+            </a:extLst>
+          </p:cNvPr>
+          <p:cNvSpPr>
+            <a:spLocks noGrp="1"/>
+          </p:cNvSpPr>
+          <p:nvPr>
+            <p:ph sz="quarter" idx="4"/>
+          </p:nvPr>
+        </p:nvSpPr>
+        <p:spPr/>
+        <p:txBody>
+          <a:bodyPr/>
+          <a:lstStyle/>
+          <a:p>
+            <a:r>
+              <a:rPr lang="en-US" dirty="0"/>
+              <a:t>Real time data on usage of facilities</a:t>
+            </a:r>
+          </a:p>
+          <a:p>
+            <a:r>
+              <a:rPr lang="en-US" dirty="0"/>
+              <a:t>Geotagged pictures</a:t>
+            </a:r>
+          </a:p>
+          <a:p>
+            <a:r>
+              <a:rPr lang="en-US" dirty="0"/>
+              <a:t>More </a:t>
+            </a:r>
+            <a:r>
+              <a:rPr lang="en-US" dirty="0" err="1"/>
+              <a:t>informtaion</a:t>
+            </a:r>
+            <a:r>
+              <a:rPr lang="en-US" dirty="0"/>
+              <a:t> about monuments/places</a:t>
+            </a:r>
+          </a:p>
+          <a:p>
+            <a:endParaRPr lang="de-CH" dirty="0"/>
           </a:p>
         </p:txBody>
       </p:sp>
     </p:spTree>
     <p:extLst>
       <p:ext uri="{BB962C8B-B14F-4D97-AF65-F5344CB8AC3E}">
-        <p14:creationId xmlns:p14="http://schemas.microsoft.com/office/powerpoint/2010/main" val="1472641318"/>
+        <p14:creationId xmlns:p14="http://schemas.microsoft.com/office/powerpoint/2010/main" val="3087162716"/>
       </p:ext>
     </p:extLst>
   </p:cSld>
@@ -4914,11 +5075,10 @@
           </p:cNvPicPr>
           <p:nvPr/>
         </p:nvPicPr>
-        <p:blipFill>
+        <p:blipFill rotWithShape="1">
           <a:blip r:embed="rId2"/>
-          <a:stretch>
-            <a:fillRect/>
-          </a:stretch>
+          <a:srcRect t="5179"/>
+          <a:stretch/>
         </p:blipFill>
         <p:spPr>
           <a:xfrm>
@@ -4933,7 +5093,7 @@
     </p:spTree>
     <p:extLst>
       <p:ext uri="{BB962C8B-B14F-4D97-AF65-F5344CB8AC3E}">
-        <p14:creationId xmlns:p14="http://schemas.microsoft.com/office/powerpoint/2010/main" val="1521267405"/>
+        <p14:creationId xmlns:p14="http://schemas.microsoft.com/office/powerpoint/2010/main" val="1906082872"/>
       </p:ext>
     </p:extLst>
   </p:cSld>
@@ -4960,6 +5120,609 @@
           <a:chExt cx="0" cy="0"/>
         </a:xfrm>
       </p:grpSpPr>
+      <p:sp>
+        <p:nvSpPr>
+          <p:cNvPr id="2" name="Titel 1"/>
+          <p:cNvSpPr>
+            <a:spLocks noGrp="1"/>
+          </p:cNvSpPr>
+          <p:nvPr>
+            <p:ph type="ctrTitle"/>
+          </p:nvPr>
+        </p:nvSpPr>
+        <p:spPr/>
+        <p:txBody>
+          <a:bodyPr/>
+          <a:lstStyle/>
+          <a:p>
+            <a:endParaRPr lang="en-US"/>
+          </a:p>
+        </p:txBody>
+      </p:sp>
+      <p:sp>
+        <p:nvSpPr>
+          <p:cNvPr id="3" name="Untertitel 2"/>
+          <p:cNvSpPr>
+            <a:spLocks noGrp="1"/>
+          </p:cNvSpPr>
+          <p:nvPr>
+            <p:ph type="subTitle" idx="1"/>
+          </p:nvPr>
+        </p:nvSpPr>
+        <p:spPr/>
+        <p:txBody>
+          <a:bodyPr/>
+          <a:lstStyle/>
+          <a:p>
+            <a:endParaRPr lang="en-US"/>
+          </a:p>
+        </p:txBody>
+      </p:sp>
+      <p:pic>
+        <p:nvPicPr>
+          <p:cNvPr id="4" name="Bild 3"/>
+          <p:cNvPicPr>
+            <a:picLocks noChangeAspect="1"/>
+          </p:cNvPicPr>
+          <p:nvPr/>
+        </p:nvPicPr>
+        <p:blipFill rotWithShape="1">
+          <a:blip r:embed="rId2"/>
+          <a:srcRect t="5723"/>
+          <a:stretch/>
+        </p:blipFill>
+        <p:spPr>
+          <a:xfrm>
+            <a:off x="1285460" y="389466"/>
+            <a:ext cx="9512577" cy="6415573"/>
+          </a:xfrm>
+          <a:prstGeom prst="rect">
+            <a:avLst/>
+          </a:prstGeom>
+        </p:spPr>
+      </p:pic>
+      <p:sp>
+        <p:nvSpPr>
+          <p:cNvPr id="5" name="Oval 4"/>
+          <p:cNvSpPr/>
+          <p:nvPr/>
+        </p:nvSpPr>
+        <p:spPr>
+          <a:xfrm>
+            <a:off x="5408226" y="2801620"/>
+            <a:ext cx="1296035" cy="1254760"/>
+          </a:xfrm>
+          <a:prstGeom prst="ellipse">
+            <a:avLst/>
+          </a:prstGeom>
+          <a:solidFill>
+            <a:schemeClr val="accent1">
+              <a:alpha val="20000"/>
+            </a:schemeClr>
+          </a:solidFill>
+        </p:spPr>
+        <p:style>
+          <a:lnRef idx="2">
+            <a:schemeClr val="accent1">
+              <a:shade val="50000"/>
+            </a:schemeClr>
+          </a:lnRef>
+          <a:fillRef idx="1">
+            <a:schemeClr val="accent1"/>
+          </a:fillRef>
+          <a:effectRef idx="0">
+            <a:schemeClr val="accent1"/>
+          </a:effectRef>
+          <a:fontRef idx="minor">
+            <a:schemeClr val="lt1"/>
+          </a:fontRef>
+        </p:style>
+        <p:txBody>
+          <a:bodyPr rot="0" spcFirstLastPara="0" vert="horz" wrap="square" lIns="91440" tIns="45720" rIns="91440" bIns="45720" numCol="1" spcCol="0" rtlCol="0" fromWordArt="0" anchor="ctr" anchorCtr="0" forceAA="0" compatLnSpc="1">
+            <a:prstTxWarp prst="textNoShape">
+              <a:avLst/>
+            </a:prstTxWarp>
+            <a:noAutofit/>
+          </a:bodyPr>
+          <a:lstStyle/>
+          <a:p>
+            <a:endParaRPr lang="de-DE"/>
+          </a:p>
+        </p:txBody>
+      </p:sp>
+      <p:sp>
+        <p:nvSpPr>
+          <p:cNvPr id="6" name="Oval 5"/>
+          <p:cNvSpPr/>
+          <p:nvPr/>
+        </p:nvSpPr>
+        <p:spPr>
+          <a:xfrm>
+            <a:off x="4009469" y="3028823"/>
+            <a:ext cx="1296035" cy="1254760"/>
+          </a:xfrm>
+          <a:prstGeom prst="ellipse">
+            <a:avLst/>
+          </a:prstGeom>
+          <a:solidFill>
+            <a:schemeClr val="accent1">
+              <a:alpha val="20000"/>
+            </a:schemeClr>
+          </a:solidFill>
+        </p:spPr>
+        <p:style>
+          <a:lnRef idx="2">
+            <a:schemeClr val="accent1">
+              <a:shade val="50000"/>
+            </a:schemeClr>
+          </a:lnRef>
+          <a:fillRef idx="1">
+            <a:schemeClr val="accent1"/>
+          </a:fillRef>
+          <a:effectRef idx="0">
+            <a:schemeClr val="accent1"/>
+          </a:effectRef>
+          <a:fontRef idx="minor">
+            <a:schemeClr val="lt1"/>
+          </a:fontRef>
+        </p:style>
+        <p:txBody>
+          <a:bodyPr rot="0" spcFirstLastPara="0" vert="horz" wrap="square" lIns="91440" tIns="45720" rIns="91440" bIns="45720" numCol="1" spcCol="0" rtlCol="0" fromWordArt="0" anchor="ctr" anchorCtr="0" forceAA="0" compatLnSpc="1">
+            <a:prstTxWarp prst="textNoShape">
+              <a:avLst/>
+            </a:prstTxWarp>
+            <a:noAutofit/>
+          </a:bodyPr>
+          <a:lstStyle/>
+          <a:p>
+            <a:endParaRPr lang="de-DE"/>
+          </a:p>
+        </p:txBody>
+      </p:sp>
+      <p:sp>
+        <p:nvSpPr>
+          <p:cNvPr id="7" name="Oval 6"/>
+          <p:cNvSpPr/>
+          <p:nvPr/>
+        </p:nvSpPr>
+        <p:spPr>
+          <a:xfrm>
+            <a:off x="2320469" y="2546647"/>
+            <a:ext cx="1296035" cy="1254760"/>
+          </a:xfrm>
+          <a:prstGeom prst="ellipse">
+            <a:avLst/>
+          </a:prstGeom>
+          <a:solidFill>
+            <a:schemeClr val="accent1">
+              <a:alpha val="20000"/>
+            </a:schemeClr>
+          </a:solidFill>
+        </p:spPr>
+        <p:style>
+          <a:lnRef idx="2">
+            <a:schemeClr val="accent1">
+              <a:shade val="50000"/>
+            </a:schemeClr>
+          </a:lnRef>
+          <a:fillRef idx="1">
+            <a:schemeClr val="accent1"/>
+          </a:fillRef>
+          <a:effectRef idx="0">
+            <a:schemeClr val="accent1"/>
+          </a:effectRef>
+          <a:fontRef idx="minor">
+            <a:schemeClr val="lt1"/>
+          </a:fontRef>
+        </p:style>
+        <p:txBody>
+          <a:bodyPr rot="0" spcFirstLastPara="0" vert="horz" wrap="square" lIns="91440" tIns="45720" rIns="91440" bIns="45720" numCol="1" spcCol="0" rtlCol="0" fromWordArt="0" anchor="ctr" anchorCtr="0" forceAA="0" compatLnSpc="1">
+            <a:prstTxWarp prst="textNoShape">
+              <a:avLst/>
+            </a:prstTxWarp>
+            <a:noAutofit/>
+          </a:bodyPr>
+          <a:lstStyle/>
+          <a:p>
+            <a:endParaRPr lang="de-DE"/>
+          </a:p>
+        </p:txBody>
+      </p:sp>
+      <p:sp>
+        <p:nvSpPr>
+          <p:cNvPr id="8" name="Oval 7"/>
+          <p:cNvSpPr/>
+          <p:nvPr/>
+        </p:nvSpPr>
+        <p:spPr>
+          <a:xfrm>
+            <a:off x="7790972" y="1832831"/>
+            <a:ext cx="1296035" cy="1254760"/>
+          </a:xfrm>
+          <a:prstGeom prst="ellipse">
+            <a:avLst/>
+          </a:prstGeom>
+          <a:solidFill>
+            <a:schemeClr val="accent1">
+              <a:alpha val="20000"/>
+            </a:schemeClr>
+          </a:solidFill>
+        </p:spPr>
+        <p:style>
+          <a:lnRef idx="2">
+            <a:schemeClr val="accent1">
+              <a:shade val="50000"/>
+            </a:schemeClr>
+          </a:lnRef>
+          <a:fillRef idx="1">
+            <a:schemeClr val="accent1"/>
+          </a:fillRef>
+          <a:effectRef idx="0">
+            <a:schemeClr val="accent1"/>
+          </a:effectRef>
+          <a:fontRef idx="minor">
+            <a:schemeClr val="lt1"/>
+          </a:fontRef>
+        </p:style>
+        <p:txBody>
+          <a:bodyPr rot="0" spcFirstLastPara="0" vert="horz" wrap="square" lIns="91440" tIns="45720" rIns="91440" bIns="45720" numCol="1" spcCol="0" rtlCol="0" fromWordArt="0" anchor="ctr" anchorCtr="0" forceAA="0" compatLnSpc="1">
+            <a:prstTxWarp prst="textNoShape">
+              <a:avLst/>
+            </a:prstTxWarp>
+            <a:noAutofit/>
+          </a:bodyPr>
+          <a:lstStyle/>
+          <a:p>
+            <a:endParaRPr lang="de-DE"/>
+          </a:p>
+        </p:txBody>
+      </p:sp>
+      <p:sp>
+        <p:nvSpPr>
+          <p:cNvPr id="9" name="Oval 8"/>
+          <p:cNvSpPr/>
+          <p:nvPr/>
+        </p:nvSpPr>
+        <p:spPr>
+          <a:xfrm>
+            <a:off x="2761774" y="4000776"/>
+            <a:ext cx="1296035" cy="1254760"/>
+          </a:xfrm>
+          <a:prstGeom prst="ellipse">
+            <a:avLst/>
+          </a:prstGeom>
+          <a:solidFill>
+            <a:schemeClr val="accent1">
+              <a:alpha val="20000"/>
+            </a:schemeClr>
+          </a:solidFill>
+        </p:spPr>
+        <p:style>
+          <a:lnRef idx="2">
+            <a:schemeClr val="accent1">
+              <a:shade val="50000"/>
+            </a:schemeClr>
+          </a:lnRef>
+          <a:fillRef idx="1">
+            <a:schemeClr val="accent1"/>
+          </a:fillRef>
+          <a:effectRef idx="0">
+            <a:schemeClr val="accent1"/>
+          </a:effectRef>
+          <a:fontRef idx="minor">
+            <a:schemeClr val="lt1"/>
+          </a:fontRef>
+        </p:style>
+        <p:txBody>
+          <a:bodyPr rot="0" spcFirstLastPara="0" vert="horz" wrap="square" lIns="91440" tIns="45720" rIns="91440" bIns="45720" numCol="1" spcCol="0" rtlCol="0" fromWordArt="0" anchor="ctr" anchorCtr="0" forceAA="0" compatLnSpc="1">
+            <a:prstTxWarp prst="textNoShape">
+              <a:avLst/>
+            </a:prstTxWarp>
+            <a:noAutofit/>
+          </a:bodyPr>
+          <a:lstStyle/>
+          <a:p>
+            <a:endParaRPr lang="de-DE"/>
+          </a:p>
+        </p:txBody>
+      </p:sp>
+      <p:sp>
+        <p:nvSpPr>
+          <p:cNvPr id="10" name="Oval 9"/>
+          <p:cNvSpPr/>
+          <p:nvPr/>
+        </p:nvSpPr>
+        <p:spPr>
+          <a:xfrm>
+            <a:off x="7018365" y="4429919"/>
+            <a:ext cx="1296035" cy="1254760"/>
+          </a:xfrm>
+          <a:prstGeom prst="ellipse">
+            <a:avLst/>
+          </a:prstGeom>
+          <a:solidFill>
+            <a:schemeClr val="accent1">
+              <a:alpha val="20000"/>
+            </a:schemeClr>
+          </a:solidFill>
+        </p:spPr>
+        <p:style>
+          <a:lnRef idx="2">
+            <a:schemeClr val="accent1">
+              <a:shade val="50000"/>
+            </a:schemeClr>
+          </a:lnRef>
+          <a:fillRef idx="1">
+            <a:schemeClr val="accent1"/>
+          </a:fillRef>
+          <a:effectRef idx="0">
+            <a:schemeClr val="accent1"/>
+          </a:effectRef>
+          <a:fontRef idx="minor">
+            <a:schemeClr val="lt1"/>
+          </a:fontRef>
+        </p:style>
+        <p:txBody>
+          <a:bodyPr rot="0" spcFirstLastPara="0" vert="horz" wrap="square" lIns="91440" tIns="45720" rIns="91440" bIns="45720" numCol="1" spcCol="0" rtlCol="0" fromWordArt="0" anchor="ctr" anchorCtr="0" forceAA="0" compatLnSpc="1">
+            <a:prstTxWarp prst="textNoShape">
+              <a:avLst/>
+            </a:prstTxWarp>
+            <a:noAutofit/>
+          </a:bodyPr>
+          <a:lstStyle/>
+          <a:p>
+            <a:endParaRPr lang="de-DE"/>
+          </a:p>
+        </p:txBody>
+      </p:sp>
+      <p:sp>
+        <p:nvSpPr>
+          <p:cNvPr id="11" name="Oval 10"/>
+          <p:cNvSpPr/>
+          <p:nvPr/>
+        </p:nvSpPr>
+        <p:spPr>
+          <a:xfrm>
+            <a:off x="6744017" y="2649220"/>
+            <a:ext cx="1296035" cy="1254760"/>
+          </a:xfrm>
+          <a:prstGeom prst="ellipse">
+            <a:avLst/>
+          </a:prstGeom>
+          <a:solidFill>
+            <a:schemeClr val="accent1">
+              <a:alpha val="20000"/>
+            </a:schemeClr>
+          </a:solidFill>
+        </p:spPr>
+        <p:style>
+          <a:lnRef idx="2">
+            <a:schemeClr val="accent1">
+              <a:shade val="50000"/>
+            </a:schemeClr>
+          </a:lnRef>
+          <a:fillRef idx="1">
+            <a:schemeClr val="accent1"/>
+          </a:fillRef>
+          <a:effectRef idx="0">
+            <a:schemeClr val="accent1"/>
+          </a:effectRef>
+          <a:fontRef idx="minor">
+            <a:schemeClr val="lt1"/>
+          </a:fontRef>
+        </p:style>
+        <p:txBody>
+          <a:bodyPr rot="0" spcFirstLastPara="0" vert="horz" wrap="square" lIns="91440" tIns="45720" rIns="91440" bIns="45720" numCol="1" spcCol="0" rtlCol="0" fromWordArt="0" anchor="ctr" anchorCtr="0" forceAA="0" compatLnSpc="1">
+            <a:prstTxWarp prst="textNoShape">
+              <a:avLst/>
+            </a:prstTxWarp>
+            <a:noAutofit/>
+          </a:bodyPr>
+          <a:lstStyle/>
+          <a:p>
+            <a:endParaRPr lang="de-DE"/>
+          </a:p>
+        </p:txBody>
+      </p:sp>
+      <p:sp>
+        <p:nvSpPr>
+          <p:cNvPr id="12" name="Oval 11"/>
+          <p:cNvSpPr/>
+          <p:nvPr/>
+        </p:nvSpPr>
+        <p:spPr>
+          <a:xfrm>
+            <a:off x="2191930" y="5349875"/>
+            <a:ext cx="1296035" cy="1254760"/>
+          </a:xfrm>
+          <a:prstGeom prst="ellipse">
+            <a:avLst/>
+          </a:prstGeom>
+          <a:solidFill>
+            <a:schemeClr val="accent1">
+              <a:alpha val="20000"/>
+            </a:schemeClr>
+          </a:solidFill>
+        </p:spPr>
+        <p:style>
+          <a:lnRef idx="2">
+            <a:schemeClr val="accent1">
+              <a:shade val="50000"/>
+            </a:schemeClr>
+          </a:lnRef>
+          <a:fillRef idx="1">
+            <a:schemeClr val="accent1"/>
+          </a:fillRef>
+          <a:effectRef idx="0">
+            <a:schemeClr val="accent1"/>
+          </a:effectRef>
+          <a:fontRef idx="minor">
+            <a:schemeClr val="lt1"/>
+          </a:fontRef>
+        </p:style>
+        <p:txBody>
+          <a:bodyPr rot="0" spcFirstLastPara="0" vert="horz" wrap="square" lIns="91440" tIns="45720" rIns="91440" bIns="45720" numCol="1" spcCol="0" rtlCol="0" fromWordArt="0" anchor="ctr" anchorCtr="0" forceAA="0" compatLnSpc="1">
+            <a:prstTxWarp prst="textNoShape">
+              <a:avLst/>
+            </a:prstTxWarp>
+            <a:noAutofit/>
+          </a:bodyPr>
+          <a:lstStyle/>
+          <a:p>
+            <a:endParaRPr lang="de-DE"/>
+          </a:p>
+        </p:txBody>
+      </p:sp>
+      <p:sp>
+        <p:nvSpPr>
+          <p:cNvPr id="13" name="Oval 12"/>
+          <p:cNvSpPr/>
+          <p:nvPr/>
+        </p:nvSpPr>
+        <p:spPr>
+          <a:xfrm>
+            <a:off x="4664765" y="4619342"/>
+            <a:ext cx="1296035" cy="1254760"/>
+          </a:xfrm>
+          <a:prstGeom prst="ellipse">
+            <a:avLst/>
+          </a:prstGeom>
+          <a:solidFill>
+            <a:schemeClr val="accent1">
+              <a:alpha val="20000"/>
+            </a:schemeClr>
+          </a:solidFill>
+        </p:spPr>
+        <p:style>
+          <a:lnRef idx="2">
+            <a:schemeClr val="accent1">
+              <a:shade val="50000"/>
+            </a:schemeClr>
+          </a:lnRef>
+          <a:fillRef idx="1">
+            <a:schemeClr val="accent1"/>
+          </a:fillRef>
+          <a:effectRef idx="0">
+            <a:schemeClr val="accent1"/>
+          </a:effectRef>
+          <a:fontRef idx="minor">
+            <a:schemeClr val="lt1"/>
+          </a:fontRef>
+        </p:style>
+        <p:txBody>
+          <a:bodyPr rot="0" spcFirstLastPara="0" vert="horz" wrap="square" lIns="91440" tIns="45720" rIns="91440" bIns="45720" numCol="1" spcCol="0" rtlCol="0" fromWordArt="0" anchor="ctr" anchorCtr="0" forceAA="0" compatLnSpc="1">
+            <a:prstTxWarp prst="textNoShape">
+              <a:avLst/>
+            </a:prstTxWarp>
+            <a:noAutofit/>
+          </a:bodyPr>
+          <a:lstStyle/>
+          <a:p>
+            <a:endParaRPr lang="de-DE"/>
+          </a:p>
+        </p:txBody>
+      </p:sp>
+      <p:sp>
+        <p:nvSpPr>
+          <p:cNvPr id="14" name="Oval 13"/>
+          <p:cNvSpPr/>
+          <p:nvPr/>
+        </p:nvSpPr>
+        <p:spPr>
+          <a:xfrm>
+            <a:off x="2320468" y="1207125"/>
+            <a:ext cx="1296035" cy="1254760"/>
+          </a:xfrm>
+          <a:prstGeom prst="ellipse">
+            <a:avLst/>
+          </a:prstGeom>
+          <a:solidFill>
+            <a:schemeClr val="accent1">
+              <a:alpha val="20000"/>
+            </a:schemeClr>
+          </a:solidFill>
+        </p:spPr>
+        <p:style>
+          <a:lnRef idx="2">
+            <a:schemeClr val="accent1">
+              <a:shade val="50000"/>
+            </a:schemeClr>
+          </a:lnRef>
+          <a:fillRef idx="1">
+            <a:schemeClr val="accent1"/>
+          </a:fillRef>
+          <a:effectRef idx="0">
+            <a:schemeClr val="accent1"/>
+          </a:effectRef>
+          <a:fontRef idx="minor">
+            <a:schemeClr val="lt1"/>
+          </a:fontRef>
+        </p:style>
+        <p:txBody>
+          <a:bodyPr rot="0" spcFirstLastPara="0" vert="horz" wrap="square" lIns="91440" tIns="45720" rIns="91440" bIns="45720" numCol="1" spcCol="0" rtlCol="0" fromWordArt="0" anchor="ctr" anchorCtr="0" forceAA="0" compatLnSpc="1">
+            <a:prstTxWarp prst="textNoShape">
+              <a:avLst/>
+            </a:prstTxWarp>
+            <a:noAutofit/>
+          </a:bodyPr>
+          <a:lstStyle/>
+          <a:p>
+            <a:endParaRPr lang="de-DE"/>
+          </a:p>
+        </p:txBody>
+      </p:sp>
+    </p:spTree>
+    <p:extLst>
+      <p:ext uri="{BB962C8B-B14F-4D97-AF65-F5344CB8AC3E}">
+        <p14:creationId xmlns:p14="http://schemas.microsoft.com/office/powerpoint/2010/main" val="686632633"/>
+      </p:ext>
+    </p:extLst>
+  </p:cSld>
+  <p:clrMapOvr>
+    <a:masterClrMapping/>
+  </p:clrMapOvr>
+</p:sld>
+</file>
+
+<file path=ppt/slides/slide9.xml><?xml version="1.0" encoding="utf-8"?>
+<p:sld xmlns:a="http://schemas.openxmlformats.org/drawingml/2006/main" xmlns:r="http://schemas.openxmlformats.org/officeDocument/2006/relationships" xmlns:p="http://schemas.openxmlformats.org/presentationml/2006/main">
+  <p:cSld>
+    <p:spTree>
+      <p:nvGrpSpPr>
+        <p:cNvPr id="1" name=""/>
+        <p:cNvGrpSpPr/>
+        <p:nvPr/>
+      </p:nvGrpSpPr>
+      <p:grpSpPr>
+        <a:xfrm>
+          <a:off x="0" y="0"/>
+          <a:ext cx="0" cy="0"/>
+          <a:chOff x="0" y="0"/>
+          <a:chExt cx="0" cy="0"/>
+        </a:xfrm>
+      </p:grpSpPr>
+      <p:sp>
+        <p:nvSpPr>
+          <p:cNvPr id="2" name="Titel 1"/>
+          <p:cNvSpPr>
+            <a:spLocks noGrp="1"/>
+          </p:cNvSpPr>
+          <p:nvPr>
+            <p:ph type="title"/>
+          </p:nvPr>
+        </p:nvSpPr>
+        <p:spPr/>
+        <p:txBody>
+          <a:bodyPr/>
+          <a:lstStyle/>
+          <a:p>
+            <a:r>
+              <a:rPr lang="en-US" dirty="0"/>
+              <a:t>Notification Preferences</a:t>
+            </a:r>
+          </a:p>
+        </p:txBody>
+      </p:sp>
       <p:pic>
         <p:nvPicPr>
           <p:cNvPr id="4" name="Bild 3"/>
@@ -4976,8 +5739,32 @@
         </p:blipFill>
         <p:spPr>
           <a:xfrm>
-            <a:off x="1924050" y="444500"/>
-            <a:ext cx="8343900" cy="5969000"/>
+            <a:off x="838199" y="1825625"/>
+            <a:ext cx="4575483" cy="3753540"/>
+          </a:xfrm>
+          <a:prstGeom prst="rect">
+            <a:avLst/>
+          </a:prstGeom>
+        </p:spPr>
+      </p:pic>
+      <p:pic>
+        <p:nvPicPr>
+          <p:cNvPr id="5" name="Bild 4"/>
+          <p:cNvPicPr>
+            <a:picLocks noChangeAspect="1"/>
+          </p:cNvPicPr>
+          <p:nvPr/>
+        </p:nvPicPr>
+        <p:blipFill>
+          <a:blip r:embed="rId3"/>
+          <a:stretch>
+            <a:fillRect/>
+          </a:stretch>
+        </p:blipFill>
+        <p:spPr>
+          <a:xfrm>
+            <a:off x="6641326" y="1825625"/>
+            <a:ext cx="4712474" cy="3753540"/>
           </a:xfrm>
           <a:prstGeom prst="rect">
             <a:avLst/>
@@ -4987,7 +5774,7 @@
     </p:spTree>
     <p:extLst>
       <p:ext uri="{BB962C8B-B14F-4D97-AF65-F5344CB8AC3E}">
-        <p14:creationId xmlns:p14="http://schemas.microsoft.com/office/powerpoint/2010/main" val="974653"/>
+        <p14:creationId xmlns:p14="http://schemas.microsoft.com/office/powerpoint/2010/main" val="504889330"/>
       </p:ext>
     </p:extLst>
   </p:cSld>

</xml_diff>

<commit_message>
split slide on tech landscape
</commit_message>
<xml_diff>
--- a/beacon.pptx
+++ b/beacon.pptx
@@ -5,20 +5,22 @@
     <p:sldMasterId id="2147483744" r:id="rId1"/>
   </p:sldMasterIdLst>
   <p:notesMasterIdLst>
-    <p:notesMasterId r:id="rId13"/>
+    <p:notesMasterId r:id="rId15"/>
   </p:notesMasterIdLst>
   <p:sldIdLst>
     <p:sldId id="265" r:id="rId2"/>
     <p:sldId id="266" r:id="rId3"/>
-    <p:sldId id="267" r:id="rId4"/>
-    <p:sldId id="268" r:id="rId5"/>
-    <p:sldId id="269" r:id="rId6"/>
-    <p:sldId id="270" r:id="rId7"/>
-    <p:sldId id="258" r:id="rId8"/>
-    <p:sldId id="256" r:id="rId9"/>
-    <p:sldId id="261" r:id="rId10"/>
-    <p:sldId id="262" r:id="rId11"/>
-    <p:sldId id="264" r:id="rId12"/>
+    <p:sldId id="271" r:id="rId4"/>
+    <p:sldId id="272" r:id="rId5"/>
+    <p:sldId id="273" r:id="rId6"/>
+    <p:sldId id="268" r:id="rId7"/>
+    <p:sldId id="269" r:id="rId8"/>
+    <p:sldId id="270" r:id="rId9"/>
+    <p:sldId id="258" r:id="rId10"/>
+    <p:sldId id="256" r:id="rId11"/>
+    <p:sldId id="261" r:id="rId12"/>
+    <p:sldId id="262" r:id="rId13"/>
+    <p:sldId id="264" r:id="rId14"/>
   </p:sldIdLst>
   <p:sldSz cx="12192000" cy="6858000"/>
   <p:notesSz cx="6858000" cy="9144000"/>
@@ -4282,6 +4284,649 @@
         </p:nvPicPr>
         <p:blipFill rotWithShape="1">
           <a:blip r:embed="rId2"/>
+          <a:srcRect t="5723"/>
+          <a:stretch/>
+        </p:blipFill>
+        <p:spPr>
+          <a:xfrm>
+            <a:off x="1376155" y="-30654"/>
+            <a:ext cx="9348996" cy="6305249"/>
+          </a:xfrm>
+          <a:prstGeom prst="rect">
+            <a:avLst/>
+          </a:prstGeom>
+        </p:spPr>
+      </p:pic>
+      <p:sp>
+        <p:nvSpPr>
+          <p:cNvPr id="5" name="Oval 4"/>
+          <p:cNvSpPr/>
+          <p:nvPr/>
+        </p:nvSpPr>
+        <p:spPr>
+          <a:xfrm>
+            <a:off x="5408226" y="2260676"/>
+            <a:ext cx="1296035" cy="1254760"/>
+          </a:xfrm>
+          <a:prstGeom prst="ellipse">
+            <a:avLst/>
+          </a:prstGeom>
+          <a:solidFill>
+            <a:schemeClr val="accent1">
+              <a:alpha val="20000"/>
+            </a:schemeClr>
+          </a:solidFill>
+        </p:spPr>
+        <p:style>
+          <a:lnRef idx="2">
+            <a:schemeClr val="accent1">
+              <a:shade val="50000"/>
+            </a:schemeClr>
+          </a:lnRef>
+          <a:fillRef idx="1">
+            <a:schemeClr val="accent1"/>
+          </a:fillRef>
+          <a:effectRef idx="0">
+            <a:schemeClr val="accent1"/>
+          </a:effectRef>
+          <a:fontRef idx="minor">
+            <a:schemeClr val="lt1"/>
+          </a:fontRef>
+        </p:style>
+        <p:txBody>
+          <a:bodyPr rot="0" spcFirstLastPara="0" vert="horz" wrap="square" lIns="91440" tIns="45720" rIns="91440" bIns="45720" numCol="1" spcCol="0" rtlCol="0" fromWordArt="0" anchor="ctr" anchorCtr="0" forceAA="0" compatLnSpc="1">
+            <a:prstTxWarp prst="textNoShape">
+              <a:avLst/>
+            </a:prstTxWarp>
+            <a:noAutofit/>
+          </a:bodyPr>
+          <a:lstStyle/>
+          <a:p>
+            <a:endParaRPr lang="de-DE"/>
+          </a:p>
+        </p:txBody>
+      </p:sp>
+      <p:sp>
+        <p:nvSpPr>
+          <p:cNvPr id="6" name="Oval 5"/>
+          <p:cNvSpPr/>
+          <p:nvPr/>
+        </p:nvSpPr>
+        <p:spPr>
+          <a:xfrm>
+            <a:off x="4009469" y="2487879"/>
+            <a:ext cx="1296035" cy="1254760"/>
+          </a:xfrm>
+          <a:prstGeom prst="ellipse">
+            <a:avLst/>
+          </a:prstGeom>
+          <a:solidFill>
+            <a:schemeClr val="accent1">
+              <a:alpha val="20000"/>
+            </a:schemeClr>
+          </a:solidFill>
+        </p:spPr>
+        <p:style>
+          <a:lnRef idx="2">
+            <a:schemeClr val="accent1">
+              <a:shade val="50000"/>
+            </a:schemeClr>
+          </a:lnRef>
+          <a:fillRef idx="1">
+            <a:schemeClr val="accent1"/>
+          </a:fillRef>
+          <a:effectRef idx="0">
+            <a:schemeClr val="accent1"/>
+          </a:effectRef>
+          <a:fontRef idx="minor">
+            <a:schemeClr val="lt1"/>
+          </a:fontRef>
+        </p:style>
+        <p:txBody>
+          <a:bodyPr rot="0" spcFirstLastPara="0" vert="horz" wrap="square" lIns="91440" tIns="45720" rIns="91440" bIns="45720" numCol="1" spcCol="0" rtlCol="0" fromWordArt="0" anchor="ctr" anchorCtr="0" forceAA="0" compatLnSpc="1">
+            <a:prstTxWarp prst="textNoShape">
+              <a:avLst/>
+            </a:prstTxWarp>
+            <a:noAutofit/>
+          </a:bodyPr>
+          <a:lstStyle/>
+          <a:p>
+            <a:endParaRPr lang="de-DE"/>
+          </a:p>
+        </p:txBody>
+      </p:sp>
+      <p:sp>
+        <p:nvSpPr>
+          <p:cNvPr id="7" name="Oval 6"/>
+          <p:cNvSpPr/>
+          <p:nvPr/>
+        </p:nvSpPr>
+        <p:spPr>
+          <a:xfrm>
+            <a:off x="2320469" y="2005703"/>
+            <a:ext cx="1296035" cy="1254760"/>
+          </a:xfrm>
+          <a:prstGeom prst="ellipse">
+            <a:avLst/>
+          </a:prstGeom>
+          <a:solidFill>
+            <a:schemeClr val="accent1">
+              <a:alpha val="20000"/>
+            </a:schemeClr>
+          </a:solidFill>
+        </p:spPr>
+        <p:style>
+          <a:lnRef idx="2">
+            <a:schemeClr val="accent1">
+              <a:shade val="50000"/>
+            </a:schemeClr>
+          </a:lnRef>
+          <a:fillRef idx="1">
+            <a:schemeClr val="accent1"/>
+          </a:fillRef>
+          <a:effectRef idx="0">
+            <a:schemeClr val="accent1"/>
+          </a:effectRef>
+          <a:fontRef idx="minor">
+            <a:schemeClr val="lt1"/>
+          </a:fontRef>
+        </p:style>
+        <p:txBody>
+          <a:bodyPr rot="0" spcFirstLastPara="0" vert="horz" wrap="square" lIns="91440" tIns="45720" rIns="91440" bIns="45720" numCol="1" spcCol="0" rtlCol="0" fromWordArt="0" anchor="ctr" anchorCtr="0" forceAA="0" compatLnSpc="1">
+            <a:prstTxWarp prst="textNoShape">
+              <a:avLst/>
+            </a:prstTxWarp>
+            <a:noAutofit/>
+          </a:bodyPr>
+          <a:lstStyle/>
+          <a:p>
+            <a:endParaRPr lang="de-DE"/>
+          </a:p>
+        </p:txBody>
+      </p:sp>
+      <p:sp>
+        <p:nvSpPr>
+          <p:cNvPr id="8" name="Oval 7"/>
+          <p:cNvSpPr/>
+          <p:nvPr/>
+        </p:nvSpPr>
+        <p:spPr>
+          <a:xfrm>
+            <a:off x="7790972" y="1291887"/>
+            <a:ext cx="1296035" cy="1254760"/>
+          </a:xfrm>
+          <a:prstGeom prst="ellipse">
+            <a:avLst/>
+          </a:prstGeom>
+          <a:solidFill>
+            <a:schemeClr val="accent1">
+              <a:alpha val="20000"/>
+            </a:schemeClr>
+          </a:solidFill>
+        </p:spPr>
+        <p:style>
+          <a:lnRef idx="2">
+            <a:schemeClr val="accent1">
+              <a:shade val="50000"/>
+            </a:schemeClr>
+          </a:lnRef>
+          <a:fillRef idx="1">
+            <a:schemeClr val="accent1"/>
+          </a:fillRef>
+          <a:effectRef idx="0">
+            <a:schemeClr val="accent1"/>
+          </a:effectRef>
+          <a:fontRef idx="minor">
+            <a:schemeClr val="lt1"/>
+          </a:fontRef>
+        </p:style>
+        <p:txBody>
+          <a:bodyPr rot="0" spcFirstLastPara="0" vert="horz" wrap="square" lIns="91440" tIns="45720" rIns="91440" bIns="45720" numCol="1" spcCol="0" rtlCol="0" fromWordArt="0" anchor="ctr" anchorCtr="0" forceAA="0" compatLnSpc="1">
+            <a:prstTxWarp prst="textNoShape">
+              <a:avLst/>
+            </a:prstTxWarp>
+            <a:noAutofit/>
+          </a:bodyPr>
+          <a:lstStyle/>
+          <a:p>
+            <a:endParaRPr lang="de-DE"/>
+          </a:p>
+        </p:txBody>
+      </p:sp>
+      <p:sp>
+        <p:nvSpPr>
+          <p:cNvPr id="9" name="Oval 8"/>
+          <p:cNvSpPr/>
+          <p:nvPr/>
+        </p:nvSpPr>
+        <p:spPr>
+          <a:xfrm>
+            <a:off x="2761774" y="3459832"/>
+            <a:ext cx="1296035" cy="1254760"/>
+          </a:xfrm>
+          <a:prstGeom prst="ellipse">
+            <a:avLst/>
+          </a:prstGeom>
+          <a:solidFill>
+            <a:schemeClr val="accent1">
+              <a:alpha val="20000"/>
+            </a:schemeClr>
+          </a:solidFill>
+        </p:spPr>
+        <p:style>
+          <a:lnRef idx="2">
+            <a:schemeClr val="accent1">
+              <a:shade val="50000"/>
+            </a:schemeClr>
+          </a:lnRef>
+          <a:fillRef idx="1">
+            <a:schemeClr val="accent1"/>
+          </a:fillRef>
+          <a:effectRef idx="0">
+            <a:schemeClr val="accent1"/>
+          </a:effectRef>
+          <a:fontRef idx="minor">
+            <a:schemeClr val="lt1"/>
+          </a:fontRef>
+        </p:style>
+        <p:txBody>
+          <a:bodyPr rot="0" spcFirstLastPara="0" vert="horz" wrap="square" lIns="91440" tIns="45720" rIns="91440" bIns="45720" numCol="1" spcCol="0" rtlCol="0" fromWordArt="0" anchor="ctr" anchorCtr="0" forceAA="0" compatLnSpc="1">
+            <a:prstTxWarp prst="textNoShape">
+              <a:avLst/>
+            </a:prstTxWarp>
+            <a:noAutofit/>
+          </a:bodyPr>
+          <a:lstStyle/>
+          <a:p>
+            <a:endParaRPr lang="de-DE"/>
+          </a:p>
+        </p:txBody>
+      </p:sp>
+      <p:sp>
+        <p:nvSpPr>
+          <p:cNvPr id="10" name="Oval 9"/>
+          <p:cNvSpPr/>
+          <p:nvPr/>
+        </p:nvSpPr>
+        <p:spPr>
+          <a:xfrm>
+            <a:off x="7018365" y="3888975"/>
+            <a:ext cx="1296035" cy="1254760"/>
+          </a:xfrm>
+          <a:prstGeom prst="ellipse">
+            <a:avLst/>
+          </a:prstGeom>
+          <a:solidFill>
+            <a:schemeClr val="accent1">
+              <a:alpha val="20000"/>
+            </a:schemeClr>
+          </a:solidFill>
+        </p:spPr>
+        <p:style>
+          <a:lnRef idx="2">
+            <a:schemeClr val="accent1">
+              <a:shade val="50000"/>
+            </a:schemeClr>
+          </a:lnRef>
+          <a:fillRef idx="1">
+            <a:schemeClr val="accent1"/>
+          </a:fillRef>
+          <a:effectRef idx="0">
+            <a:schemeClr val="accent1"/>
+          </a:effectRef>
+          <a:fontRef idx="minor">
+            <a:schemeClr val="lt1"/>
+          </a:fontRef>
+        </p:style>
+        <p:txBody>
+          <a:bodyPr rot="0" spcFirstLastPara="0" vert="horz" wrap="square" lIns="91440" tIns="45720" rIns="91440" bIns="45720" numCol="1" spcCol="0" rtlCol="0" fromWordArt="0" anchor="ctr" anchorCtr="0" forceAA="0" compatLnSpc="1">
+            <a:prstTxWarp prst="textNoShape">
+              <a:avLst/>
+            </a:prstTxWarp>
+            <a:noAutofit/>
+          </a:bodyPr>
+          <a:lstStyle/>
+          <a:p>
+            <a:endParaRPr lang="de-DE"/>
+          </a:p>
+        </p:txBody>
+      </p:sp>
+      <p:sp>
+        <p:nvSpPr>
+          <p:cNvPr id="11" name="Oval 10"/>
+          <p:cNvSpPr/>
+          <p:nvPr/>
+        </p:nvSpPr>
+        <p:spPr>
+          <a:xfrm>
+            <a:off x="6744017" y="2108276"/>
+            <a:ext cx="1296035" cy="1254760"/>
+          </a:xfrm>
+          <a:prstGeom prst="ellipse">
+            <a:avLst/>
+          </a:prstGeom>
+          <a:solidFill>
+            <a:schemeClr val="accent1">
+              <a:alpha val="20000"/>
+            </a:schemeClr>
+          </a:solidFill>
+        </p:spPr>
+        <p:style>
+          <a:lnRef idx="2">
+            <a:schemeClr val="accent1">
+              <a:shade val="50000"/>
+            </a:schemeClr>
+          </a:lnRef>
+          <a:fillRef idx="1">
+            <a:schemeClr val="accent1"/>
+          </a:fillRef>
+          <a:effectRef idx="0">
+            <a:schemeClr val="accent1"/>
+          </a:effectRef>
+          <a:fontRef idx="minor">
+            <a:schemeClr val="lt1"/>
+          </a:fontRef>
+        </p:style>
+        <p:txBody>
+          <a:bodyPr rot="0" spcFirstLastPara="0" vert="horz" wrap="square" lIns="91440" tIns="45720" rIns="91440" bIns="45720" numCol="1" spcCol="0" rtlCol="0" fromWordArt="0" anchor="ctr" anchorCtr="0" forceAA="0" compatLnSpc="1">
+            <a:prstTxWarp prst="textNoShape">
+              <a:avLst/>
+            </a:prstTxWarp>
+            <a:noAutofit/>
+          </a:bodyPr>
+          <a:lstStyle/>
+          <a:p>
+            <a:endParaRPr lang="de-DE"/>
+          </a:p>
+        </p:txBody>
+      </p:sp>
+      <p:sp>
+        <p:nvSpPr>
+          <p:cNvPr id="12" name="Oval 11"/>
+          <p:cNvSpPr/>
+          <p:nvPr/>
+        </p:nvSpPr>
+        <p:spPr>
+          <a:xfrm>
+            <a:off x="2191930" y="4808931"/>
+            <a:ext cx="1296035" cy="1254760"/>
+          </a:xfrm>
+          <a:prstGeom prst="ellipse">
+            <a:avLst/>
+          </a:prstGeom>
+          <a:solidFill>
+            <a:schemeClr val="accent1">
+              <a:alpha val="20000"/>
+            </a:schemeClr>
+          </a:solidFill>
+        </p:spPr>
+        <p:style>
+          <a:lnRef idx="2">
+            <a:schemeClr val="accent1">
+              <a:shade val="50000"/>
+            </a:schemeClr>
+          </a:lnRef>
+          <a:fillRef idx="1">
+            <a:schemeClr val="accent1"/>
+          </a:fillRef>
+          <a:effectRef idx="0">
+            <a:schemeClr val="accent1"/>
+          </a:effectRef>
+          <a:fontRef idx="minor">
+            <a:schemeClr val="lt1"/>
+          </a:fontRef>
+        </p:style>
+        <p:txBody>
+          <a:bodyPr rot="0" spcFirstLastPara="0" vert="horz" wrap="square" lIns="91440" tIns="45720" rIns="91440" bIns="45720" numCol="1" spcCol="0" rtlCol="0" fromWordArt="0" anchor="ctr" anchorCtr="0" forceAA="0" compatLnSpc="1">
+            <a:prstTxWarp prst="textNoShape">
+              <a:avLst/>
+            </a:prstTxWarp>
+            <a:noAutofit/>
+          </a:bodyPr>
+          <a:lstStyle/>
+          <a:p>
+            <a:endParaRPr lang="de-DE"/>
+          </a:p>
+        </p:txBody>
+      </p:sp>
+      <p:sp>
+        <p:nvSpPr>
+          <p:cNvPr id="13" name="Oval 12"/>
+          <p:cNvSpPr/>
+          <p:nvPr/>
+        </p:nvSpPr>
+        <p:spPr>
+          <a:xfrm>
+            <a:off x="4664765" y="4078398"/>
+            <a:ext cx="1296035" cy="1254760"/>
+          </a:xfrm>
+          <a:prstGeom prst="ellipse">
+            <a:avLst/>
+          </a:prstGeom>
+          <a:solidFill>
+            <a:schemeClr val="accent1">
+              <a:alpha val="20000"/>
+            </a:schemeClr>
+          </a:solidFill>
+        </p:spPr>
+        <p:style>
+          <a:lnRef idx="2">
+            <a:schemeClr val="accent1">
+              <a:shade val="50000"/>
+            </a:schemeClr>
+          </a:lnRef>
+          <a:fillRef idx="1">
+            <a:schemeClr val="accent1"/>
+          </a:fillRef>
+          <a:effectRef idx="0">
+            <a:schemeClr val="accent1"/>
+          </a:effectRef>
+          <a:fontRef idx="minor">
+            <a:schemeClr val="lt1"/>
+          </a:fontRef>
+        </p:style>
+        <p:txBody>
+          <a:bodyPr rot="0" spcFirstLastPara="0" vert="horz" wrap="square" lIns="91440" tIns="45720" rIns="91440" bIns="45720" numCol="1" spcCol="0" rtlCol="0" fromWordArt="0" anchor="ctr" anchorCtr="0" forceAA="0" compatLnSpc="1">
+            <a:prstTxWarp prst="textNoShape">
+              <a:avLst/>
+            </a:prstTxWarp>
+            <a:noAutofit/>
+          </a:bodyPr>
+          <a:lstStyle/>
+          <a:p>
+            <a:endParaRPr lang="de-DE"/>
+          </a:p>
+        </p:txBody>
+      </p:sp>
+      <p:sp>
+        <p:nvSpPr>
+          <p:cNvPr id="14" name="Oval 13"/>
+          <p:cNvSpPr/>
+          <p:nvPr/>
+        </p:nvSpPr>
+        <p:spPr>
+          <a:xfrm>
+            <a:off x="2320468" y="666181"/>
+            <a:ext cx="1296035" cy="1254760"/>
+          </a:xfrm>
+          <a:prstGeom prst="ellipse">
+            <a:avLst/>
+          </a:prstGeom>
+          <a:solidFill>
+            <a:schemeClr val="accent1">
+              <a:alpha val="20000"/>
+            </a:schemeClr>
+          </a:solidFill>
+        </p:spPr>
+        <p:style>
+          <a:lnRef idx="2">
+            <a:schemeClr val="accent1">
+              <a:shade val="50000"/>
+            </a:schemeClr>
+          </a:lnRef>
+          <a:fillRef idx="1">
+            <a:schemeClr val="accent1"/>
+          </a:fillRef>
+          <a:effectRef idx="0">
+            <a:schemeClr val="accent1"/>
+          </a:effectRef>
+          <a:fontRef idx="minor">
+            <a:schemeClr val="lt1"/>
+          </a:fontRef>
+        </p:style>
+        <p:txBody>
+          <a:bodyPr rot="0" spcFirstLastPara="0" vert="horz" wrap="square" lIns="91440" tIns="45720" rIns="91440" bIns="45720" numCol="1" spcCol="0" rtlCol="0" fromWordArt="0" anchor="ctr" anchorCtr="0" forceAA="0" compatLnSpc="1">
+            <a:prstTxWarp prst="textNoShape">
+              <a:avLst/>
+            </a:prstTxWarp>
+            <a:noAutofit/>
+          </a:bodyPr>
+          <a:lstStyle/>
+          <a:p>
+            <a:endParaRPr lang="de-DE"/>
+          </a:p>
+        </p:txBody>
+      </p:sp>
+    </p:spTree>
+    <p:extLst>
+      <p:ext uri="{BB962C8B-B14F-4D97-AF65-F5344CB8AC3E}">
+        <p14:creationId xmlns:p14="http://schemas.microsoft.com/office/powerpoint/2010/main" val="686632633"/>
+      </p:ext>
+    </p:extLst>
+  </p:cSld>
+  <p:clrMapOvr>
+    <a:masterClrMapping/>
+  </p:clrMapOvr>
+</p:sld>
+</file>
+
+<file path=ppt/slides/slide11.xml><?xml version="1.0" encoding="utf-8"?>
+<p:sld xmlns:a="http://schemas.openxmlformats.org/drawingml/2006/main" xmlns:r="http://schemas.openxmlformats.org/officeDocument/2006/relationships" xmlns:p="http://schemas.openxmlformats.org/presentationml/2006/main">
+  <p:cSld>
+    <p:spTree>
+      <p:nvGrpSpPr>
+        <p:cNvPr id="1" name=""/>
+        <p:cNvGrpSpPr/>
+        <p:nvPr/>
+      </p:nvGrpSpPr>
+      <p:grpSpPr>
+        <a:xfrm>
+          <a:off x="0" y="0"/>
+          <a:ext cx="0" cy="0"/>
+          <a:chOff x="0" y="0"/>
+          <a:chExt cx="0" cy="0"/>
+        </a:xfrm>
+      </p:grpSpPr>
+      <p:sp>
+        <p:nvSpPr>
+          <p:cNvPr id="2" name="Titel 1"/>
+          <p:cNvSpPr>
+            <a:spLocks noGrp="1"/>
+          </p:cNvSpPr>
+          <p:nvPr>
+            <p:ph type="title"/>
+          </p:nvPr>
+        </p:nvSpPr>
+        <p:spPr/>
+        <p:txBody>
+          <a:bodyPr/>
+          <a:lstStyle/>
+          <a:p>
+            <a:r>
+              <a:rPr lang="en-US" dirty="0"/>
+              <a:t>Notification Preferences</a:t>
+            </a:r>
+          </a:p>
+        </p:txBody>
+      </p:sp>
+      <p:pic>
+        <p:nvPicPr>
+          <p:cNvPr id="4" name="Bild 3"/>
+          <p:cNvPicPr>
+            <a:picLocks noChangeAspect="1"/>
+          </p:cNvPicPr>
+          <p:nvPr/>
+        </p:nvPicPr>
+        <p:blipFill>
+          <a:blip r:embed="rId2"/>
+          <a:stretch>
+            <a:fillRect/>
+          </a:stretch>
+        </p:blipFill>
+        <p:spPr>
+          <a:xfrm>
+            <a:off x="838199" y="1825625"/>
+            <a:ext cx="4575483" cy="3753540"/>
+          </a:xfrm>
+          <a:prstGeom prst="rect">
+            <a:avLst/>
+          </a:prstGeom>
+        </p:spPr>
+      </p:pic>
+      <p:pic>
+        <p:nvPicPr>
+          <p:cNvPr id="5" name="Bild 4"/>
+          <p:cNvPicPr>
+            <a:picLocks noChangeAspect="1"/>
+          </p:cNvPicPr>
+          <p:nvPr/>
+        </p:nvPicPr>
+        <p:blipFill>
+          <a:blip r:embed="rId3"/>
+          <a:stretch>
+            <a:fillRect/>
+          </a:stretch>
+        </p:blipFill>
+        <p:spPr>
+          <a:xfrm>
+            <a:off x="6641326" y="1825625"/>
+            <a:ext cx="4712474" cy="3753540"/>
+          </a:xfrm>
+          <a:prstGeom prst="rect">
+            <a:avLst/>
+          </a:prstGeom>
+        </p:spPr>
+      </p:pic>
+    </p:spTree>
+    <p:extLst>
+      <p:ext uri="{BB962C8B-B14F-4D97-AF65-F5344CB8AC3E}">
+        <p14:creationId xmlns:p14="http://schemas.microsoft.com/office/powerpoint/2010/main" val="504889330"/>
+      </p:ext>
+    </p:extLst>
+  </p:cSld>
+  <p:clrMapOvr>
+    <a:masterClrMapping/>
+  </p:clrMapOvr>
+</p:sld>
+</file>
+
+<file path=ppt/slides/slide12.xml><?xml version="1.0" encoding="utf-8"?>
+<p:sld xmlns:a="http://schemas.openxmlformats.org/drawingml/2006/main" xmlns:r="http://schemas.openxmlformats.org/officeDocument/2006/relationships" xmlns:p="http://schemas.openxmlformats.org/presentationml/2006/main">
+  <p:cSld>
+    <p:spTree>
+      <p:nvGrpSpPr>
+        <p:cNvPr id="1" name=""/>
+        <p:cNvGrpSpPr/>
+        <p:nvPr/>
+      </p:nvGrpSpPr>
+      <p:grpSpPr>
+        <a:xfrm>
+          <a:off x="0" y="0"/>
+          <a:ext cx="0" cy="0"/>
+          <a:chOff x="0" y="0"/>
+          <a:chExt cx="0" cy="0"/>
+        </a:xfrm>
+      </p:grpSpPr>
+      <p:pic>
+        <p:nvPicPr>
+          <p:cNvPr id="4" name="Bild 3"/>
+          <p:cNvPicPr>
+            <a:picLocks noChangeAspect="1"/>
+          </p:cNvPicPr>
+          <p:nvPr/>
+        </p:nvPicPr>
+        <p:blipFill rotWithShape="1">
+          <a:blip r:embed="rId2"/>
           <a:srcRect t="5226"/>
           <a:stretch/>
         </p:blipFill>
@@ -4721,7 +5366,7 @@
 </p:sld>
 </file>
 
-<file path=ppt/slides/slide11.xml><?xml version="1.0" encoding="utf-8"?>
+<file path=ppt/slides/slide13.xml><?xml version="1.0" encoding="utf-8"?>
 <p:sld xmlns:a="http://schemas.openxmlformats.org/drawingml/2006/main" xmlns:r="http://schemas.openxmlformats.org/officeDocument/2006/relationships" xmlns:p="http://schemas.openxmlformats.org/presentationml/2006/main">
   <p:cSld>
     <p:spTree>
@@ -5120,8 +5765,12 @@
               <a:t>Technological </a:t>
             </a:r>
             <a:r>
+              <a:rPr lang="de-CH" b="1" dirty="0" err="1"/>
+              <a:t>L</a:t>
+            </a:r>
+            <a:r>
               <a:rPr lang="de-CH" sz="4400" b="1" dirty="0" err="1"/>
-              <a:t>landscape</a:t>
+              <a:t>andscape</a:t>
             </a:r>
             <a:endParaRPr lang="de-CH" sz="4400" dirty="0"/>
           </a:p>
@@ -5155,7 +5804,15 @@
             </a:pPr>
             <a:r>
               <a:rPr lang="en-US" sz="2800" dirty="0"/>
-              <a:t>From the web of documents to web of data</a:t>
+              <a:t>web of documents </a:t>
+            </a:r>
+            <a:r>
+              <a:rPr lang="en-US" dirty="0"/>
+              <a:t>-&gt;</a:t>
+            </a:r>
+            <a:r>
+              <a:rPr lang="en-US" sz="2800" dirty="0"/>
+              <a:t> web of data</a:t>
             </a:r>
           </a:p>
           <a:p>
@@ -5164,16 +5821,7 @@
             </a:pPr>
             <a:r>
               <a:rPr lang="en-US" sz="2800" dirty="0"/>
-              <a:t>Linked data connecting persons, places, documents, ideas…</a:t>
-            </a:r>
-          </a:p>
-          <a:p>
-            <a:pPr marL="0" indent="0">
-              <a:buNone/>
-            </a:pPr>
-            <a:r>
-              <a:rPr lang="en-US" sz="2800" dirty="0"/>
-              <a:t>Virtually infinite amount of connected data</a:t>
+              <a:t>Persons, places, documents, ideas…</a:t>
             </a:r>
           </a:p>
           <a:p>
@@ -5191,34 +5839,15 @@
             </a:pPr>
             <a:r>
               <a:rPr lang="en-US" sz="2800" dirty="0"/>
-              <a:t>Geo-Location -&gt; Limitations in buildings</a:t>
-            </a:r>
-          </a:p>
-          <a:p>
-            <a:pPr marL="0" indent="0">
-              <a:buNone/>
-            </a:pPr>
-            <a:r>
-              <a:rPr lang="en-US" sz="2800" dirty="0"/>
-              <a:t>Mobile broadband -&gt; Limitations in the wilderness and when roaming</a:t>
-            </a:r>
-          </a:p>
-          <a:p>
-            <a:pPr marL="0" indent="0">
-              <a:buNone/>
-            </a:pPr>
-            <a:r>
-              <a:rPr lang="en-US" sz="2800" dirty="0"/>
-              <a:t>-&gt; Bluetooth Beacons to annotate the physical space</a:t>
-            </a:r>
-            <a:endParaRPr lang="de-CH" sz="2800" dirty="0"/>
+              <a:t>Geo-Location</a:t>
+            </a:r>
           </a:p>
         </p:txBody>
       </p:sp>
     </p:spTree>
     <p:extLst>
       <p:ext uri="{BB962C8B-B14F-4D97-AF65-F5344CB8AC3E}">
-        <p14:creationId xmlns:p14="http://schemas.microsoft.com/office/powerpoint/2010/main" val="2410705375"/>
+        <p14:creationId xmlns:p14="http://schemas.microsoft.com/office/powerpoint/2010/main" val="1370415757"/>
       </p:ext>
     </p:extLst>
   </p:cSld>
@@ -5250,7 +5879,7 @@
           <p:cNvPr id="2" name="Title 1">
             <a:extLst>
               <a:ext uri="{FF2B5EF4-FFF2-40B4-BE49-F238E27FC236}">
-                <a16:creationId xmlns:a16="http://schemas.microsoft.com/office/drawing/2014/main" id="{5F3D2C60-8B13-47EC-8520-4DFEA1E35057}"/>
+                <a16:creationId xmlns:a16="http://schemas.microsoft.com/office/drawing/2014/main" id="{294855B8-231E-4436-9C8D-B818E47FEC09}"/>
               </a:ext>
             </a:extLst>
           </p:cNvPr>
@@ -5263,22 +5892,16 @@
         </p:nvSpPr>
         <p:spPr/>
         <p:txBody>
-          <a:bodyPr/>
-          <a:lstStyle/>
-          <a:p>
-            <a:r>
-              <a:rPr lang="de-CH" b="1" dirty="0"/>
-              <a:t>Advantages </a:t>
-            </a:r>
-            <a:r>
-              <a:rPr lang="de-CH" b="1" dirty="0" err="1"/>
-              <a:t>for</a:t>
-            </a:r>
-            <a:r>
-              <a:rPr lang="de-CH" b="1" dirty="0"/>
-              <a:t> Providers</a:t>
-            </a:r>
-            <a:endParaRPr lang="de-CH" dirty="0"/>
+          <a:bodyPr>
+            <a:normAutofit/>
+          </a:bodyPr>
+          <a:lstStyle/>
+          <a:p>
+            <a:r>
+              <a:rPr lang="de-CH" sz="4400" b="1" dirty="0" err="1"/>
+              <a:t>Limitations</a:t>
+            </a:r>
+            <a:endParaRPr lang="de-CH" sz="4400" dirty="0"/>
           </a:p>
         </p:txBody>
       </p:sp>
@@ -5287,7 +5910,7 @@
           <p:cNvPr id="3" name="Content Placeholder 2">
             <a:extLst>
               <a:ext uri="{FF2B5EF4-FFF2-40B4-BE49-F238E27FC236}">
-                <a16:creationId xmlns:a16="http://schemas.microsoft.com/office/drawing/2014/main" id="{7C82A1DD-4B53-430D-8291-39B733F9DAEC}"/>
+                <a16:creationId xmlns:a16="http://schemas.microsoft.com/office/drawing/2014/main" id="{2EEEF804-2A07-4576-8666-6A2A22AA3FF2}"/>
               </a:ext>
             </a:extLst>
           </p:cNvPr>
@@ -5300,46 +5923,44 @@
         </p:nvSpPr>
         <p:spPr/>
         <p:txBody>
-          <a:bodyPr/>
-          <a:lstStyle/>
-          <a:p>
+          <a:bodyPr>
+            <a:normAutofit/>
+          </a:bodyPr>
+          <a:lstStyle/>
+          <a:p>
+            <a:pPr marL="0" indent="0">
+              <a:buNone/>
+            </a:pPr>
             <a:r>
               <a:rPr lang="en-US" sz="2800" dirty="0"/>
-              <a:t>Tourists stay longer</a:t>
-            </a:r>
-          </a:p>
-          <a:p>
+              <a:t>Geo-Location -&gt; Limitations in buildings</a:t>
+            </a:r>
+          </a:p>
+          <a:p>
+            <a:pPr marL="0" indent="0">
+              <a:buNone/>
+            </a:pPr>
             <a:r>
               <a:rPr lang="en-US" sz="2800" dirty="0"/>
-              <a:t>Tourists learn about and visit more places</a:t>
-            </a:r>
-          </a:p>
-          <a:p>
+              <a:t>Mobile broadband -&gt; Limitations in the wilderness and when roaming</a:t>
+            </a:r>
+          </a:p>
+          <a:p>
+            <a:pPr marL="0" indent="0">
+              <a:buNone/>
+            </a:pPr>
             <a:r>
               <a:rPr lang="en-US" sz="2800" dirty="0"/>
-              <a:t>More equally </a:t>
-            </a:r>
-            <a:r>
-              <a:rPr lang="en-US" sz="2800" dirty="0" err="1"/>
-              <a:t>ditributed</a:t>
-            </a:r>
-            <a:r>
-              <a:rPr lang="en-US" sz="2800" dirty="0"/>
-              <a:t> stream of visitors</a:t>
-            </a:r>
-          </a:p>
-          <a:p>
-            <a:pPr marL="0" indent="0">
-              <a:buNone/>
-            </a:pPr>
-            <a:endParaRPr lang="de-CH" dirty="0"/>
+              <a:t>-&gt; Bluetooth Beacons to annotate the physical space</a:t>
+            </a:r>
+            <a:endParaRPr lang="de-CH" sz="2800" dirty="0"/>
           </a:p>
         </p:txBody>
       </p:sp>
     </p:spTree>
     <p:extLst>
       <p:ext uri="{BB962C8B-B14F-4D97-AF65-F5344CB8AC3E}">
-        <p14:creationId xmlns:p14="http://schemas.microsoft.com/office/powerpoint/2010/main" val="3007267876"/>
+        <p14:creationId xmlns:p14="http://schemas.microsoft.com/office/powerpoint/2010/main" val="2966910348"/>
       </p:ext>
     </p:extLst>
   </p:cSld>
@@ -5371,7 +5992,7 @@
           <p:cNvPr id="2" name="Title 1">
             <a:extLst>
               <a:ext uri="{FF2B5EF4-FFF2-40B4-BE49-F238E27FC236}">
-                <a16:creationId xmlns:a16="http://schemas.microsoft.com/office/drawing/2014/main" id="{D956F271-0BCC-4362-85C0-9A9F5CE5EB0D}"/>
+                <a16:creationId xmlns:a16="http://schemas.microsoft.com/office/drawing/2014/main" id="{294855B8-231E-4436-9C8D-B818E47FEC09}"/>
               </a:ext>
             </a:extLst>
           </p:cNvPr>
@@ -5384,26 +6005,16 @@
         </p:nvSpPr>
         <p:spPr/>
         <p:txBody>
-          <a:bodyPr/>
-          <a:lstStyle/>
-          <a:p>
-            <a:r>
-              <a:rPr lang="de-CH" b="1" dirty="0"/>
-              <a:t>Advantages </a:t>
-            </a:r>
-            <a:r>
-              <a:rPr lang="de-CH" b="1" dirty="0" err="1"/>
-              <a:t>for</a:t>
-            </a:r>
-            <a:r>
-              <a:rPr lang="de-CH" b="1" dirty="0"/>
-              <a:t> </a:t>
-            </a:r>
-            <a:r>
-              <a:rPr lang="de-CH" b="1" dirty="0" err="1"/>
-              <a:t>Tourists</a:t>
-            </a:r>
-            <a:endParaRPr lang="de-CH" dirty="0"/>
+          <a:bodyPr>
+            <a:normAutofit/>
+          </a:bodyPr>
+          <a:lstStyle/>
+          <a:p>
+            <a:r>
+              <a:rPr lang="en-US" dirty="0"/>
+              <a:t>Bluetooth Beacons</a:t>
+            </a:r>
+            <a:endParaRPr lang="de-CH" sz="4400" dirty="0"/>
           </a:p>
         </p:txBody>
       </p:sp>
@@ -5412,7 +6023,7 @@
           <p:cNvPr id="3" name="Content Placeholder 2">
             <a:extLst>
               <a:ext uri="{FF2B5EF4-FFF2-40B4-BE49-F238E27FC236}">
-                <a16:creationId xmlns:a16="http://schemas.microsoft.com/office/drawing/2014/main" id="{028BD986-F847-4D4D-8BE2-19DA7F16BA0F}"/>
+                <a16:creationId xmlns:a16="http://schemas.microsoft.com/office/drawing/2014/main" id="{2EEEF804-2A07-4576-8666-6A2A22AA3FF2}"/>
               </a:ext>
             </a:extLst>
           </p:cNvPr>
@@ -5425,35 +6036,26 @@
         </p:nvSpPr>
         <p:spPr/>
         <p:txBody>
-          <a:bodyPr/>
-          <a:lstStyle/>
-          <a:p>
+          <a:bodyPr>
+            <a:normAutofit/>
+          </a:bodyPr>
+          <a:lstStyle/>
+          <a:p>
+            <a:pPr marL="0" indent="0">
+              <a:buNone/>
+            </a:pPr>
             <a:r>
               <a:rPr lang="en-US" sz="2800" dirty="0"/>
-              <a:t>They aren't tourists: they discover on their own</a:t>
-            </a:r>
-          </a:p>
-          <a:p>
-            <a:r>
-              <a:rPr lang="en-US" sz="2800" dirty="0"/>
-              <a:t>They can see through walls: thy can take see what other places there are behind the wall of the museum they're visiting</a:t>
-            </a:r>
-          </a:p>
-          <a:p>
-            <a:r>
-              <a:rPr lang="en-US" sz="2800" dirty="0"/>
-              <a:t>They avoid they queue buy having real-time data and know on which ski lift there's not a lot of people</a:t>
-            </a:r>
-          </a:p>
-          <a:p>
-            <a:endParaRPr lang="de-CH" dirty="0"/>
+              <a:t>Bluetooth Low Energy Beacon technology allows to annotate the physical space</a:t>
+            </a:r>
+            <a:endParaRPr lang="de-CH" sz="2800" dirty="0"/>
           </a:p>
         </p:txBody>
       </p:sp>
     </p:spTree>
     <p:extLst>
       <p:ext uri="{BB962C8B-B14F-4D97-AF65-F5344CB8AC3E}">
-        <p14:creationId xmlns:p14="http://schemas.microsoft.com/office/powerpoint/2010/main" val="4076089706"/>
+        <p14:creationId xmlns:p14="http://schemas.microsoft.com/office/powerpoint/2010/main" val="979070805"/>
       </p:ext>
     </p:extLst>
   </p:cSld>
@@ -5482,6 +6084,241 @@
       </p:grpSpPr>
       <p:sp>
         <p:nvSpPr>
+          <p:cNvPr id="2" name="Title 1">
+            <a:extLst>
+              <a:ext uri="{FF2B5EF4-FFF2-40B4-BE49-F238E27FC236}">
+                <a16:creationId xmlns:a16="http://schemas.microsoft.com/office/drawing/2014/main" id="{5F3D2C60-8B13-47EC-8520-4DFEA1E35057}"/>
+              </a:ext>
+            </a:extLst>
+          </p:cNvPr>
+          <p:cNvSpPr>
+            <a:spLocks noGrp="1"/>
+          </p:cNvSpPr>
+          <p:nvPr>
+            <p:ph type="title"/>
+          </p:nvPr>
+        </p:nvSpPr>
+        <p:spPr/>
+        <p:txBody>
+          <a:bodyPr/>
+          <a:lstStyle/>
+          <a:p>
+            <a:r>
+              <a:rPr lang="de-CH" b="1" dirty="0"/>
+              <a:t>Advantages </a:t>
+            </a:r>
+            <a:r>
+              <a:rPr lang="de-CH" b="1" dirty="0" err="1"/>
+              <a:t>for</a:t>
+            </a:r>
+            <a:r>
+              <a:rPr lang="de-CH" b="1" dirty="0"/>
+              <a:t> Providers</a:t>
+            </a:r>
+            <a:endParaRPr lang="de-CH" dirty="0"/>
+          </a:p>
+        </p:txBody>
+      </p:sp>
+      <p:sp>
+        <p:nvSpPr>
+          <p:cNvPr id="3" name="Content Placeholder 2">
+            <a:extLst>
+              <a:ext uri="{FF2B5EF4-FFF2-40B4-BE49-F238E27FC236}">
+                <a16:creationId xmlns:a16="http://schemas.microsoft.com/office/drawing/2014/main" id="{7C82A1DD-4B53-430D-8291-39B733F9DAEC}"/>
+              </a:ext>
+            </a:extLst>
+          </p:cNvPr>
+          <p:cNvSpPr>
+            <a:spLocks noGrp="1"/>
+          </p:cNvSpPr>
+          <p:nvPr>
+            <p:ph idx="1"/>
+          </p:nvPr>
+        </p:nvSpPr>
+        <p:spPr/>
+        <p:txBody>
+          <a:bodyPr/>
+          <a:lstStyle/>
+          <a:p>
+            <a:r>
+              <a:rPr lang="en-US" sz="2800" dirty="0"/>
+              <a:t>Tourists stay longer</a:t>
+            </a:r>
+          </a:p>
+          <a:p>
+            <a:r>
+              <a:rPr lang="en-US" sz="2800" dirty="0"/>
+              <a:t>Tourists learn about and visit more places</a:t>
+            </a:r>
+          </a:p>
+          <a:p>
+            <a:r>
+              <a:rPr lang="en-US" sz="2800" dirty="0"/>
+              <a:t>More equally </a:t>
+            </a:r>
+            <a:r>
+              <a:rPr lang="en-US" sz="2800" dirty="0" err="1"/>
+              <a:t>ditributed</a:t>
+            </a:r>
+            <a:r>
+              <a:rPr lang="en-US" sz="2800" dirty="0"/>
+              <a:t> stream of visitors</a:t>
+            </a:r>
+          </a:p>
+          <a:p>
+            <a:pPr marL="0" indent="0">
+              <a:buNone/>
+            </a:pPr>
+            <a:endParaRPr lang="de-CH" dirty="0"/>
+          </a:p>
+        </p:txBody>
+      </p:sp>
+    </p:spTree>
+    <p:extLst>
+      <p:ext uri="{BB962C8B-B14F-4D97-AF65-F5344CB8AC3E}">
+        <p14:creationId xmlns:p14="http://schemas.microsoft.com/office/powerpoint/2010/main" val="3007267876"/>
+      </p:ext>
+    </p:extLst>
+  </p:cSld>
+  <p:clrMapOvr>
+    <a:masterClrMapping/>
+  </p:clrMapOvr>
+</p:sld>
+</file>
+
+<file path=ppt/slides/slide7.xml><?xml version="1.0" encoding="utf-8"?>
+<p:sld xmlns:a="http://schemas.openxmlformats.org/drawingml/2006/main" xmlns:r="http://schemas.openxmlformats.org/officeDocument/2006/relationships" xmlns:p="http://schemas.openxmlformats.org/presentationml/2006/main">
+  <p:cSld>
+    <p:spTree>
+      <p:nvGrpSpPr>
+        <p:cNvPr id="1" name=""/>
+        <p:cNvGrpSpPr/>
+        <p:nvPr/>
+      </p:nvGrpSpPr>
+      <p:grpSpPr>
+        <a:xfrm>
+          <a:off x="0" y="0"/>
+          <a:ext cx="0" cy="0"/>
+          <a:chOff x="0" y="0"/>
+          <a:chExt cx="0" cy="0"/>
+        </a:xfrm>
+      </p:grpSpPr>
+      <p:sp>
+        <p:nvSpPr>
+          <p:cNvPr id="2" name="Title 1">
+            <a:extLst>
+              <a:ext uri="{FF2B5EF4-FFF2-40B4-BE49-F238E27FC236}">
+                <a16:creationId xmlns:a16="http://schemas.microsoft.com/office/drawing/2014/main" id="{D956F271-0BCC-4362-85C0-9A9F5CE5EB0D}"/>
+              </a:ext>
+            </a:extLst>
+          </p:cNvPr>
+          <p:cNvSpPr>
+            <a:spLocks noGrp="1"/>
+          </p:cNvSpPr>
+          <p:nvPr>
+            <p:ph type="title"/>
+          </p:nvPr>
+        </p:nvSpPr>
+        <p:spPr/>
+        <p:txBody>
+          <a:bodyPr/>
+          <a:lstStyle/>
+          <a:p>
+            <a:r>
+              <a:rPr lang="de-CH" b="1" dirty="0"/>
+              <a:t>Advantages </a:t>
+            </a:r>
+            <a:r>
+              <a:rPr lang="de-CH" b="1" dirty="0" err="1"/>
+              <a:t>for</a:t>
+            </a:r>
+            <a:r>
+              <a:rPr lang="de-CH" b="1" dirty="0"/>
+              <a:t> </a:t>
+            </a:r>
+            <a:r>
+              <a:rPr lang="de-CH" b="1" dirty="0" err="1"/>
+              <a:t>Tourists</a:t>
+            </a:r>
+            <a:endParaRPr lang="de-CH" dirty="0"/>
+          </a:p>
+        </p:txBody>
+      </p:sp>
+      <p:sp>
+        <p:nvSpPr>
+          <p:cNvPr id="3" name="Content Placeholder 2">
+            <a:extLst>
+              <a:ext uri="{FF2B5EF4-FFF2-40B4-BE49-F238E27FC236}">
+                <a16:creationId xmlns:a16="http://schemas.microsoft.com/office/drawing/2014/main" id="{028BD986-F847-4D4D-8BE2-19DA7F16BA0F}"/>
+              </a:ext>
+            </a:extLst>
+          </p:cNvPr>
+          <p:cNvSpPr>
+            <a:spLocks noGrp="1"/>
+          </p:cNvSpPr>
+          <p:nvPr>
+            <p:ph idx="1"/>
+          </p:nvPr>
+        </p:nvSpPr>
+        <p:spPr/>
+        <p:txBody>
+          <a:bodyPr/>
+          <a:lstStyle/>
+          <a:p>
+            <a:r>
+              <a:rPr lang="en-US" sz="2800" dirty="0"/>
+              <a:t>They aren't tourists: they discover on their own</a:t>
+            </a:r>
+          </a:p>
+          <a:p>
+            <a:r>
+              <a:rPr lang="en-US" sz="2800" dirty="0"/>
+              <a:t>They can see through walls: thy can take see what other places there are behind the wall of the museum they're visiting</a:t>
+            </a:r>
+          </a:p>
+          <a:p>
+            <a:r>
+              <a:rPr lang="en-US" sz="2800" dirty="0"/>
+              <a:t>They avoid they queue buy having real-time data and know on which ski lift there's not a lot of people</a:t>
+            </a:r>
+          </a:p>
+          <a:p>
+            <a:endParaRPr lang="de-CH" dirty="0"/>
+          </a:p>
+        </p:txBody>
+      </p:sp>
+    </p:spTree>
+    <p:extLst>
+      <p:ext uri="{BB962C8B-B14F-4D97-AF65-F5344CB8AC3E}">
+        <p14:creationId xmlns:p14="http://schemas.microsoft.com/office/powerpoint/2010/main" val="4076089706"/>
+      </p:ext>
+    </p:extLst>
+  </p:cSld>
+  <p:clrMapOvr>
+    <a:masterClrMapping/>
+  </p:clrMapOvr>
+</p:sld>
+</file>
+
+<file path=ppt/slides/slide8.xml><?xml version="1.0" encoding="utf-8"?>
+<p:sld xmlns:a="http://schemas.openxmlformats.org/drawingml/2006/main" xmlns:r="http://schemas.openxmlformats.org/officeDocument/2006/relationships" xmlns:p="http://schemas.openxmlformats.org/presentationml/2006/main">
+  <p:cSld>
+    <p:spTree>
+      <p:nvGrpSpPr>
+        <p:cNvPr id="1" name=""/>
+        <p:cNvGrpSpPr/>
+        <p:nvPr/>
+      </p:nvGrpSpPr>
+      <p:grpSpPr>
+        <a:xfrm>
+          <a:off x="0" y="0"/>
+          <a:ext cx="0" cy="0"/>
+          <a:chOff x="0" y="0"/>
+          <a:chExt cx="0" cy="0"/>
+        </a:xfrm>
+      </p:grpSpPr>
+      <p:sp>
+        <p:nvSpPr>
           <p:cNvPr id="7" name="Title 6">
             <a:extLst>
               <a:ext uri="{FF2B5EF4-FFF2-40B4-BE49-F238E27FC236}">
@@ -5677,7 +6514,7 @@
 </p:sld>
 </file>
 
-<file path=ppt/slides/slide7.xml><?xml version="1.0" encoding="utf-8"?>
+<file path=ppt/slides/slide9.xml><?xml version="1.0" encoding="utf-8"?>
 <p:sld xmlns:a="http://schemas.openxmlformats.org/drawingml/2006/main" xmlns:r="http://schemas.openxmlformats.org/officeDocument/2006/relationships" xmlns:p="http://schemas.openxmlformats.org/presentationml/2006/main">
   <p:cSld>
     <p:spTree>
@@ -5721,649 +6558,6 @@
     <p:extLst>
       <p:ext uri="{BB962C8B-B14F-4D97-AF65-F5344CB8AC3E}">
         <p14:creationId xmlns:p14="http://schemas.microsoft.com/office/powerpoint/2010/main" val="1906082872"/>
-      </p:ext>
-    </p:extLst>
-  </p:cSld>
-  <p:clrMapOvr>
-    <a:masterClrMapping/>
-  </p:clrMapOvr>
-</p:sld>
-</file>
-
-<file path=ppt/slides/slide8.xml><?xml version="1.0" encoding="utf-8"?>
-<p:sld xmlns:a="http://schemas.openxmlformats.org/drawingml/2006/main" xmlns:r="http://schemas.openxmlformats.org/officeDocument/2006/relationships" xmlns:p="http://schemas.openxmlformats.org/presentationml/2006/main">
-  <p:cSld>
-    <p:spTree>
-      <p:nvGrpSpPr>
-        <p:cNvPr id="1" name=""/>
-        <p:cNvGrpSpPr/>
-        <p:nvPr/>
-      </p:nvGrpSpPr>
-      <p:grpSpPr>
-        <a:xfrm>
-          <a:off x="0" y="0"/>
-          <a:ext cx="0" cy="0"/>
-          <a:chOff x="0" y="0"/>
-          <a:chExt cx="0" cy="0"/>
-        </a:xfrm>
-      </p:grpSpPr>
-      <p:pic>
-        <p:nvPicPr>
-          <p:cNvPr id="4" name="Bild 3"/>
-          <p:cNvPicPr>
-            <a:picLocks noChangeAspect="1"/>
-          </p:cNvPicPr>
-          <p:nvPr/>
-        </p:nvPicPr>
-        <p:blipFill rotWithShape="1">
-          <a:blip r:embed="rId2"/>
-          <a:srcRect t="5723"/>
-          <a:stretch/>
-        </p:blipFill>
-        <p:spPr>
-          <a:xfrm>
-            <a:off x="1376155" y="-30654"/>
-            <a:ext cx="9348996" cy="6305249"/>
-          </a:xfrm>
-          <a:prstGeom prst="rect">
-            <a:avLst/>
-          </a:prstGeom>
-        </p:spPr>
-      </p:pic>
-      <p:sp>
-        <p:nvSpPr>
-          <p:cNvPr id="5" name="Oval 4"/>
-          <p:cNvSpPr/>
-          <p:nvPr/>
-        </p:nvSpPr>
-        <p:spPr>
-          <a:xfrm>
-            <a:off x="5408226" y="2260676"/>
-            <a:ext cx="1296035" cy="1254760"/>
-          </a:xfrm>
-          <a:prstGeom prst="ellipse">
-            <a:avLst/>
-          </a:prstGeom>
-          <a:solidFill>
-            <a:schemeClr val="accent1">
-              <a:alpha val="20000"/>
-            </a:schemeClr>
-          </a:solidFill>
-        </p:spPr>
-        <p:style>
-          <a:lnRef idx="2">
-            <a:schemeClr val="accent1">
-              <a:shade val="50000"/>
-            </a:schemeClr>
-          </a:lnRef>
-          <a:fillRef idx="1">
-            <a:schemeClr val="accent1"/>
-          </a:fillRef>
-          <a:effectRef idx="0">
-            <a:schemeClr val="accent1"/>
-          </a:effectRef>
-          <a:fontRef idx="minor">
-            <a:schemeClr val="lt1"/>
-          </a:fontRef>
-        </p:style>
-        <p:txBody>
-          <a:bodyPr rot="0" spcFirstLastPara="0" vert="horz" wrap="square" lIns="91440" tIns="45720" rIns="91440" bIns="45720" numCol="1" spcCol="0" rtlCol="0" fromWordArt="0" anchor="ctr" anchorCtr="0" forceAA="0" compatLnSpc="1">
-            <a:prstTxWarp prst="textNoShape">
-              <a:avLst/>
-            </a:prstTxWarp>
-            <a:noAutofit/>
-          </a:bodyPr>
-          <a:lstStyle/>
-          <a:p>
-            <a:endParaRPr lang="de-DE"/>
-          </a:p>
-        </p:txBody>
-      </p:sp>
-      <p:sp>
-        <p:nvSpPr>
-          <p:cNvPr id="6" name="Oval 5"/>
-          <p:cNvSpPr/>
-          <p:nvPr/>
-        </p:nvSpPr>
-        <p:spPr>
-          <a:xfrm>
-            <a:off x="4009469" y="2487879"/>
-            <a:ext cx="1296035" cy="1254760"/>
-          </a:xfrm>
-          <a:prstGeom prst="ellipse">
-            <a:avLst/>
-          </a:prstGeom>
-          <a:solidFill>
-            <a:schemeClr val="accent1">
-              <a:alpha val="20000"/>
-            </a:schemeClr>
-          </a:solidFill>
-        </p:spPr>
-        <p:style>
-          <a:lnRef idx="2">
-            <a:schemeClr val="accent1">
-              <a:shade val="50000"/>
-            </a:schemeClr>
-          </a:lnRef>
-          <a:fillRef idx="1">
-            <a:schemeClr val="accent1"/>
-          </a:fillRef>
-          <a:effectRef idx="0">
-            <a:schemeClr val="accent1"/>
-          </a:effectRef>
-          <a:fontRef idx="minor">
-            <a:schemeClr val="lt1"/>
-          </a:fontRef>
-        </p:style>
-        <p:txBody>
-          <a:bodyPr rot="0" spcFirstLastPara="0" vert="horz" wrap="square" lIns="91440" tIns="45720" rIns="91440" bIns="45720" numCol="1" spcCol="0" rtlCol="0" fromWordArt="0" anchor="ctr" anchorCtr="0" forceAA="0" compatLnSpc="1">
-            <a:prstTxWarp prst="textNoShape">
-              <a:avLst/>
-            </a:prstTxWarp>
-            <a:noAutofit/>
-          </a:bodyPr>
-          <a:lstStyle/>
-          <a:p>
-            <a:endParaRPr lang="de-DE"/>
-          </a:p>
-        </p:txBody>
-      </p:sp>
-      <p:sp>
-        <p:nvSpPr>
-          <p:cNvPr id="7" name="Oval 6"/>
-          <p:cNvSpPr/>
-          <p:nvPr/>
-        </p:nvSpPr>
-        <p:spPr>
-          <a:xfrm>
-            <a:off x="2320469" y="2005703"/>
-            <a:ext cx="1296035" cy="1254760"/>
-          </a:xfrm>
-          <a:prstGeom prst="ellipse">
-            <a:avLst/>
-          </a:prstGeom>
-          <a:solidFill>
-            <a:schemeClr val="accent1">
-              <a:alpha val="20000"/>
-            </a:schemeClr>
-          </a:solidFill>
-        </p:spPr>
-        <p:style>
-          <a:lnRef idx="2">
-            <a:schemeClr val="accent1">
-              <a:shade val="50000"/>
-            </a:schemeClr>
-          </a:lnRef>
-          <a:fillRef idx="1">
-            <a:schemeClr val="accent1"/>
-          </a:fillRef>
-          <a:effectRef idx="0">
-            <a:schemeClr val="accent1"/>
-          </a:effectRef>
-          <a:fontRef idx="minor">
-            <a:schemeClr val="lt1"/>
-          </a:fontRef>
-        </p:style>
-        <p:txBody>
-          <a:bodyPr rot="0" spcFirstLastPara="0" vert="horz" wrap="square" lIns="91440" tIns="45720" rIns="91440" bIns="45720" numCol="1" spcCol="0" rtlCol="0" fromWordArt="0" anchor="ctr" anchorCtr="0" forceAA="0" compatLnSpc="1">
-            <a:prstTxWarp prst="textNoShape">
-              <a:avLst/>
-            </a:prstTxWarp>
-            <a:noAutofit/>
-          </a:bodyPr>
-          <a:lstStyle/>
-          <a:p>
-            <a:endParaRPr lang="de-DE"/>
-          </a:p>
-        </p:txBody>
-      </p:sp>
-      <p:sp>
-        <p:nvSpPr>
-          <p:cNvPr id="8" name="Oval 7"/>
-          <p:cNvSpPr/>
-          <p:nvPr/>
-        </p:nvSpPr>
-        <p:spPr>
-          <a:xfrm>
-            <a:off x="7790972" y="1291887"/>
-            <a:ext cx="1296035" cy="1254760"/>
-          </a:xfrm>
-          <a:prstGeom prst="ellipse">
-            <a:avLst/>
-          </a:prstGeom>
-          <a:solidFill>
-            <a:schemeClr val="accent1">
-              <a:alpha val="20000"/>
-            </a:schemeClr>
-          </a:solidFill>
-        </p:spPr>
-        <p:style>
-          <a:lnRef idx="2">
-            <a:schemeClr val="accent1">
-              <a:shade val="50000"/>
-            </a:schemeClr>
-          </a:lnRef>
-          <a:fillRef idx="1">
-            <a:schemeClr val="accent1"/>
-          </a:fillRef>
-          <a:effectRef idx="0">
-            <a:schemeClr val="accent1"/>
-          </a:effectRef>
-          <a:fontRef idx="minor">
-            <a:schemeClr val="lt1"/>
-          </a:fontRef>
-        </p:style>
-        <p:txBody>
-          <a:bodyPr rot="0" spcFirstLastPara="0" vert="horz" wrap="square" lIns="91440" tIns="45720" rIns="91440" bIns="45720" numCol="1" spcCol="0" rtlCol="0" fromWordArt="0" anchor="ctr" anchorCtr="0" forceAA="0" compatLnSpc="1">
-            <a:prstTxWarp prst="textNoShape">
-              <a:avLst/>
-            </a:prstTxWarp>
-            <a:noAutofit/>
-          </a:bodyPr>
-          <a:lstStyle/>
-          <a:p>
-            <a:endParaRPr lang="de-DE"/>
-          </a:p>
-        </p:txBody>
-      </p:sp>
-      <p:sp>
-        <p:nvSpPr>
-          <p:cNvPr id="9" name="Oval 8"/>
-          <p:cNvSpPr/>
-          <p:nvPr/>
-        </p:nvSpPr>
-        <p:spPr>
-          <a:xfrm>
-            <a:off x="2761774" y="3459832"/>
-            <a:ext cx="1296035" cy="1254760"/>
-          </a:xfrm>
-          <a:prstGeom prst="ellipse">
-            <a:avLst/>
-          </a:prstGeom>
-          <a:solidFill>
-            <a:schemeClr val="accent1">
-              <a:alpha val="20000"/>
-            </a:schemeClr>
-          </a:solidFill>
-        </p:spPr>
-        <p:style>
-          <a:lnRef idx="2">
-            <a:schemeClr val="accent1">
-              <a:shade val="50000"/>
-            </a:schemeClr>
-          </a:lnRef>
-          <a:fillRef idx="1">
-            <a:schemeClr val="accent1"/>
-          </a:fillRef>
-          <a:effectRef idx="0">
-            <a:schemeClr val="accent1"/>
-          </a:effectRef>
-          <a:fontRef idx="minor">
-            <a:schemeClr val="lt1"/>
-          </a:fontRef>
-        </p:style>
-        <p:txBody>
-          <a:bodyPr rot="0" spcFirstLastPara="0" vert="horz" wrap="square" lIns="91440" tIns="45720" rIns="91440" bIns="45720" numCol="1" spcCol="0" rtlCol="0" fromWordArt="0" anchor="ctr" anchorCtr="0" forceAA="0" compatLnSpc="1">
-            <a:prstTxWarp prst="textNoShape">
-              <a:avLst/>
-            </a:prstTxWarp>
-            <a:noAutofit/>
-          </a:bodyPr>
-          <a:lstStyle/>
-          <a:p>
-            <a:endParaRPr lang="de-DE"/>
-          </a:p>
-        </p:txBody>
-      </p:sp>
-      <p:sp>
-        <p:nvSpPr>
-          <p:cNvPr id="10" name="Oval 9"/>
-          <p:cNvSpPr/>
-          <p:nvPr/>
-        </p:nvSpPr>
-        <p:spPr>
-          <a:xfrm>
-            <a:off x="7018365" y="3888975"/>
-            <a:ext cx="1296035" cy="1254760"/>
-          </a:xfrm>
-          <a:prstGeom prst="ellipse">
-            <a:avLst/>
-          </a:prstGeom>
-          <a:solidFill>
-            <a:schemeClr val="accent1">
-              <a:alpha val="20000"/>
-            </a:schemeClr>
-          </a:solidFill>
-        </p:spPr>
-        <p:style>
-          <a:lnRef idx="2">
-            <a:schemeClr val="accent1">
-              <a:shade val="50000"/>
-            </a:schemeClr>
-          </a:lnRef>
-          <a:fillRef idx="1">
-            <a:schemeClr val="accent1"/>
-          </a:fillRef>
-          <a:effectRef idx="0">
-            <a:schemeClr val="accent1"/>
-          </a:effectRef>
-          <a:fontRef idx="minor">
-            <a:schemeClr val="lt1"/>
-          </a:fontRef>
-        </p:style>
-        <p:txBody>
-          <a:bodyPr rot="0" spcFirstLastPara="0" vert="horz" wrap="square" lIns="91440" tIns="45720" rIns="91440" bIns="45720" numCol="1" spcCol="0" rtlCol="0" fromWordArt="0" anchor="ctr" anchorCtr="0" forceAA="0" compatLnSpc="1">
-            <a:prstTxWarp prst="textNoShape">
-              <a:avLst/>
-            </a:prstTxWarp>
-            <a:noAutofit/>
-          </a:bodyPr>
-          <a:lstStyle/>
-          <a:p>
-            <a:endParaRPr lang="de-DE"/>
-          </a:p>
-        </p:txBody>
-      </p:sp>
-      <p:sp>
-        <p:nvSpPr>
-          <p:cNvPr id="11" name="Oval 10"/>
-          <p:cNvSpPr/>
-          <p:nvPr/>
-        </p:nvSpPr>
-        <p:spPr>
-          <a:xfrm>
-            <a:off x="6744017" y="2108276"/>
-            <a:ext cx="1296035" cy="1254760"/>
-          </a:xfrm>
-          <a:prstGeom prst="ellipse">
-            <a:avLst/>
-          </a:prstGeom>
-          <a:solidFill>
-            <a:schemeClr val="accent1">
-              <a:alpha val="20000"/>
-            </a:schemeClr>
-          </a:solidFill>
-        </p:spPr>
-        <p:style>
-          <a:lnRef idx="2">
-            <a:schemeClr val="accent1">
-              <a:shade val="50000"/>
-            </a:schemeClr>
-          </a:lnRef>
-          <a:fillRef idx="1">
-            <a:schemeClr val="accent1"/>
-          </a:fillRef>
-          <a:effectRef idx="0">
-            <a:schemeClr val="accent1"/>
-          </a:effectRef>
-          <a:fontRef idx="minor">
-            <a:schemeClr val="lt1"/>
-          </a:fontRef>
-        </p:style>
-        <p:txBody>
-          <a:bodyPr rot="0" spcFirstLastPara="0" vert="horz" wrap="square" lIns="91440" tIns="45720" rIns="91440" bIns="45720" numCol="1" spcCol="0" rtlCol="0" fromWordArt="0" anchor="ctr" anchorCtr="0" forceAA="0" compatLnSpc="1">
-            <a:prstTxWarp prst="textNoShape">
-              <a:avLst/>
-            </a:prstTxWarp>
-            <a:noAutofit/>
-          </a:bodyPr>
-          <a:lstStyle/>
-          <a:p>
-            <a:endParaRPr lang="de-DE"/>
-          </a:p>
-        </p:txBody>
-      </p:sp>
-      <p:sp>
-        <p:nvSpPr>
-          <p:cNvPr id="12" name="Oval 11"/>
-          <p:cNvSpPr/>
-          <p:nvPr/>
-        </p:nvSpPr>
-        <p:spPr>
-          <a:xfrm>
-            <a:off x="2191930" y="4808931"/>
-            <a:ext cx="1296035" cy="1254760"/>
-          </a:xfrm>
-          <a:prstGeom prst="ellipse">
-            <a:avLst/>
-          </a:prstGeom>
-          <a:solidFill>
-            <a:schemeClr val="accent1">
-              <a:alpha val="20000"/>
-            </a:schemeClr>
-          </a:solidFill>
-        </p:spPr>
-        <p:style>
-          <a:lnRef idx="2">
-            <a:schemeClr val="accent1">
-              <a:shade val="50000"/>
-            </a:schemeClr>
-          </a:lnRef>
-          <a:fillRef idx="1">
-            <a:schemeClr val="accent1"/>
-          </a:fillRef>
-          <a:effectRef idx="0">
-            <a:schemeClr val="accent1"/>
-          </a:effectRef>
-          <a:fontRef idx="minor">
-            <a:schemeClr val="lt1"/>
-          </a:fontRef>
-        </p:style>
-        <p:txBody>
-          <a:bodyPr rot="0" spcFirstLastPara="0" vert="horz" wrap="square" lIns="91440" tIns="45720" rIns="91440" bIns="45720" numCol="1" spcCol="0" rtlCol="0" fromWordArt="0" anchor="ctr" anchorCtr="0" forceAA="0" compatLnSpc="1">
-            <a:prstTxWarp prst="textNoShape">
-              <a:avLst/>
-            </a:prstTxWarp>
-            <a:noAutofit/>
-          </a:bodyPr>
-          <a:lstStyle/>
-          <a:p>
-            <a:endParaRPr lang="de-DE"/>
-          </a:p>
-        </p:txBody>
-      </p:sp>
-      <p:sp>
-        <p:nvSpPr>
-          <p:cNvPr id="13" name="Oval 12"/>
-          <p:cNvSpPr/>
-          <p:nvPr/>
-        </p:nvSpPr>
-        <p:spPr>
-          <a:xfrm>
-            <a:off x="4664765" y="4078398"/>
-            <a:ext cx="1296035" cy="1254760"/>
-          </a:xfrm>
-          <a:prstGeom prst="ellipse">
-            <a:avLst/>
-          </a:prstGeom>
-          <a:solidFill>
-            <a:schemeClr val="accent1">
-              <a:alpha val="20000"/>
-            </a:schemeClr>
-          </a:solidFill>
-        </p:spPr>
-        <p:style>
-          <a:lnRef idx="2">
-            <a:schemeClr val="accent1">
-              <a:shade val="50000"/>
-            </a:schemeClr>
-          </a:lnRef>
-          <a:fillRef idx="1">
-            <a:schemeClr val="accent1"/>
-          </a:fillRef>
-          <a:effectRef idx="0">
-            <a:schemeClr val="accent1"/>
-          </a:effectRef>
-          <a:fontRef idx="minor">
-            <a:schemeClr val="lt1"/>
-          </a:fontRef>
-        </p:style>
-        <p:txBody>
-          <a:bodyPr rot="0" spcFirstLastPara="0" vert="horz" wrap="square" lIns="91440" tIns="45720" rIns="91440" bIns="45720" numCol="1" spcCol="0" rtlCol="0" fromWordArt="0" anchor="ctr" anchorCtr="0" forceAA="0" compatLnSpc="1">
-            <a:prstTxWarp prst="textNoShape">
-              <a:avLst/>
-            </a:prstTxWarp>
-            <a:noAutofit/>
-          </a:bodyPr>
-          <a:lstStyle/>
-          <a:p>
-            <a:endParaRPr lang="de-DE"/>
-          </a:p>
-        </p:txBody>
-      </p:sp>
-      <p:sp>
-        <p:nvSpPr>
-          <p:cNvPr id="14" name="Oval 13"/>
-          <p:cNvSpPr/>
-          <p:nvPr/>
-        </p:nvSpPr>
-        <p:spPr>
-          <a:xfrm>
-            <a:off x="2320468" y="666181"/>
-            <a:ext cx="1296035" cy="1254760"/>
-          </a:xfrm>
-          <a:prstGeom prst="ellipse">
-            <a:avLst/>
-          </a:prstGeom>
-          <a:solidFill>
-            <a:schemeClr val="accent1">
-              <a:alpha val="20000"/>
-            </a:schemeClr>
-          </a:solidFill>
-        </p:spPr>
-        <p:style>
-          <a:lnRef idx="2">
-            <a:schemeClr val="accent1">
-              <a:shade val="50000"/>
-            </a:schemeClr>
-          </a:lnRef>
-          <a:fillRef idx="1">
-            <a:schemeClr val="accent1"/>
-          </a:fillRef>
-          <a:effectRef idx="0">
-            <a:schemeClr val="accent1"/>
-          </a:effectRef>
-          <a:fontRef idx="minor">
-            <a:schemeClr val="lt1"/>
-          </a:fontRef>
-        </p:style>
-        <p:txBody>
-          <a:bodyPr rot="0" spcFirstLastPara="0" vert="horz" wrap="square" lIns="91440" tIns="45720" rIns="91440" bIns="45720" numCol="1" spcCol="0" rtlCol="0" fromWordArt="0" anchor="ctr" anchorCtr="0" forceAA="0" compatLnSpc="1">
-            <a:prstTxWarp prst="textNoShape">
-              <a:avLst/>
-            </a:prstTxWarp>
-            <a:noAutofit/>
-          </a:bodyPr>
-          <a:lstStyle/>
-          <a:p>
-            <a:endParaRPr lang="de-DE"/>
-          </a:p>
-        </p:txBody>
-      </p:sp>
-    </p:spTree>
-    <p:extLst>
-      <p:ext uri="{BB962C8B-B14F-4D97-AF65-F5344CB8AC3E}">
-        <p14:creationId xmlns:p14="http://schemas.microsoft.com/office/powerpoint/2010/main" val="686632633"/>
-      </p:ext>
-    </p:extLst>
-  </p:cSld>
-  <p:clrMapOvr>
-    <a:masterClrMapping/>
-  </p:clrMapOvr>
-</p:sld>
-</file>
-
-<file path=ppt/slides/slide9.xml><?xml version="1.0" encoding="utf-8"?>
-<p:sld xmlns:a="http://schemas.openxmlformats.org/drawingml/2006/main" xmlns:r="http://schemas.openxmlformats.org/officeDocument/2006/relationships" xmlns:p="http://schemas.openxmlformats.org/presentationml/2006/main">
-  <p:cSld>
-    <p:spTree>
-      <p:nvGrpSpPr>
-        <p:cNvPr id="1" name=""/>
-        <p:cNvGrpSpPr/>
-        <p:nvPr/>
-      </p:nvGrpSpPr>
-      <p:grpSpPr>
-        <a:xfrm>
-          <a:off x="0" y="0"/>
-          <a:ext cx="0" cy="0"/>
-          <a:chOff x="0" y="0"/>
-          <a:chExt cx="0" cy="0"/>
-        </a:xfrm>
-      </p:grpSpPr>
-      <p:sp>
-        <p:nvSpPr>
-          <p:cNvPr id="2" name="Titel 1"/>
-          <p:cNvSpPr>
-            <a:spLocks noGrp="1"/>
-          </p:cNvSpPr>
-          <p:nvPr>
-            <p:ph type="title"/>
-          </p:nvPr>
-        </p:nvSpPr>
-        <p:spPr/>
-        <p:txBody>
-          <a:bodyPr/>
-          <a:lstStyle/>
-          <a:p>
-            <a:r>
-              <a:rPr lang="en-US" dirty="0"/>
-              <a:t>Notification Preferences</a:t>
-            </a:r>
-          </a:p>
-        </p:txBody>
-      </p:sp>
-      <p:pic>
-        <p:nvPicPr>
-          <p:cNvPr id="4" name="Bild 3"/>
-          <p:cNvPicPr>
-            <a:picLocks noChangeAspect="1"/>
-          </p:cNvPicPr>
-          <p:nvPr/>
-        </p:nvPicPr>
-        <p:blipFill>
-          <a:blip r:embed="rId2"/>
-          <a:stretch>
-            <a:fillRect/>
-          </a:stretch>
-        </p:blipFill>
-        <p:spPr>
-          <a:xfrm>
-            <a:off x="838199" y="1825625"/>
-            <a:ext cx="4575483" cy="3753540"/>
-          </a:xfrm>
-          <a:prstGeom prst="rect">
-            <a:avLst/>
-          </a:prstGeom>
-        </p:spPr>
-      </p:pic>
-      <p:pic>
-        <p:nvPicPr>
-          <p:cNvPr id="5" name="Bild 4"/>
-          <p:cNvPicPr>
-            <a:picLocks noChangeAspect="1"/>
-          </p:cNvPicPr>
-          <p:nvPr/>
-        </p:nvPicPr>
-        <p:blipFill>
-          <a:blip r:embed="rId3"/>
-          <a:stretch>
-            <a:fillRect/>
-          </a:stretch>
-        </p:blipFill>
-        <p:spPr>
-          <a:xfrm>
-            <a:off x="6641326" y="1825625"/>
-            <a:ext cx="4712474" cy="3753540"/>
-          </a:xfrm>
-          <a:prstGeom prst="rect">
-            <a:avLst/>
-          </a:prstGeom>
-        </p:spPr>
-      </p:pic>
-    </p:spTree>
-    <p:extLst>
-      <p:ext uri="{BB962C8B-B14F-4D97-AF65-F5344CB8AC3E}">
-        <p14:creationId xmlns:p14="http://schemas.microsoft.com/office/powerpoint/2010/main" val="504889330"/>
       </p:ext>
     </p:extLst>
   </p:cSld>

</xml_diff>